<commit_message>
one final slide for branch of a branch
</commit_message>
<xml_diff>
--- a/GIT Presentation.pptx
+++ b/GIT Presentation.pptx
@@ -71,6 +71,7 @@
     <p:sldId id="313" r:id="rId64"/>
     <p:sldId id="314" r:id="rId65"/>
     <p:sldId id="315" r:id="rId66"/>
+    <p:sldId id="316" r:id="rId67"/>
   </p:sldIdLst>
   <p:sldSz cx="10080625" cy="7559675"/>
   <p:notesSz cx="7772400" cy="10058400"/>
@@ -154,7 +155,7 @@
               <a:rPr b="0" lang="en-US" sz="1400" spc="-1" strike="noStrike">
                 <a:latin typeface="Times New Roman"/>
               </a:rPr>
-              <a:t> </a:t>
+              <a:t>&lt;header&gt;</a:t>
             </a:r>
             <a:endParaRPr b="0" lang="en-US" sz="1400" spc="-1" strike="noStrike">
               <a:latin typeface="Times New Roman"/>
@@ -189,7 +190,7 @@
               <a:rPr b="0" lang="en-US" sz="1400" spc="-1" strike="noStrike">
                 <a:latin typeface="Times New Roman"/>
               </a:rPr>
-              <a:t> </a:t>
+              <a:t>&lt;date/time&gt;</a:t>
             </a:r>
             <a:endParaRPr b="0" lang="en-US" sz="1400" spc="-1" strike="noStrike">
               <a:latin typeface="Times New Roman"/>
@@ -223,7 +224,7 @@
               <a:rPr b="0" lang="en-US" sz="1400" spc="-1" strike="noStrike">
                 <a:latin typeface="Times New Roman"/>
               </a:rPr>
-              <a:t> </a:t>
+              <a:t>&lt;footer&gt;</a:t>
             </a:r>
             <a:endParaRPr b="0" lang="en-US" sz="1400" spc="-1" strike="noStrike">
               <a:latin typeface="Times New Roman"/>
@@ -254,11 +255,11 @@
           <a:bodyPr lIns="0" rIns="0" tIns="0" bIns="0" anchor="b"/>
           <a:p>
             <a:pPr algn="r"/>
-            <a:fld id="{330AEECC-B346-4755-A1AD-19E7074F0964}" type="slidenum">
+            <a:fld id="{81E7049F-EE25-4A0D-B144-6F26BA4A8CD3}" type="slidenum">
               <a:rPr b="0" lang="en-US" sz="1400" spc="-1" strike="noStrike">
                 <a:latin typeface="Times New Roman"/>
               </a:rPr>
-              <a:t>1</a:t>
+              <a:t>&lt;number&gt;</a:t>
             </a:fld>
             <a:endParaRPr b="0" lang="en-US" sz="1400" spc="-1" strike="noStrike">
               <a:latin typeface="Times New Roman"/>
@@ -291,7 +292,7 @@
       </p:grpSpPr>
       <p:sp>
         <p:nvSpPr>
-          <p:cNvPr id="732" name="PlaceHolder 1"/>
+          <p:cNvPr id="755" name="PlaceHolder 1"/>
           <p:cNvSpPr>
             <a:spLocks noGrp="1"/>
           </p:cNvSpPr>
@@ -302,7 +303,7 @@
         <p:spPr>
           <a:xfrm>
             <a:off x="777240" y="4777560"/>
-            <a:ext cx="6216840" cy="4525200"/>
+            <a:ext cx="6216480" cy="4524840"/>
           </a:xfrm>
           <a:prstGeom prst="rect">
             <a:avLst/>
@@ -350,7 +351,7 @@
       </p:grpSpPr>
       <p:sp>
         <p:nvSpPr>
-          <p:cNvPr id="741" name="PlaceHolder 1"/>
+          <p:cNvPr id="764" name="PlaceHolder 1"/>
           <p:cNvSpPr>
             <a:spLocks noGrp="1"/>
           </p:cNvSpPr>
@@ -361,7 +362,7 @@
         <p:spPr>
           <a:xfrm>
             <a:off x="777240" y="4777560"/>
-            <a:ext cx="6216840" cy="4525200"/>
+            <a:ext cx="6216480" cy="4524840"/>
           </a:xfrm>
           <a:prstGeom prst="rect">
             <a:avLst/>
@@ -409,7 +410,7 @@
       </p:grpSpPr>
       <p:sp>
         <p:nvSpPr>
-          <p:cNvPr id="742" name="PlaceHolder 1"/>
+          <p:cNvPr id="765" name="PlaceHolder 1"/>
           <p:cNvSpPr>
             <a:spLocks noGrp="1"/>
           </p:cNvSpPr>
@@ -420,7 +421,7 @@
         <p:spPr>
           <a:xfrm>
             <a:off x="777240" y="4777560"/>
-            <a:ext cx="6216840" cy="4525200"/>
+            <a:ext cx="6216480" cy="4524840"/>
           </a:xfrm>
           <a:prstGeom prst="rect">
             <a:avLst/>
@@ -468,7 +469,7 @@
       </p:grpSpPr>
       <p:sp>
         <p:nvSpPr>
-          <p:cNvPr id="743" name="PlaceHolder 1"/>
+          <p:cNvPr id="766" name="PlaceHolder 1"/>
           <p:cNvSpPr>
             <a:spLocks noGrp="1"/>
           </p:cNvSpPr>
@@ -479,7 +480,7 @@
         <p:spPr>
           <a:xfrm>
             <a:off x="777240" y="4777560"/>
-            <a:ext cx="6217560" cy="4525920"/>
+            <a:ext cx="6217200" cy="4525560"/>
           </a:xfrm>
           <a:prstGeom prst="rect">
             <a:avLst/>
@@ -524,7 +525,7 @@
       </p:grpSpPr>
       <p:sp>
         <p:nvSpPr>
-          <p:cNvPr id="744" name="PlaceHolder 1"/>
+          <p:cNvPr id="767" name="PlaceHolder 1"/>
           <p:cNvSpPr>
             <a:spLocks noGrp="1"/>
           </p:cNvSpPr>
@@ -535,7 +536,7 @@
         <p:spPr>
           <a:xfrm>
             <a:off x="777240" y="4777560"/>
-            <a:ext cx="6216840" cy="4525200"/>
+            <a:ext cx="6216480" cy="4524840"/>
           </a:xfrm>
           <a:prstGeom prst="rect">
             <a:avLst/>
@@ -621,7 +622,7 @@
       </p:grpSpPr>
       <p:sp>
         <p:nvSpPr>
-          <p:cNvPr id="745" name="PlaceHolder 1"/>
+          <p:cNvPr id="768" name="PlaceHolder 1"/>
           <p:cNvSpPr>
             <a:spLocks noGrp="1"/>
           </p:cNvSpPr>
@@ -632,7 +633,7 @@
         <p:spPr>
           <a:xfrm>
             <a:off x="777240" y="4777560"/>
-            <a:ext cx="6216840" cy="4525200"/>
+            <a:ext cx="6216480" cy="4524840"/>
           </a:xfrm>
           <a:prstGeom prst="rect">
             <a:avLst/>
@@ -680,7 +681,7 @@
       </p:grpSpPr>
       <p:sp>
         <p:nvSpPr>
-          <p:cNvPr id="746" name="PlaceHolder 1"/>
+          <p:cNvPr id="769" name="PlaceHolder 1"/>
           <p:cNvSpPr>
             <a:spLocks noGrp="1"/>
           </p:cNvSpPr>
@@ -691,7 +692,7 @@
         <p:spPr>
           <a:xfrm>
             <a:off x="777240" y="4777560"/>
-            <a:ext cx="6216840" cy="4525200"/>
+            <a:ext cx="6216480" cy="4524840"/>
           </a:xfrm>
           <a:prstGeom prst="rect">
             <a:avLst/>
@@ -739,7 +740,7 @@
       </p:grpSpPr>
       <p:sp>
         <p:nvSpPr>
-          <p:cNvPr id="747" name="PlaceHolder 1"/>
+          <p:cNvPr id="770" name="PlaceHolder 1"/>
           <p:cNvSpPr>
             <a:spLocks noGrp="1"/>
           </p:cNvSpPr>
@@ -750,7 +751,7 @@
         <p:spPr>
           <a:xfrm>
             <a:off x="777240" y="4777560"/>
-            <a:ext cx="6216840" cy="4525200"/>
+            <a:ext cx="6216480" cy="4524840"/>
           </a:xfrm>
           <a:prstGeom prst="rect">
             <a:avLst/>
@@ -808,7 +809,7 @@
       </p:grpSpPr>
       <p:sp>
         <p:nvSpPr>
-          <p:cNvPr id="733" name="PlaceHolder 1"/>
+          <p:cNvPr id="756" name="PlaceHolder 1"/>
           <p:cNvSpPr>
             <a:spLocks noGrp="1"/>
           </p:cNvSpPr>
@@ -819,7 +820,7 @@
         <p:spPr>
           <a:xfrm>
             <a:off x="777240" y="4777560"/>
-            <a:ext cx="6216840" cy="4525200"/>
+            <a:ext cx="6216480" cy="4524840"/>
           </a:xfrm>
           <a:prstGeom prst="rect">
             <a:avLst/>
@@ -886,7 +887,7 @@
       </p:grpSpPr>
       <p:sp>
         <p:nvSpPr>
-          <p:cNvPr id="748" name="PlaceHolder 1"/>
+          <p:cNvPr id="771" name="PlaceHolder 1"/>
           <p:cNvSpPr>
             <a:spLocks noGrp="1"/>
           </p:cNvSpPr>
@@ -897,7 +898,7 @@
         <p:spPr>
           <a:xfrm>
             <a:off x="777240" y="4777560"/>
-            <a:ext cx="6216840" cy="4532760"/>
+            <a:ext cx="6216480" cy="4532400"/>
           </a:xfrm>
           <a:prstGeom prst="rect">
             <a:avLst/>
@@ -964,7 +965,7 @@
       </p:grpSpPr>
       <p:sp>
         <p:nvSpPr>
-          <p:cNvPr id="749" name="PlaceHolder 1"/>
+          <p:cNvPr id="772" name="PlaceHolder 1"/>
           <p:cNvSpPr>
             <a:spLocks noGrp="1"/>
           </p:cNvSpPr>
@@ -975,7 +976,7 @@
         <p:spPr>
           <a:xfrm>
             <a:off x="777240" y="4777560"/>
-            <a:ext cx="6216840" cy="4816080"/>
+            <a:ext cx="6216480" cy="4815720"/>
           </a:xfrm>
           <a:prstGeom prst="rect">
             <a:avLst/>
@@ -1037,7 +1038,7 @@
       </p:grpSpPr>
       <p:sp>
         <p:nvSpPr>
-          <p:cNvPr id="750" name="PlaceHolder 1"/>
+          <p:cNvPr id="773" name="PlaceHolder 1"/>
           <p:cNvSpPr>
             <a:spLocks noGrp="1"/>
           </p:cNvSpPr>
@@ -1048,7 +1049,7 @@
         <p:spPr>
           <a:xfrm>
             <a:off x="777240" y="4777560"/>
-            <a:ext cx="6216840" cy="4525200"/>
+            <a:ext cx="6216480" cy="4524840"/>
           </a:xfrm>
           <a:prstGeom prst="rect">
             <a:avLst/>
@@ -1096,7 +1097,7 @@
       </p:grpSpPr>
       <p:sp>
         <p:nvSpPr>
-          <p:cNvPr id="751" name="PlaceHolder 1"/>
+          <p:cNvPr id="774" name="PlaceHolder 1"/>
           <p:cNvSpPr>
             <a:spLocks noGrp="1"/>
           </p:cNvSpPr>
@@ -1107,7 +1108,7 @@
         <p:spPr>
           <a:xfrm>
             <a:off x="777240" y="4777560"/>
-            <a:ext cx="6216840" cy="4525200"/>
+            <a:ext cx="6216480" cy="4524840"/>
           </a:xfrm>
           <a:prstGeom prst="rect">
             <a:avLst/>
@@ -1193,7 +1194,7 @@
       </p:grpSpPr>
       <p:sp>
         <p:nvSpPr>
-          <p:cNvPr id="734" name="PlaceHolder 1"/>
+          <p:cNvPr id="757" name="PlaceHolder 1"/>
           <p:cNvSpPr>
             <a:spLocks noGrp="1"/>
           </p:cNvSpPr>
@@ -1204,7 +1205,7 @@
         <p:spPr>
           <a:xfrm>
             <a:off x="777240" y="4777560"/>
-            <a:ext cx="6216840" cy="4525200"/>
+            <a:ext cx="6216480" cy="4524840"/>
           </a:xfrm>
           <a:prstGeom prst="rect">
             <a:avLst/>
@@ -1271,7 +1272,7 @@
       </p:grpSpPr>
       <p:sp>
         <p:nvSpPr>
-          <p:cNvPr id="752" name="PlaceHolder 1"/>
+          <p:cNvPr id="775" name="PlaceHolder 1"/>
           <p:cNvSpPr>
             <a:spLocks noGrp="1"/>
           </p:cNvSpPr>
@@ -1282,7 +1283,7 @@
         <p:spPr>
           <a:xfrm>
             <a:off x="777240" y="4777560"/>
-            <a:ext cx="6216840" cy="4525200"/>
+            <a:ext cx="6216480" cy="4524840"/>
           </a:xfrm>
           <a:prstGeom prst="rect">
             <a:avLst/>
@@ -1358,7 +1359,7 @@
       </p:grpSpPr>
       <p:sp>
         <p:nvSpPr>
-          <p:cNvPr id="753" name="PlaceHolder 1"/>
+          <p:cNvPr id="776" name="PlaceHolder 1"/>
           <p:cNvSpPr>
             <a:spLocks noGrp="1"/>
           </p:cNvSpPr>
@@ -1369,7 +1370,7 @@
         <p:spPr>
           <a:xfrm>
             <a:off x="777240" y="4777560"/>
-            <a:ext cx="6216840" cy="4525200"/>
+            <a:ext cx="6216480" cy="4524840"/>
           </a:xfrm>
           <a:prstGeom prst="rect">
             <a:avLst/>
@@ -1417,7 +1418,7 @@
       </p:grpSpPr>
       <p:sp>
         <p:nvSpPr>
-          <p:cNvPr id="754" name="PlaceHolder 1"/>
+          <p:cNvPr id="777" name="PlaceHolder 1"/>
           <p:cNvSpPr>
             <a:spLocks noGrp="1"/>
           </p:cNvSpPr>
@@ -1428,7 +1429,7 @@
         <p:spPr>
           <a:xfrm>
             <a:off x="777240" y="4777560"/>
-            <a:ext cx="6216840" cy="5097240"/>
+            <a:ext cx="6216480" cy="5096880"/>
           </a:xfrm>
           <a:prstGeom prst="rect">
             <a:avLst/>
@@ -1533,7 +1534,7 @@
       </p:grpSpPr>
       <p:sp>
         <p:nvSpPr>
-          <p:cNvPr id="735" name="PlaceHolder 1"/>
+          <p:cNvPr id="758" name="PlaceHolder 1"/>
           <p:cNvSpPr>
             <a:spLocks noGrp="1"/>
           </p:cNvSpPr>
@@ -1544,7 +1545,7 @@
         <p:spPr>
           <a:xfrm>
             <a:off x="777240" y="4777560"/>
-            <a:ext cx="6216840" cy="4525200"/>
+            <a:ext cx="6216480" cy="4524840"/>
           </a:xfrm>
           <a:prstGeom prst="rect">
             <a:avLst/>
@@ -1639,7 +1640,7 @@
       </p:grpSpPr>
       <p:sp>
         <p:nvSpPr>
-          <p:cNvPr id="755" name="PlaceHolder 1"/>
+          <p:cNvPr id="778" name="PlaceHolder 1"/>
           <p:cNvSpPr>
             <a:spLocks noGrp="1"/>
           </p:cNvSpPr>
@@ -1650,7 +1651,7 @@
         <p:spPr>
           <a:xfrm>
             <a:off x="777240" y="4777560"/>
-            <a:ext cx="6216840" cy="5097240"/>
+            <a:ext cx="6216480" cy="5096880"/>
           </a:xfrm>
           <a:prstGeom prst="rect">
             <a:avLst/>
@@ -1659,12 +1660,12 @@
         <p:txBody>
           <a:bodyPr lIns="0" rIns="0" tIns="0" bIns="0"/>
           <a:p>
-            <a:endParaRPr b="0" lang="en-US" sz="1800" spc="-1" strike="noStrike">
-              <a:latin typeface="Arial"/>
-            </a:endParaRPr>
-          </a:p>
-          <a:p>
-            <a:endParaRPr b="0" lang="en-US" sz="1800" spc="-1" strike="noStrike">
+            <a:endParaRPr b="0" lang="en-US" sz="2000" spc="-1" strike="noStrike">
+              <a:latin typeface="Arial"/>
+            </a:endParaRPr>
+          </a:p>
+          <a:p>
+            <a:endParaRPr b="0" lang="en-US" sz="2000" spc="-1" strike="noStrike">
               <a:latin typeface="Arial"/>
             </a:endParaRPr>
           </a:p>
@@ -1708,7 +1709,7 @@
       </p:grpSpPr>
       <p:sp>
         <p:nvSpPr>
-          <p:cNvPr id="756" name="PlaceHolder 1"/>
+          <p:cNvPr id="779" name="PlaceHolder 1"/>
           <p:cNvSpPr>
             <a:spLocks noGrp="1"/>
           </p:cNvSpPr>
@@ -1719,7 +1720,7 @@
         <p:spPr>
           <a:xfrm>
             <a:off x="777240" y="4777560"/>
-            <a:ext cx="6216840" cy="4525200"/>
+            <a:ext cx="6216480" cy="4524840"/>
           </a:xfrm>
           <a:prstGeom prst="rect">
             <a:avLst/>
@@ -1795,7 +1796,7 @@
       </p:grpSpPr>
       <p:sp>
         <p:nvSpPr>
-          <p:cNvPr id="757" name="PlaceHolder 1"/>
+          <p:cNvPr id="780" name="PlaceHolder 1"/>
           <p:cNvSpPr>
             <a:spLocks noGrp="1"/>
           </p:cNvSpPr>
@@ -1806,7 +1807,7 @@
         <p:spPr>
           <a:xfrm>
             <a:off x="777240" y="4777560"/>
-            <a:ext cx="6216840" cy="4525200"/>
+            <a:ext cx="6216480" cy="4524840"/>
           </a:xfrm>
           <a:prstGeom prst="rect">
             <a:avLst/>
@@ -1873,7 +1874,7 @@
       </p:grpSpPr>
       <p:sp>
         <p:nvSpPr>
-          <p:cNvPr id="758" name="PlaceHolder 1"/>
+          <p:cNvPr id="781" name="PlaceHolder 1"/>
           <p:cNvSpPr>
             <a:spLocks noGrp="1"/>
           </p:cNvSpPr>
@@ -1884,7 +1885,7 @@
         <p:spPr>
           <a:xfrm>
             <a:off x="777240" y="4777560"/>
-            <a:ext cx="6216840" cy="4525200"/>
+            <a:ext cx="6216480" cy="4524840"/>
           </a:xfrm>
           <a:prstGeom prst="rect">
             <a:avLst/>
@@ -1942,7 +1943,7 @@
       </p:grpSpPr>
       <p:sp>
         <p:nvSpPr>
-          <p:cNvPr id="736" name="PlaceHolder 1"/>
+          <p:cNvPr id="759" name="PlaceHolder 1"/>
           <p:cNvSpPr>
             <a:spLocks noGrp="1"/>
           </p:cNvSpPr>
@@ -1953,7 +1954,7 @@
         <p:spPr>
           <a:xfrm>
             <a:off x="777240" y="4777560"/>
-            <a:ext cx="6216840" cy="4525200"/>
+            <a:ext cx="6216480" cy="4524840"/>
           </a:xfrm>
           <a:prstGeom prst="rect">
             <a:avLst/>
@@ -2100,7 +2101,7 @@
       </p:grpSpPr>
       <p:sp>
         <p:nvSpPr>
-          <p:cNvPr id="759" name="PlaceHolder 1"/>
+          <p:cNvPr id="782" name="PlaceHolder 1"/>
           <p:cNvSpPr>
             <a:spLocks noGrp="1"/>
           </p:cNvSpPr>
@@ -2111,7 +2112,7 @@
         <p:spPr>
           <a:xfrm>
             <a:off x="777240" y="4777560"/>
-            <a:ext cx="6216840" cy="4525200"/>
+            <a:ext cx="6216480" cy="4524840"/>
           </a:xfrm>
           <a:prstGeom prst="rect">
             <a:avLst/>
@@ -2159,7 +2160,7 @@
       </p:grpSpPr>
       <p:sp>
         <p:nvSpPr>
-          <p:cNvPr id="760" name="PlaceHolder 1"/>
+          <p:cNvPr id="783" name="PlaceHolder 1"/>
           <p:cNvSpPr>
             <a:spLocks noGrp="1"/>
           </p:cNvSpPr>
@@ -2170,7 +2171,7 @@
         <p:spPr>
           <a:xfrm>
             <a:off x="777240" y="4777560"/>
-            <a:ext cx="6216840" cy="4525200"/>
+            <a:ext cx="6216480" cy="4524840"/>
           </a:xfrm>
           <a:prstGeom prst="rect">
             <a:avLst/>
@@ -2246,7 +2247,7 @@
       </p:grpSpPr>
       <p:sp>
         <p:nvSpPr>
-          <p:cNvPr id="737" name="PlaceHolder 1"/>
+          <p:cNvPr id="760" name="PlaceHolder 1"/>
           <p:cNvSpPr>
             <a:spLocks noGrp="1"/>
           </p:cNvSpPr>
@@ -2257,7 +2258,7 @@
         <p:spPr>
           <a:xfrm>
             <a:off x="777240" y="4777560"/>
-            <a:ext cx="6216840" cy="4525200"/>
+            <a:ext cx="6216480" cy="4524840"/>
           </a:xfrm>
           <a:prstGeom prst="rect">
             <a:avLst/>
@@ -2310,7 +2311,7 @@
       </p:grpSpPr>
       <p:sp>
         <p:nvSpPr>
-          <p:cNvPr id="738" name="PlaceHolder 1"/>
+          <p:cNvPr id="761" name="PlaceHolder 1"/>
           <p:cNvSpPr>
             <a:spLocks noGrp="1"/>
           </p:cNvSpPr>
@@ -2321,7 +2322,7 @@
         <p:spPr>
           <a:xfrm>
             <a:off x="777240" y="4777560"/>
-            <a:ext cx="6216840" cy="4525200"/>
+            <a:ext cx="6216480" cy="4524840"/>
           </a:xfrm>
           <a:prstGeom prst="rect">
             <a:avLst/>
@@ -2369,7 +2370,7 @@
       </p:grpSpPr>
       <p:sp>
         <p:nvSpPr>
-          <p:cNvPr id="739" name="PlaceHolder 1"/>
+          <p:cNvPr id="762" name="PlaceHolder 1"/>
           <p:cNvSpPr>
             <a:spLocks noGrp="1"/>
           </p:cNvSpPr>
@@ -2380,7 +2381,7 @@
         <p:spPr>
           <a:xfrm>
             <a:off x="777240" y="4777560"/>
-            <a:ext cx="6216840" cy="4525200"/>
+            <a:ext cx="6216480" cy="4524840"/>
           </a:xfrm>
           <a:prstGeom prst="rect">
             <a:avLst/>
@@ -2428,7 +2429,7 @@
       </p:grpSpPr>
       <p:sp>
         <p:nvSpPr>
-          <p:cNvPr id="740" name="PlaceHolder 1"/>
+          <p:cNvPr id="763" name="PlaceHolder 1"/>
           <p:cNvSpPr>
             <a:spLocks noGrp="1"/>
           </p:cNvSpPr>
@@ -2439,7 +2440,7 @@
         <p:spPr>
           <a:xfrm>
             <a:off x="777240" y="4777560"/>
-            <a:ext cx="6216840" cy="4525200"/>
+            <a:ext cx="6216480" cy="4524840"/>
           </a:xfrm>
           <a:prstGeom prst="rect">
             <a:avLst/>
@@ -7878,7 +7879,7 @@
         <p:spPr>
           <a:xfrm>
             <a:off x="504000" y="301320"/>
-            <a:ext cx="9070920" cy="1261440"/>
+            <a:ext cx="9072000" cy="1261800"/>
           </a:xfrm>
           <a:prstGeom prst="rect">
             <a:avLst/>
@@ -7887,13 +7888,14 @@
         <p:txBody>
           <a:bodyPr lIns="0" rIns="0" tIns="0" bIns="0" anchor="ctr"/>
           <a:p>
-            <a:r>
-              <a:rPr b="0" lang="en-US" sz="1800" spc="-1" strike="noStrike">
+            <a:pPr algn="ctr"/>
+            <a:r>
+              <a:rPr b="0" lang="en-US" sz="4400" spc="-1" strike="noStrike">
                 <a:latin typeface="Arial"/>
               </a:rPr>
               <a:t>Click to edit the title text format</a:t>
             </a:r>
-            <a:endParaRPr b="0" lang="en-US" sz="1800" spc="-1" strike="noStrike">
+            <a:endParaRPr b="0" lang="en-US" sz="4400" spc="-1" strike="noStrike">
               <a:latin typeface="Arial"/>
             </a:endParaRPr>
           </a:p>
@@ -7911,8 +7913,8 @@
         </p:nvSpPr>
         <p:spPr>
           <a:xfrm>
-            <a:off x="504000" y="1769040"/>
-            <a:ext cx="9070920" cy="4383720"/>
+            <a:off x="504000" y="1768680"/>
+            <a:ext cx="9072000" cy="4384080"/>
           </a:xfrm>
           <a:prstGeom prst="rect">
             <a:avLst/>
@@ -7935,12 +7937,12 @@
               <a:buChar char=""/>
             </a:pPr>
             <a:r>
-              <a:rPr b="0" lang="en-US" sz="1800" spc="-1" strike="noStrike">
+              <a:rPr b="0" lang="en-US" sz="3200" spc="-1" strike="noStrike">
                 <a:latin typeface="Arial"/>
               </a:rPr>
               <a:t>Click to edit the outline text format</a:t>
             </a:r>
-            <a:endParaRPr b="0" lang="en-US" sz="1800" spc="-1" strike="noStrike">
+            <a:endParaRPr b="0" lang="en-US" sz="3200" spc="-1" strike="noStrike">
               <a:latin typeface="Arial"/>
             </a:endParaRPr>
           </a:p>
@@ -7957,12 +7959,12 @@
               <a:buChar char=""/>
             </a:pPr>
             <a:r>
-              <a:rPr b="0" lang="en-US" sz="1800" spc="-1" strike="noStrike">
+              <a:rPr b="0" lang="en-US" sz="2800" spc="-1" strike="noStrike">
                 <a:latin typeface="Arial"/>
               </a:rPr>
               <a:t>Second Outline Level</a:t>
             </a:r>
-            <a:endParaRPr b="0" lang="en-US" sz="1800" spc="-1" strike="noStrike">
+            <a:endParaRPr b="0" lang="en-US" sz="2800" spc="-1" strike="noStrike">
               <a:latin typeface="Arial"/>
             </a:endParaRPr>
           </a:p>
@@ -7979,12 +7981,12 @@
               <a:buChar char=""/>
             </a:pPr>
             <a:r>
-              <a:rPr b="0" lang="en-US" sz="1800" spc="-1" strike="noStrike">
+              <a:rPr b="0" lang="en-US" sz="2400" spc="-1" strike="noStrike">
                 <a:latin typeface="Arial"/>
               </a:rPr>
               <a:t>Third Outline Level</a:t>
             </a:r>
-            <a:endParaRPr b="0" lang="en-US" sz="1800" spc="-1" strike="noStrike">
+            <a:endParaRPr b="0" lang="en-US" sz="2400" spc="-1" strike="noStrike">
               <a:latin typeface="Arial"/>
             </a:endParaRPr>
           </a:p>
@@ -8001,12 +8003,12 @@
               <a:buChar char=""/>
             </a:pPr>
             <a:r>
-              <a:rPr b="0" lang="en-US" sz="1800" spc="-1" strike="noStrike">
+              <a:rPr b="0" lang="en-US" sz="2000" spc="-1" strike="noStrike">
                 <a:latin typeface="Arial"/>
               </a:rPr>
               <a:t>Fourth Outline Level</a:t>
             </a:r>
-            <a:endParaRPr b="0" lang="en-US" sz="1800" spc="-1" strike="noStrike">
+            <a:endParaRPr b="0" lang="en-US" sz="2000" spc="-1" strike="noStrike">
               <a:latin typeface="Arial"/>
             </a:endParaRPr>
           </a:p>
@@ -8023,12 +8025,12 @@
               <a:buChar char=""/>
             </a:pPr>
             <a:r>
-              <a:rPr b="0" lang="en-US" sz="1800" spc="-1" strike="noStrike">
+              <a:rPr b="0" lang="en-US" sz="2000" spc="-1" strike="noStrike">
                 <a:latin typeface="Arial"/>
               </a:rPr>
               <a:t>Fifth Outline Level</a:t>
             </a:r>
-            <a:endParaRPr b="0" lang="en-US" sz="1800" spc="-1" strike="noStrike">
+            <a:endParaRPr b="0" lang="en-US" sz="2000" spc="-1" strike="noStrike">
               <a:latin typeface="Arial"/>
             </a:endParaRPr>
           </a:p>
@@ -8045,12 +8047,12 @@
               <a:buChar char=""/>
             </a:pPr>
             <a:r>
-              <a:rPr b="0" lang="en-US" sz="1800" spc="-1" strike="noStrike">
+              <a:rPr b="0" lang="en-US" sz="2000" spc="-1" strike="noStrike">
                 <a:latin typeface="Arial"/>
               </a:rPr>
               <a:t>Sixth Outline Level</a:t>
             </a:r>
-            <a:endParaRPr b="0" lang="en-US" sz="1800" spc="-1" strike="noStrike">
+            <a:endParaRPr b="0" lang="en-US" sz="2000" spc="-1" strike="noStrike">
               <a:latin typeface="Arial"/>
             </a:endParaRPr>
           </a:p>
@@ -8067,12 +8069,12 @@
               <a:buChar char=""/>
             </a:pPr>
             <a:r>
-              <a:rPr b="0" lang="en-US" sz="1800" spc="-1" strike="noStrike">
+              <a:rPr b="0" lang="en-US" sz="2000" spc="-1" strike="noStrike">
                 <a:latin typeface="Arial"/>
               </a:rPr>
               <a:t>Seventh Outline Level</a:t>
             </a:r>
-            <a:endParaRPr b="0" lang="en-US" sz="1800" spc="-1" strike="noStrike">
+            <a:endParaRPr b="0" lang="en-US" sz="2000" spc="-1" strike="noStrike">
               <a:latin typeface="Arial"/>
             </a:endParaRPr>
           </a:p>
@@ -8877,7 +8879,7 @@
         <p:spPr>
           <a:xfrm>
             <a:off x="504000" y="301320"/>
-            <a:ext cx="9070920" cy="1261440"/>
+            <a:ext cx="9070560" cy="1261080"/>
           </a:xfrm>
           <a:prstGeom prst="rect">
             <a:avLst/>
@@ -8926,7 +8928,7 @@
         <p:spPr>
           <a:xfrm>
             <a:off x="504000" y="1769040"/>
-            <a:ext cx="9070920" cy="4383720"/>
+            <a:ext cx="9070560" cy="4383360"/>
           </a:xfrm>
           <a:prstGeom prst="rect">
             <a:avLst/>
@@ -9024,7 +9026,7 @@
         <p:spPr>
           <a:xfrm>
             <a:off x="504000" y="301320"/>
-            <a:ext cx="9070920" cy="1261440"/>
+            <a:ext cx="9070560" cy="1261080"/>
           </a:xfrm>
           <a:prstGeom prst="rect">
             <a:avLst/>
@@ -9073,7 +9075,7 @@
         <p:spPr>
           <a:xfrm>
             <a:off x="504000" y="1769040"/>
-            <a:ext cx="9070920" cy="4383720"/>
+            <a:ext cx="9070560" cy="4383360"/>
           </a:xfrm>
           <a:prstGeom prst="rect">
             <a:avLst/>
@@ -9092,7 +9094,7 @@
         <p:txBody>
           <a:bodyPr lIns="0" rIns="0" tIns="0" bIns="0"/>
           <a:p>
-            <a:pPr marL="432000" indent="-323280">
+            <a:pPr marL="432000" indent="-322920">
               <a:lnSpc>
                 <a:spcPct val="100000"/>
               </a:lnSpc>
@@ -9118,7 +9120,7 @@
             </a:endParaRPr>
           </a:p>
           <a:p>
-            <a:pPr lvl="1" marL="864000" indent="-323280">
+            <a:pPr lvl="1" marL="864000" indent="-322920">
               <a:lnSpc>
                 <a:spcPct val="100000"/>
               </a:lnSpc>
@@ -9144,7 +9146,7 @@
             </a:endParaRPr>
           </a:p>
           <a:p>
-            <a:pPr lvl="2" marL="1296000" indent="-287280">
+            <a:pPr lvl="2" marL="1296000" indent="-286920">
               <a:lnSpc>
                 <a:spcPct val="100000"/>
               </a:lnSpc>
@@ -9170,7 +9172,7 @@
             </a:endParaRPr>
           </a:p>
           <a:p>
-            <a:pPr lvl="1" marL="864000" indent="-323280">
+            <a:pPr lvl="1" marL="864000" indent="-322920">
               <a:lnSpc>
                 <a:spcPct val="100000"/>
               </a:lnSpc>
@@ -9196,7 +9198,7 @@
             </a:endParaRPr>
           </a:p>
           <a:p>
-            <a:pPr lvl="2" marL="1296000" indent="-287280">
+            <a:pPr lvl="2" marL="1296000" indent="-286920">
               <a:lnSpc>
                 <a:spcPct val="100000"/>
               </a:lnSpc>
@@ -9222,7 +9224,7 @@
             </a:endParaRPr>
           </a:p>
           <a:p>
-            <a:pPr lvl="2" marL="1296000" indent="-287280">
+            <a:pPr lvl="2" marL="1296000" indent="-286920">
               <a:lnSpc>
                 <a:spcPct val="100000"/>
               </a:lnSpc>
@@ -9248,7 +9250,7 @@
             </a:endParaRPr>
           </a:p>
           <a:p>
-            <a:pPr lvl="2" marL="1296000" indent="-287280">
+            <a:pPr lvl="2" marL="1296000" indent="-286920">
               <a:lnSpc>
                 <a:spcPct val="100000"/>
               </a:lnSpc>
@@ -9333,7 +9335,7 @@
         <p:spPr>
           <a:xfrm>
             <a:off x="504000" y="301320"/>
-            <a:ext cx="9070920" cy="1261440"/>
+            <a:ext cx="9070560" cy="1261080"/>
           </a:xfrm>
           <a:prstGeom prst="rect">
             <a:avLst/>
@@ -9382,7 +9384,7 @@
         <p:spPr>
           <a:xfrm>
             <a:off x="504000" y="1769040"/>
-            <a:ext cx="9070920" cy="4383720"/>
+            <a:ext cx="9070560" cy="4383360"/>
           </a:xfrm>
           <a:prstGeom prst="rect">
             <a:avLst/>
@@ -9401,7 +9403,7 @@
         <p:txBody>
           <a:bodyPr lIns="0" rIns="0" tIns="0" bIns="0"/>
           <a:p>
-            <a:pPr marL="432000" indent="-323280">
+            <a:pPr marL="432000" indent="-322920">
               <a:lnSpc>
                 <a:spcPct val="100000"/>
               </a:lnSpc>
@@ -9427,7 +9429,7 @@
             </a:endParaRPr>
           </a:p>
           <a:p>
-            <a:pPr lvl="1" marL="864000" indent="-323280">
+            <a:pPr lvl="1" marL="864000" indent="-322920">
               <a:lnSpc>
                 <a:spcPct val="100000"/>
               </a:lnSpc>
@@ -9459,7 +9461,7 @@
             </a:endParaRPr>
           </a:p>
           <a:p>
-            <a:pPr marL="432000" indent="-323280">
+            <a:pPr marL="432000" indent="-322920">
               <a:lnSpc>
                 <a:spcPct val="100000"/>
               </a:lnSpc>
@@ -9544,7 +9546,7 @@
         <p:spPr>
           <a:xfrm>
             <a:off x="504000" y="301320"/>
-            <a:ext cx="9070920" cy="1261440"/>
+            <a:ext cx="9070560" cy="1261080"/>
           </a:xfrm>
           <a:prstGeom prst="rect">
             <a:avLst/>
@@ -9593,7 +9595,7 @@
         <p:spPr>
           <a:xfrm>
             <a:off x="504000" y="1769040"/>
-            <a:ext cx="9070920" cy="4383720"/>
+            <a:ext cx="9070560" cy="4383360"/>
           </a:xfrm>
           <a:prstGeom prst="rect">
             <a:avLst/>
@@ -9612,7 +9614,7 @@
         <p:txBody>
           <a:bodyPr lIns="0" rIns="0" tIns="0" bIns="0"/>
           <a:p>
-            <a:pPr marL="432000" indent="-323280">
+            <a:pPr marL="432000" indent="-322920">
               <a:lnSpc>
                 <a:spcPct val="100000"/>
               </a:lnSpc>
@@ -9638,7 +9640,7 @@
             </a:endParaRPr>
           </a:p>
           <a:p>
-            <a:pPr lvl="1" marL="864000" indent="-323280">
+            <a:pPr lvl="1" marL="864000" indent="-322920">
               <a:lnSpc>
                 <a:spcPct val="100000"/>
               </a:lnSpc>
@@ -9664,7 +9666,7 @@
             </a:endParaRPr>
           </a:p>
           <a:p>
-            <a:pPr lvl="2" marL="1296000" indent="-287280">
+            <a:pPr lvl="2" marL="1296000" indent="-286920">
               <a:lnSpc>
                 <a:spcPct val="100000"/>
               </a:lnSpc>
@@ -9690,7 +9692,7 @@
             </a:endParaRPr>
           </a:p>
           <a:p>
-            <a:pPr lvl="1" marL="864000" indent="-323280">
+            <a:pPr lvl="1" marL="864000" indent="-322920">
               <a:lnSpc>
                 <a:spcPct val="100000"/>
               </a:lnSpc>
@@ -9716,7 +9718,7 @@
             </a:endParaRPr>
           </a:p>
           <a:p>
-            <a:pPr lvl="2" marL="1296000" indent="-287280">
+            <a:pPr lvl="2" marL="1296000" indent="-286920">
               <a:lnSpc>
                 <a:spcPct val="100000"/>
               </a:lnSpc>
@@ -9742,7 +9744,7 @@
             </a:endParaRPr>
           </a:p>
           <a:p>
-            <a:pPr lvl="1" marL="864000" indent="-323280">
+            <a:pPr lvl="1" marL="864000" indent="-322920">
               <a:lnSpc>
                 <a:spcPct val="100000"/>
               </a:lnSpc>
@@ -9768,7 +9770,7 @@
             </a:endParaRPr>
           </a:p>
           <a:p>
-            <a:pPr lvl="2" marL="1296000" indent="-287280">
+            <a:pPr lvl="2" marL="1296000" indent="-286920">
               <a:lnSpc>
                 <a:spcPct val="100000"/>
               </a:lnSpc>
@@ -9794,7 +9796,7 @@
             </a:endParaRPr>
           </a:p>
           <a:p>
-            <a:pPr lvl="3" marL="1728000" indent="-215280">
+            <a:pPr lvl="3" marL="1728000" indent="-214920">
               <a:lnSpc>
                 <a:spcPct val="100000"/>
               </a:lnSpc>
@@ -9836,7 +9838,7 @@
             </a:endParaRPr>
           </a:p>
           <a:p>
-            <a:pPr lvl="3" marL="1728000" indent="-215280">
+            <a:pPr lvl="3" marL="1728000" indent="-214920">
               <a:lnSpc>
                 <a:spcPct val="100000"/>
               </a:lnSpc>
@@ -9878,7 +9880,7 @@
             </a:endParaRPr>
           </a:p>
           <a:p>
-            <a:pPr lvl="4" marL="2160000" indent="-215280">
+            <a:pPr lvl="4" marL="2160000" indent="-214920">
               <a:lnSpc>
                 <a:spcPct val="100000"/>
               </a:lnSpc>
@@ -9963,7 +9965,7 @@
         <p:spPr>
           <a:xfrm>
             <a:off x="504000" y="301320"/>
-            <a:ext cx="9070920" cy="1261440"/>
+            <a:ext cx="9070560" cy="1261080"/>
           </a:xfrm>
           <a:prstGeom prst="rect">
             <a:avLst/>
@@ -10012,7 +10014,7 @@
         <p:spPr>
           <a:xfrm>
             <a:off x="504000" y="1769040"/>
-            <a:ext cx="9070920" cy="4383720"/>
+            <a:ext cx="9070560" cy="4383360"/>
           </a:xfrm>
           <a:prstGeom prst="rect">
             <a:avLst/>
@@ -10031,7 +10033,7 @@
         <p:txBody>
           <a:bodyPr lIns="0" rIns="0" tIns="0" bIns="0"/>
           <a:p>
-            <a:pPr marL="432000" indent="-323280">
+            <a:pPr marL="432000" indent="-322920">
               <a:lnSpc>
                 <a:spcPct val="100000"/>
               </a:lnSpc>
@@ -10057,7 +10059,7 @@
             </a:endParaRPr>
           </a:p>
           <a:p>
-            <a:pPr marL="432000" indent="-323280">
+            <a:pPr marL="432000" indent="-322920">
               <a:lnSpc>
                 <a:spcPct val="100000"/>
               </a:lnSpc>
@@ -10142,7 +10144,7 @@
         <p:spPr>
           <a:xfrm>
             <a:off x="1372320" y="1369440"/>
-            <a:ext cx="1632960" cy="1331640"/>
+            <a:ext cx="1632600" cy="1331280"/>
           </a:xfrm>
           <a:prstGeom prst="flowChartMagneticDisk">
             <a:avLst/>
@@ -10172,7 +10174,7 @@
         <p:spPr>
           <a:xfrm>
             <a:off x="6991920" y="1369440"/>
-            <a:ext cx="1632960" cy="1331640"/>
+            <a:ext cx="1632600" cy="1331280"/>
           </a:xfrm>
           <a:prstGeom prst="flowChartMagneticDisk">
             <a:avLst/>
@@ -10202,7 +10204,7 @@
         <p:spPr>
           <a:xfrm>
             <a:off x="1633680" y="851040"/>
-            <a:ext cx="1044720" cy="297000"/>
+            <a:ext cx="1044360" cy="296640"/>
           </a:xfrm>
           <a:prstGeom prst="rect">
             <a:avLst/>
@@ -10246,7 +10248,7 @@
         <p:spPr>
           <a:xfrm>
             <a:off x="7253280" y="844560"/>
-            <a:ext cx="1240920" cy="301680"/>
+            <a:ext cx="1240560" cy="301320"/>
           </a:xfrm>
           <a:prstGeom prst="rect">
             <a:avLst/>
@@ -10318,7 +10320,7 @@
         <p:spPr>
           <a:xfrm>
             <a:off x="7253280" y="3916800"/>
-            <a:ext cx="1240920" cy="301680"/>
+            <a:ext cx="1240560" cy="301320"/>
           </a:xfrm>
           <a:prstGeom prst="rect">
             <a:avLst/>
@@ -10411,7 +10413,7 @@
         <p:spPr>
           <a:xfrm>
             <a:off x="504000" y="2743200"/>
-            <a:ext cx="9051840" cy="2137680"/>
+            <a:ext cx="9051480" cy="2137320"/>
           </a:xfrm>
           <a:prstGeom prst="rect">
             <a:avLst/>
@@ -10555,7 +10557,7 @@
         <p:spPr>
           <a:xfrm>
             <a:off x="504000" y="301320"/>
-            <a:ext cx="9070920" cy="1261440"/>
+            <a:ext cx="9070560" cy="1261080"/>
           </a:xfrm>
           <a:prstGeom prst="rect">
             <a:avLst/>
@@ -10604,7 +10606,7 @@
         <p:spPr>
           <a:xfrm>
             <a:off x="504000" y="1769040"/>
-            <a:ext cx="9070920" cy="4383720"/>
+            <a:ext cx="9070560" cy="4383360"/>
           </a:xfrm>
           <a:prstGeom prst="rect">
             <a:avLst/>
@@ -10623,7 +10625,7 @@
         <p:txBody>
           <a:bodyPr lIns="0" rIns="0" tIns="0" bIns="0"/>
           <a:p>
-            <a:pPr marL="432000" indent="-323280">
+            <a:pPr marL="432000" indent="-322920">
               <a:lnSpc>
                 <a:spcPct val="100000"/>
               </a:lnSpc>
@@ -10659,7 +10661,7 @@
         <p:spPr>
           <a:xfrm>
             <a:off x="548640" y="4754880"/>
-            <a:ext cx="9192600" cy="1366920"/>
+            <a:ext cx="9192240" cy="1366560"/>
           </a:xfrm>
           <a:prstGeom prst="rect">
             <a:avLst/>
@@ -10882,7 +10884,7 @@
         <p:spPr>
           <a:xfrm>
             <a:off x="1372320" y="1369440"/>
-            <a:ext cx="1632960" cy="1331640"/>
+            <a:ext cx="1632600" cy="1331280"/>
           </a:xfrm>
           <a:prstGeom prst="flowChartMagneticDisk">
             <a:avLst/>
@@ -10912,7 +10914,7 @@
         <p:spPr>
           <a:xfrm>
             <a:off x="6991920" y="1369440"/>
-            <a:ext cx="1632960" cy="1331640"/>
+            <a:ext cx="1632600" cy="1331280"/>
           </a:xfrm>
           <a:prstGeom prst="flowChartMagneticDisk">
             <a:avLst/>
@@ -10942,7 +10944,7 @@
         <p:spPr>
           <a:xfrm>
             <a:off x="1633680" y="851040"/>
-            <a:ext cx="1044720" cy="297000"/>
+            <a:ext cx="1044360" cy="296640"/>
           </a:xfrm>
           <a:prstGeom prst="rect">
             <a:avLst/>
@@ -10986,7 +10988,7 @@
         <p:spPr>
           <a:xfrm>
             <a:off x="7253280" y="844560"/>
-            <a:ext cx="1240920" cy="301680"/>
+            <a:ext cx="1240560" cy="301320"/>
           </a:xfrm>
           <a:prstGeom prst="rect">
             <a:avLst/>
@@ -11058,7 +11060,7 @@
         <p:spPr>
           <a:xfrm>
             <a:off x="7253280" y="3916800"/>
-            <a:ext cx="1240920" cy="301680"/>
+            <a:ext cx="1240560" cy="301320"/>
           </a:xfrm>
           <a:prstGeom prst="rect">
             <a:avLst/>
@@ -11130,7 +11132,7 @@
         <p:spPr>
           <a:xfrm>
             <a:off x="4508640" y="1591560"/>
-            <a:ext cx="1044720" cy="297000"/>
+            <a:ext cx="1044360" cy="296640"/>
           </a:xfrm>
           <a:prstGeom prst="rect">
             <a:avLst/>
@@ -11223,7 +11225,7 @@
         <p:spPr>
           <a:xfrm>
             <a:off x="504000" y="301320"/>
-            <a:ext cx="9070920" cy="1261440"/>
+            <a:ext cx="9070560" cy="1261080"/>
           </a:xfrm>
           <a:prstGeom prst="rect">
             <a:avLst/>
@@ -11272,7 +11274,7 @@
         <p:spPr>
           <a:xfrm>
             <a:off x="504000" y="1769040"/>
-            <a:ext cx="9070920" cy="4383720"/>
+            <a:ext cx="9070560" cy="4383360"/>
           </a:xfrm>
           <a:prstGeom prst="rect">
             <a:avLst/>
@@ -11291,7 +11293,7 @@
         <p:txBody>
           <a:bodyPr lIns="0" rIns="0" tIns="0" bIns="0"/>
           <a:p>
-            <a:pPr marL="432000" indent="-323280">
+            <a:pPr marL="432000" indent="-322920">
               <a:lnSpc>
                 <a:spcPct val="100000"/>
               </a:lnSpc>
@@ -11317,7 +11319,7 @@
             </a:endParaRPr>
           </a:p>
           <a:p>
-            <a:pPr marL="432000" indent="-323280">
+            <a:pPr marL="432000" indent="-322920">
               <a:lnSpc>
                 <a:spcPct val="100000"/>
               </a:lnSpc>
@@ -11353,7 +11355,7 @@
         <p:spPr>
           <a:xfrm>
             <a:off x="1503360" y="3146760"/>
-            <a:ext cx="6268320" cy="1881720"/>
+            <a:ext cx="6267960" cy="1881360"/>
           </a:xfrm>
           <a:prstGeom prst="rect">
             <a:avLst/>
@@ -11546,7 +11548,7 @@
         <p:spPr>
           <a:xfrm>
             <a:off x="504000" y="301320"/>
-            <a:ext cx="9070920" cy="1261440"/>
+            <a:ext cx="9070560" cy="1261080"/>
           </a:xfrm>
           <a:prstGeom prst="rect">
             <a:avLst/>
@@ -11595,7 +11597,7 @@
         <p:spPr>
           <a:xfrm>
             <a:off x="1274760" y="1563480"/>
-            <a:ext cx="8300160" cy="5620320"/>
+            <a:ext cx="8299800" cy="5619960"/>
           </a:xfrm>
           <a:prstGeom prst="rect">
             <a:avLst/>
@@ -11998,7 +12000,7 @@
         <p:spPr>
           <a:xfrm>
             <a:off x="504000" y="301320"/>
-            <a:ext cx="9070920" cy="1261440"/>
+            <a:ext cx="9070560" cy="1261080"/>
           </a:xfrm>
           <a:prstGeom prst="rect">
             <a:avLst/>
@@ -12047,7 +12049,7 @@
         <p:spPr>
           <a:xfrm>
             <a:off x="1435680" y="2293200"/>
-            <a:ext cx="7304400" cy="2905560"/>
+            <a:ext cx="7304040" cy="2905200"/>
           </a:xfrm>
           <a:prstGeom prst="rect">
             <a:avLst/>
@@ -12408,7 +12410,7 @@
         <p:spPr>
           <a:xfrm>
             <a:off x="3749040" y="365760"/>
-            <a:ext cx="1462320" cy="345600"/>
+            <a:ext cx="1461960" cy="345240"/>
           </a:xfrm>
           <a:prstGeom prst="rect">
             <a:avLst/>
@@ -12501,7 +12503,7 @@
         <p:spPr>
           <a:xfrm>
             <a:off x="7271640" y="6676200"/>
-            <a:ext cx="587520" cy="332280"/>
+            <a:ext cx="587160" cy="331920"/>
           </a:xfrm>
           <a:prstGeom prst="ellipse">
             <a:avLst/>
@@ -12531,7 +12533,7 @@
         <p:spPr>
           <a:xfrm>
             <a:off x="7253280" y="5922000"/>
-            <a:ext cx="587520" cy="332280"/>
+            <a:ext cx="587160" cy="331920"/>
           </a:xfrm>
           <a:prstGeom prst="ellipse">
             <a:avLst/>
@@ -12561,7 +12563,7 @@
         <p:spPr>
           <a:xfrm>
             <a:off x="7253280" y="5181840"/>
-            <a:ext cx="587520" cy="332280"/>
+            <a:ext cx="587160" cy="331920"/>
           </a:xfrm>
           <a:prstGeom prst="ellipse">
             <a:avLst/>
@@ -12591,7 +12593,7 @@
         <p:spPr>
           <a:xfrm>
             <a:off x="7253280" y="4441680"/>
-            <a:ext cx="587520" cy="332280"/>
+            <a:ext cx="587160" cy="331920"/>
           </a:xfrm>
           <a:prstGeom prst="ellipse">
             <a:avLst/>
@@ -12705,7 +12707,7 @@
         <p:spPr>
           <a:xfrm>
             <a:off x="2631960" y="6676200"/>
-            <a:ext cx="587520" cy="332280"/>
+            <a:ext cx="587160" cy="331920"/>
           </a:xfrm>
           <a:prstGeom prst="ellipse">
             <a:avLst/>
@@ -12735,7 +12737,7 @@
         <p:spPr>
           <a:xfrm>
             <a:off x="2613600" y="5922000"/>
-            <a:ext cx="587520" cy="332280"/>
+            <a:ext cx="587160" cy="331920"/>
           </a:xfrm>
           <a:prstGeom prst="ellipse">
             <a:avLst/>
@@ -12765,7 +12767,7 @@
         <p:spPr>
           <a:xfrm>
             <a:off x="2613600" y="5181840"/>
-            <a:ext cx="587520" cy="332280"/>
+            <a:ext cx="587160" cy="331920"/>
           </a:xfrm>
           <a:prstGeom prst="ellipse">
             <a:avLst/>
@@ -12795,7 +12797,7 @@
         <p:spPr>
           <a:xfrm>
             <a:off x="2613600" y="4441680"/>
-            <a:ext cx="587520" cy="332280"/>
+            <a:ext cx="587160" cy="331920"/>
           </a:xfrm>
           <a:prstGeom prst="ellipse">
             <a:avLst/>
@@ -12909,7 +12911,7 @@
         <p:spPr>
           <a:xfrm>
             <a:off x="2613600" y="3738240"/>
-            <a:ext cx="587520" cy="332280"/>
+            <a:ext cx="587160" cy="331920"/>
           </a:xfrm>
           <a:prstGeom prst="ellipse">
             <a:avLst/>
@@ -12940,7 +12942,7 @@
         <p:spPr>
           <a:xfrm>
             <a:off x="130680" y="3627000"/>
-            <a:ext cx="1959840" cy="297000"/>
+            <a:ext cx="1959480" cy="296640"/>
           </a:xfrm>
           <a:prstGeom prst="rect">
             <a:avLst/>
@@ -13033,7 +13035,7 @@
         <p:spPr>
           <a:xfrm>
             <a:off x="504000" y="301320"/>
-            <a:ext cx="9070920" cy="1261440"/>
+            <a:ext cx="9070560" cy="1261080"/>
           </a:xfrm>
           <a:prstGeom prst="rect">
             <a:avLst/>
@@ -13082,7 +13084,7 @@
         <p:spPr>
           <a:xfrm>
             <a:off x="1920240" y="2103120"/>
-            <a:ext cx="5195520" cy="2410920"/>
+            <a:ext cx="5195160" cy="2410560"/>
           </a:xfrm>
           <a:prstGeom prst="rect">
             <a:avLst/>
@@ -13335,7 +13337,7 @@
         <p:spPr>
           <a:xfrm>
             <a:off x="7271640" y="6676200"/>
-            <a:ext cx="587520" cy="332280"/>
+            <a:ext cx="587160" cy="331920"/>
           </a:xfrm>
           <a:prstGeom prst="ellipse">
             <a:avLst/>
@@ -13365,7 +13367,7 @@
         <p:spPr>
           <a:xfrm>
             <a:off x="7253280" y="5922000"/>
-            <a:ext cx="587520" cy="332280"/>
+            <a:ext cx="587160" cy="331920"/>
           </a:xfrm>
           <a:prstGeom prst="ellipse">
             <a:avLst/>
@@ -13395,7 +13397,7 @@
         <p:spPr>
           <a:xfrm>
             <a:off x="7253280" y="5181840"/>
-            <a:ext cx="587520" cy="332280"/>
+            <a:ext cx="587160" cy="331920"/>
           </a:xfrm>
           <a:prstGeom prst="ellipse">
             <a:avLst/>
@@ -13425,7 +13427,7 @@
         <p:spPr>
           <a:xfrm>
             <a:off x="7253280" y="4441680"/>
-            <a:ext cx="587520" cy="332280"/>
+            <a:ext cx="587160" cy="331920"/>
           </a:xfrm>
           <a:prstGeom prst="ellipse">
             <a:avLst/>
@@ -13539,7 +13541,7 @@
         <p:spPr>
           <a:xfrm>
             <a:off x="2631960" y="6676200"/>
-            <a:ext cx="587520" cy="332280"/>
+            <a:ext cx="587160" cy="331920"/>
           </a:xfrm>
           <a:prstGeom prst="ellipse">
             <a:avLst/>
@@ -13569,7 +13571,7 @@
         <p:spPr>
           <a:xfrm>
             <a:off x="2613600" y="5922000"/>
-            <a:ext cx="587520" cy="332280"/>
+            <a:ext cx="587160" cy="331920"/>
           </a:xfrm>
           <a:prstGeom prst="ellipse">
             <a:avLst/>
@@ -13599,7 +13601,7 @@
         <p:spPr>
           <a:xfrm>
             <a:off x="2613600" y="5181840"/>
-            <a:ext cx="587520" cy="332280"/>
+            <a:ext cx="587160" cy="331920"/>
           </a:xfrm>
           <a:prstGeom prst="ellipse">
             <a:avLst/>
@@ -13629,7 +13631,7 @@
         <p:spPr>
           <a:xfrm>
             <a:off x="2613600" y="4441680"/>
-            <a:ext cx="587520" cy="332280"/>
+            <a:ext cx="587160" cy="331920"/>
           </a:xfrm>
           <a:prstGeom prst="ellipse">
             <a:avLst/>
@@ -13743,7 +13745,7 @@
         <p:spPr>
           <a:xfrm>
             <a:off x="2613600" y="3738240"/>
-            <a:ext cx="587520" cy="332280"/>
+            <a:ext cx="587160" cy="331920"/>
           </a:xfrm>
           <a:prstGeom prst="ellipse">
             <a:avLst/>
@@ -13773,7 +13775,7 @@
         <p:spPr>
           <a:xfrm>
             <a:off x="130680" y="3627000"/>
-            <a:ext cx="1959840" cy="297000"/>
+            <a:ext cx="1959480" cy="296640"/>
           </a:xfrm>
           <a:prstGeom prst="rect">
             <a:avLst/>
@@ -13866,7 +13868,7 @@
         <p:spPr>
           <a:xfrm>
             <a:off x="504000" y="301320"/>
-            <a:ext cx="9070920" cy="1261440"/>
+            <a:ext cx="9070560" cy="1261080"/>
           </a:xfrm>
           <a:prstGeom prst="rect">
             <a:avLst/>
@@ -13915,7 +13917,7 @@
         <p:spPr>
           <a:xfrm>
             <a:off x="1993320" y="1985400"/>
-            <a:ext cx="6189120" cy="3673440"/>
+            <a:ext cx="6188760" cy="3673080"/>
           </a:xfrm>
           <a:prstGeom prst="rect">
             <a:avLst/>
@@ -14223,7 +14225,7 @@
         <p:spPr>
           <a:xfrm>
             <a:off x="7271640" y="6676200"/>
-            <a:ext cx="587520" cy="332280"/>
+            <a:ext cx="587160" cy="331920"/>
           </a:xfrm>
           <a:prstGeom prst="ellipse">
             <a:avLst/>
@@ -14253,7 +14255,7 @@
         <p:spPr>
           <a:xfrm>
             <a:off x="7253280" y="5922000"/>
-            <a:ext cx="587520" cy="332280"/>
+            <a:ext cx="587160" cy="331920"/>
           </a:xfrm>
           <a:prstGeom prst="ellipse">
             <a:avLst/>
@@ -14283,7 +14285,7 @@
         <p:spPr>
           <a:xfrm>
             <a:off x="7253280" y="5181840"/>
-            <a:ext cx="587520" cy="332280"/>
+            <a:ext cx="587160" cy="331920"/>
           </a:xfrm>
           <a:prstGeom prst="ellipse">
             <a:avLst/>
@@ -14313,7 +14315,7 @@
         <p:spPr>
           <a:xfrm>
             <a:off x="7253280" y="4441680"/>
-            <a:ext cx="587520" cy="332280"/>
+            <a:ext cx="587160" cy="331920"/>
           </a:xfrm>
           <a:prstGeom prst="ellipse">
             <a:avLst/>
@@ -14427,7 +14429,7 @@
         <p:spPr>
           <a:xfrm>
             <a:off x="2631960" y="6676200"/>
-            <a:ext cx="587520" cy="332280"/>
+            <a:ext cx="587160" cy="331920"/>
           </a:xfrm>
           <a:prstGeom prst="ellipse">
             <a:avLst/>
@@ -14457,7 +14459,7 @@
         <p:spPr>
           <a:xfrm>
             <a:off x="2613600" y="5922000"/>
-            <a:ext cx="587520" cy="332280"/>
+            <a:ext cx="587160" cy="331920"/>
           </a:xfrm>
           <a:prstGeom prst="ellipse">
             <a:avLst/>
@@ -14487,7 +14489,7 @@
         <p:spPr>
           <a:xfrm>
             <a:off x="2613600" y="5181840"/>
-            <a:ext cx="587520" cy="332280"/>
+            <a:ext cx="587160" cy="331920"/>
           </a:xfrm>
           <a:prstGeom prst="ellipse">
             <a:avLst/>
@@ -14517,7 +14519,7 @@
         <p:spPr>
           <a:xfrm>
             <a:off x="2613600" y="4441680"/>
-            <a:ext cx="587520" cy="332280"/>
+            <a:ext cx="587160" cy="331920"/>
           </a:xfrm>
           <a:prstGeom prst="ellipse">
             <a:avLst/>
@@ -14631,7 +14633,7 @@
         <p:spPr>
           <a:xfrm>
             <a:off x="2613600" y="3738240"/>
-            <a:ext cx="587520" cy="332280"/>
+            <a:ext cx="587160" cy="331920"/>
           </a:xfrm>
           <a:prstGeom prst="ellipse">
             <a:avLst/>
@@ -14661,7 +14663,7 @@
         <p:spPr>
           <a:xfrm>
             <a:off x="392040" y="3886200"/>
-            <a:ext cx="1959840" cy="297000"/>
+            <a:ext cx="1959480" cy="296640"/>
           </a:xfrm>
           <a:prstGeom prst="rect">
             <a:avLst/>
@@ -14705,7 +14707,7 @@
         <p:spPr>
           <a:xfrm>
             <a:off x="2417760" y="3590280"/>
-            <a:ext cx="587520" cy="332280"/>
+            <a:ext cx="587160" cy="331920"/>
           </a:xfrm>
           <a:prstGeom prst="ellipse">
             <a:avLst/>
@@ -14735,7 +14737,7 @@
         <p:spPr>
           <a:xfrm>
             <a:off x="2613600" y="3738240"/>
-            <a:ext cx="587520" cy="332280"/>
+            <a:ext cx="587160" cy="331920"/>
           </a:xfrm>
           <a:prstGeom prst="ellipse">
             <a:avLst/>
@@ -14765,7 +14767,7 @@
         <p:spPr>
           <a:xfrm>
             <a:off x="0" y="3294000"/>
-            <a:ext cx="2678400" cy="297000"/>
+            <a:ext cx="2678040" cy="296640"/>
           </a:xfrm>
           <a:prstGeom prst="rect">
             <a:avLst/>
@@ -14858,7 +14860,7 @@
         <p:spPr>
           <a:xfrm>
             <a:off x="504000" y="301320"/>
-            <a:ext cx="9070920" cy="1261440"/>
+            <a:ext cx="9070560" cy="1261080"/>
           </a:xfrm>
           <a:prstGeom prst="rect">
             <a:avLst/>
@@ -14907,7 +14909,7 @@
         <p:spPr>
           <a:xfrm>
             <a:off x="1645920" y="1678320"/>
-            <a:ext cx="7918920" cy="5880960"/>
+            <a:ext cx="7918560" cy="5880600"/>
           </a:xfrm>
           <a:prstGeom prst="rect">
             <a:avLst/>
@@ -15525,7 +15527,7 @@
         <p:spPr>
           <a:xfrm>
             <a:off x="7271640" y="6676200"/>
-            <a:ext cx="587520" cy="332280"/>
+            <a:ext cx="587160" cy="331920"/>
           </a:xfrm>
           <a:prstGeom prst="ellipse">
             <a:avLst/>
@@ -15555,7 +15557,7 @@
         <p:spPr>
           <a:xfrm>
             <a:off x="7253280" y="5922000"/>
-            <a:ext cx="587520" cy="332280"/>
+            <a:ext cx="587160" cy="331920"/>
           </a:xfrm>
           <a:prstGeom prst="ellipse">
             <a:avLst/>
@@ -15585,7 +15587,7 @@
         <p:spPr>
           <a:xfrm>
             <a:off x="7253280" y="5181840"/>
-            <a:ext cx="587520" cy="332280"/>
+            <a:ext cx="587160" cy="331920"/>
           </a:xfrm>
           <a:prstGeom prst="ellipse">
             <a:avLst/>
@@ -15615,7 +15617,7 @@
         <p:spPr>
           <a:xfrm>
             <a:off x="7253280" y="4441680"/>
-            <a:ext cx="587520" cy="332280"/>
+            <a:ext cx="587160" cy="331920"/>
           </a:xfrm>
           <a:prstGeom prst="ellipse">
             <a:avLst/>
@@ -15729,7 +15731,7 @@
         <p:spPr>
           <a:xfrm>
             <a:off x="2631960" y="6676200"/>
-            <a:ext cx="587520" cy="332280"/>
+            <a:ext cx="587160" cy="331920"/>
           </a:xfrm>
           <a:prstGeom prst="ellipse">
             <a:avLst/>
@@ -15759,7 +15761,7 @@
         <p:spPr>
           <a:xfrm>
             <a:off x="2613600" y="5922000"/>
-            <a:ext cx="587520" cy="332280"/>
+            <a:ext cx="587160" cy="331920"/>
           </a:xfrm>
           <a:prstGeom prst="ellipse">
             <a:avLst/>
@@ -15789,7 +15791,7 @@
         <p:spPr>
           <a:xfrm>
             <a:off x="2613600" y="5181840"/>
-            <a:ext cx="587520" cy="332280"/>
+            <a:ext cx="587160" cy="331920"/>
           </a:xfrm>
           <a:prstGeom prst="ellipse">
             <a:avLst/>
@@ -15819,7 +15821,7 @@
         <p:spPr>
           <a:xfrm>
             <a:off x="2613600" y="4441680"/>
-            <a:ext cx="587520" cy="332280"/>
+            <a:ext cx="587160" cy="331920"/>
           </a:xfrm>
           <a:prstGeom prst="ellipse">
             <a:avLst/>
@@ -15933,7 +15935,7 @@
         <p:spPr>
           <a:xfrm>
             <a:off x="2613600" y="3738240"/>
-            <a:ext cx="587520" cy="332280"/>
+            <a:ext cx="587160" cy="331920"/>
           </a:xfrm>
           <a:prstGeom prst="ellipse">
             <a:avLst/>
@@ -15963,7 +15965,7 @@
         <p:spPr>
           <a:xfrm>
             <a:off x="0" y="3553200"/>
-            <a:ext cx="1959840" cy="297000"/>
+            <a:ext cx="1959480" cy="296640"/>
           </a:xfrm>
           <a:prstGeom prst="rect">
             <a:avLst/>
@@ -16007,7 +16009,7 @@
         <p:spPr>
           <a:xfrm>
             <a:off x="2613600" y="3738240"/>
-            <a:ext cx="587520" cy="332280"/>
+            <a:ext cx="587160" cy="331920"/>
           </a:xfrm>
           <a:prstGeom prst="ellipse">
             <a:avLst/>
@@ -16037,7 +16039,7 @@
         <p:spPr>
           <a:xfrm>
             <a:off x="0" y="3331080"/>
-            <a:ext cx="3266640" cy="297000"/>
+            <a:ext cx="3266280" cy="296640"/>
           </a:xfrm>
           <a:prstGeom prst="rect">
             <a:avLst/>
@@ -16130,7 +16132,7 @@
         <p:spPr>
           <a:xfrm>
             <a:off x="7271640" y="6676200"/>
-            <a:ext cx="587520" cy="332280"/>
+            <a:ext cx="587160" cy="331920"/>
           </a:xfrm>
           <a:prstGeom prst="ellipse">
             <a:avLst/>
@@ -16160,7 +16162,7 @@
         <p:spPr>
           <a:xfrm>
             <a:off x="7253280" y="5922000"/>
-            <a:ext cx="587520" cy="332280"/>
+            <a:ext cx="587160" cy="331920"/>
           </a:xfrm>
           <a:prstGeom prst="ellipse">
             <a:avLst/>
@@ -16190,7 +16192,7 @@
         <p:spPr>
           <a:xfrm>
             <a:off x="7253280" y="5181840"/>
-            <a:ext cx="587520" cy="332280"/>
+            <a:ext cx="587160" cy="331920"/>
           </a:xfrm>
           <a:prstGeom prst="ellipse">
             <a:avLst/>
@@ -16220,7 +16222,7 @@
         <p:spPr>
           <a:xfrm>
             <a:off x="7253280" y="4441680"/>
-            <a:ext cx="587520" cy="332280"/>
+            <a:ext cx="587160" cy="331920"/>
           </a:xfrm>
           <a:prstGeom prst="ellipse">
             <a:avLst/>
@@ -16334,7 +16336,7 @@
         <p:spPr>
           <a:xfrm>
             <a:off x="2631960" y="6676200"/>
-            <a:ext cx="587520" cy="332280"/>
+            <a:ext cx="587160" cy="331920"/>
           </a:xfrm>
           <a:prstGeom prst="ellipse">
             <a:avLst/>
@@ -16364,7 +16366,7 @@
         <p:spPr>
           <a:xfrm>
             <a:off x="2613600" y="5922000"/>
-            <a:ext cx="587520" cy="332280"/>
+            <a:ext cx="587160" cy="331920"/>
           </a:xfrm>
           <a:prstGeom prst="ellipse">
             <a:avLst/>
@@ -16394,7 +16396,7 @@
         <p:spPr>
           <a:xfrm>
             <a:off x="2613600" y="5181840"/>
-            <a:ext cx="587520" cy="332280"/>
+            <a:ext cx="587160" cy="331920"/>
           </a:xfrm>
           <a:prstGeom prst="ellipse">
             <a:avLst/>
@@ -16424,7 +16426,7 @@
         <p:spPr>
           <a:xfrm>
             <a:off x="2613600" y="4441680"/>
-            <a:ext cx="587520" cy="332280"/>
+            <a:ext cx="587160" cy="331920"/>
           </a:xfrm>
           <a:prstGeom prst="ellipse">
             <a:avLst/>
@@ -16538,7 +16540,7 @@
         <p:spPr>
           <a:xfrm>
             <a:off x="2613600" y="3701160"/>
-            <a:ext cx="587520" cy="332280"/>
+            <a:ext cx="587160" cy="331920"/>
           </a:xfrm>
           <a:prstGeom prst="ellipse">
             <a:avLst/>
@@ -16645,7 +16647,7 @@
         <p:spPr>
           <a:xfrm>
             <a:off x="504000" y="301320"/>
-            <a:ext cx="9070920" cy="1261440"/>
+            <a:ext cx="9070560" cy="1261080"/>
           </a:xfrm>
           <a:prstGeom prst="rect">
             <a:avLst/>
@@ -16694,7 +16696,7 @@
         <p:spPr>
           <a:xfrm>
             <a:off x="2383560" y="3391560"/>
-            <a:ext cx="6302520" cy="1625760"/>
+            <a:ext cx="6302160" cy="1625400"/>
           </a:xfrm>
           <a:prstGeom prst="rect">
             <a:avLst/>
@@ -16872,7 +16874,7 @@
         <p:spPr>
           <a:xfrm>
             <a:off x="504000" y="301320"/>
-            <a:ext cx="9070920" cy="1261440"/>
+            <a:ext cx="9070560" cy="1261080"/>
           </a:xfrm>
           <a:prstGeom prst="rect">
             <a:avLst/>
@@ -16931,7 +16933,7 @@
         <p:spPr>
           <a:xfrm>
             <a:off x="1111680" y="2369520"/>
-            <a:ext cx="7952400" cy="4122000"/>
+            <a:ext cx="7952040" cy="4121640"/>
           </a:xfrm>
           <a:prstGeom prst="rect">
             <a:avLst/>
@@ -17947,7 +17949,7 @@
         <p:spPr>
           <a:xfrm>
             <a:off x="2926080" y="182880"/>
-            <a:ext cx="4022640" cy="345600"/>
+            <a:ext cx="4022280" cy="345240"/>
           </a:xfrm>
           <a:prstGeom prst="rect">
             <a:avLst/>
@@ -18040,7 +18042,7 @@
         <p:spPr>
           <a:xfrm>
             <a:off x="504000" y="301320"/>
-            <a:ext cx="9070920" cy="1261440"/>
+            <a:ext cx="9070560" cy="1261080"/>
           </a:xfrm>
           <a:prstGeom prst="rect">
             <a:avLst/>
@@ -18099,7 +18101,7 @@
         <p:spPr>
           <a:xfrm>
             <a:off x="2118960" y="1532880"/>
-            <a:ext cx="5937840" cy="4501440"/>
+            <a:ext cx="5937480" cy="4501080"/>
           </a:xfrm>
           <a:prstGeom prst="rect">
             <a:avLst/>
@@ -18517,7 +18519,7 @@
         <p:spPr>
           <a:xfrm>
             <a:off x="7272000" y="6675840"/>
-            <a:ext cx="587880" cy="332640"/>
+            <a:ext cx="587520" cy="332280"/>
           </a:xfrm>
           <a:prstGeom prst="ellipse">
             <a:avLst/>
@@ -18547,7 +18549,7 @@
         <p:spPr>
           <a:xfrm>
             <a:off x="7254000" y="5921640"/>
-            <a:ext cx="587880" cy="332640"/>
+            <a:ext cx="587520" cy="332280"/>
           </a:xfrm>
           <a:prstGeom prst="ellipse">
             <a:avLst/>
@@ -18577,7 +18579,7 @@
         <p:spPr>
           <a:xfrm>
             <a:off x="7254000" y="5181480"/>
-            <a:ext cx="587880" cy="332640"/>
+            <a:ext cx="587520" cy="332280"/>
           </a:xfrm>
           <a:prstGeom prst="ellipse">
             <a:avLst/>
@@ -18607,7 +18609,7 @@
         <p:spPr>
           <a:xfrm>
             <a:off x="7254000" y="4441320"/>
-            <a:ext cx="587880" cy="332640"/>
+            <a:ext cx="587520" cy="332280"/>
           </a:xfrm>
           <a:prstGeom prst="ellipse">
             <a:avLst/>
@@ -18721,7 +18723,7 @@
         <p:spPr>
           <a:xfrm>
             <a:off x="2631960" y="6675840"/>
-            <a:ext cx="587880" cy="332640"/>
+            <a:ext cx="587520" cy="332280"/>
           </a:xfrm>
           <a:prstGeom prst="ellipse">
             <a:avLst/>
@@ -18751,7 +18753,7 @@
         <p:spPr>
           <a:xfrm>
             <a:off x="2613960" y="5921640"/>
-            <a:ext cx="587880" cy="332640"/>
+            <a:ext cx="587520" cy="332280"/>
           </a:xfrm>
           <a:prstGeom prst="ellipse">
             <a:avLst/>
@@ -18781,7 +18783,7 @@
         <p:spPr>
           <a:xfrm>
             <a:off x="2613960" y="5181480"/>
-            <a:ext cx="587880" cy="332640"/>
+            <a:ext cx="587520" cy="332280"/>
           </a:xfrm>
           <a:prstGeom prst="ellipse">
             <a:avLst/>
@@ -18811,7 +18813,7 @@
         <p:spPr>
           <a:xfrm>
             <a:off x="2613960" y="4441320"/>
-            <a:ext cx="587880" cy="332640"/>
+            <a:ext cx="587520" cy="332280"/>
           </a:xfrm>
           <a:prstGeom prst="ellipse">
             <a:avLst/>
@@ -18925,7 +18927,7 @@
         <p:spPr>
           <a:xfrm>
             <a:off x="2613960" y="3738240"/>
-            <a:ext cx="587880" cy="332640"/>
+            <a:ext cx="587520" cy="332280"/>
           </a:xfrm>
           <a:prstGeom prst="ellipse">
             <a:avLst/>
@@ -18955,7 +18957,7 @@
         <p:spPr>
           <a:xfrm>
             <a:off x="3267360" y="4515120"/>
-            <a:ext cx="1960200" cy="297360"/>
+            <a:ext cx="1959840" cy="297000"/>
           </a:xfrm>
           <a:prstGeom prst="rect">
             <a:avLst/>
@@ -18976,7 +18978,11 @@
           <a:p>
             <a:r>
               <a:rPr b="0" lang="en-US" sz="1460" spc="-1" strike="noStrike">
+                <a:solidFill>
+                  <a:srgbClr val="000000"/>
+                </a:solidFill>
                 <a:latin typeface="Arial"/>
+                <a:ea typeface="DejaVu Sans"/>
               </a:rPr>
               <a:t>fb179</a:t>
             </a:r>
@@ -18995,7 +19001,7 @@
         <p:spPr>
           <a:xfrm>
             <a:off x="2613960" y="3738240"/>
-            <a:ext cx="587880" cy="332640"/>
+            <a:ext cx="587520" cy="332280"/>
           </a:xfrm>
           <a:prstGeom prst="ellipse">
             <a:avLst/>
@@ -19053,7 +19059,7 @@
         <p:spPr>
           <a:xfrm>
             <a:off x="2613960" y="2997720"/>
-            <a:ext cx="587880" cy="332640"/>
+            <a:ext cx="587520" cy="332280"/>
           </a:xfrm>
           <a:prstGeom prst="ellipse">
             <a:avLst/>
@@ -19111,7 +19117,7 @@
         <p:spPr>
           <a:xfrm>
             <a:off x="3267360" y="3812040"/>
-            <a:ext cx="1960200" cy="297360"/>
+            <a:ext cx="1959840" cy="297000"/>
           </a:xfrm>
           <a:prstGeom prst="rect">
             <a:avLst/>
@@ -19132,7 +19138,11 @@
           <a:p>
             <a:r>
               <a:rPr b="0" lang="en-US" sz="1460" spc="-1" strike="noStrike">
+                <a:solidFill>
+                  <a:srgbClr val="000000"/>
+                </a:solidFill>
                 <a:latin typeface="Arial"/>
+                <a:ea typeface="DejaVu Sans"/>
               </a:rPr>
               <a:t>7341a</a:t>
             </a:r>
@@ -19151,7 +19161,7 @@
         <p:spPr>
           <a:xfrm>
             <a:off x="3267360" y="3034800"/>
-            <a:ext cx="1960200" cy="297360"/>
+            <a:ext cx="1959840" cy="297000"/>
           </a:xfrm>
           <a:prstGeom prst="rect">
             <a:avLst/>
@@ -19172,7 +19182,11 @@
           <a:p>
             <a:r>
               <a:rPr b="0" lang="en-US" sz="1460" spc="-1" strike="noStrike">
+                <a:solidFill>
+                  <a:srgbClr val="000000"/>
+                </a:solidFill>
                 <a:latin typeface="Arial"/>
+                <a:ea typeface="DejaVu Sans"/>
               </a:rPr>
               <a:t>1df9e</a:t>
             </a:r>
@@ -19240,7 +19254,7 @@
         <p:spPr>
           <a:xfrm>
             <a:off x="504000" y="301320"/>
-            <a:ext cx="9070920" cy="1261440"/>
+            <a:ext cx="9070560" cy="1261080"/>
           </a:xfrm>
           <a:prstGeom prst="rect">
             <a:avLst/>
@@ -19289,7 +19303,7 @@
         <p:spPr>
           <a:xfrm>
             <a:off x="1463040" y="2286000"/>
-            <a:ext cx="7954560" cy="3303720"/>
+            <a:ext cx="7954200" cy="3303360"/>
           </a:xfrm>
           <a:prstGeom prst="rect">
             <a:avLst/>
@@ -19607,7 +19621,7 @@
         <p:spPr>
           <a:xfrm>
             <a:off x="504000" y="301320"/>
-            <a:ext cx="9070920" cy="1261440"/>
+            <a:ext cx="9070560" cy="1261080"/>
           </a:xfrm>
           <a:prstGeom prst="rect">
             <a:avLst/>
@@ -19666,7 +19680,7 @@
         <p:spPr>
           <a:xfrm>
             <a:off x="1482840" y="1188720"/>
-            <a:ext cx="8391960" cy="6308640"/>
+            <a:ext cx="8391600" cy="6308280"/>
           </a:xfrm>
           <a:prstGeom prst="rect">
             <a:avLst/>
@@ -19984,7 +19998,7 @@
         <p:spPr>
           <a:xfrm>
             <a:off x="7272000" y="6675840"/>
-            <a:ext cx="587880" cy="332640"/>
+            <a:ext cx="587520" cy="332280"/>
           </a:xfrm>
           <a:prstGeom prst="ellipse">
             <a:avLst/>
@@ -20014,7 +20028,7 @@
         <p:spPr>
           <a:xfrm>
             <a:off x="7254000" y="5921640"/>
-            <a:ext cx="587880" cy="332640"/>
+            <a:ext cx="587520" cy="332280"/>
           </a:xfrm>
           <a:prstGeom prst="ellipse">
             <a:avLst/>
@@ -20044,7 +20058,7 @@
         <p:spPr>
           <a:xfrm>
             <a:off x="7254000" y="5181480"/>
-            <a:ext cx="587880" cy="332640"/>
+            <a:ext cx="587520" cy="332280"/>
           </a:xfrm>
           <a:prstGeom prst="ellipse">
             <a:avLst/>
@@ -20074,7 +20088,7 @@
         <p:spPr>
           <a:xfrm>
             <a:off x="7254000" y="4441320"/>
-            <a:ext cx="587880" cy="332640"/>
+            <a:ext cx="587520" cy="332280"/>
           </a:xfrm>
           <a:prstGeom prst="ellipse">
             <a:avLst/>
@@ -20188,7 +20202,7 @@
         <p:spPr>
           <a:xfrm>
             <a:off x="2631960" y="6675840"/>
-            <a:ext cx="587880" cy="332640"/>
+            <a:ext cx="587520" cy="332280"/>
           </a:xfrm>
           <a:prstGeom prst="ellipse">
             <a:avLst/>
@@ -20218,7 +20232,7 @@
         <p:spPr>
           <a:xfrm>
             <a:off x="2613960" y="5921640"/>
-            <a:ext cx="587880" cy="332640"/>
+            <a:ext cx="587520" cy="332280"/>
           </a:xfrm>
           <a:prstGeom prst="ellipse">
             <a:avLst/>
@@ -20248,7 +20262,7 @@
         <p:spPr>
           <a:xfrm>
             <a:off x="2613960" y="5181480"/>
-            <a:ext cx="587880" cy="332640"/>
+            <a:ext cx="587520" cy="332280"/>
           </a:xfrm>
           <a:prstGeom prst="ellipse">
             <a:avLst/>
@@ -20278,7 +20292,7 @@
         <p:spPr>
           <a:xfrm>
             <a:off x="2613960" y="4441320"/>
-            <a:ext cx="587880" cy="332640"/>
+            <a:ext cx="587520" cy="332280"/>
           </a:xfrm>
           <a:prstGeom prst="ellipse">
             <a:avLst/>
@@ -20392,7 +20406,7 @@
         <p:spPr>
           <a:xfrm>
             <a:off x="2613960" y="3738240"/>
-            <a:ext cx="587880" cy="332640"/>
+            <a:ext cx="587520" cy="332280"/>
           </a:xfrm>
           <a:prstGeom prst="ellipse">
             <a:avLst/>
@@ -20422,7 +20436,7 @@
         <p:spPr>
           <a:xfrm>
             <a:off x="3267360" y="4515120"/>
-            <a:ext cx="1960200" cy="297360"/>
+            <a:ext cx="1959840" cy="297000"/>
           </a:xfrm>
           <a:prstGeom prst="rect">
             <a:avLst/>
@@ -20443,7 +20457,11 @@
           <a:p>
             <a:r>
               <a:rPr b="0" lang="en-US" sz="1460" spc="-1" strike="noStrike">
+                <a:solidFill>
+                  <a:srgbClr val="000000"/>
+                </a:solidFill>
                 <a:latin typeface="Arial"/>
+                <a:ea typeface="DejaVu Sans"/>
               </a:rPr>
               <a:t>fb179</a:t>
             </a:r>
@@ -20462,7 +20480,7 @@
         <p:spPr>
           <a:xfrm>
             <a:off x="2613960" y="3738240"/>
-            <a:ext cx="587880" cy="332640"/>
+            <a:ext cx="587520" cy="332280"/>
           </a:xfrm>
           <a:prstGeom prst="ellipse">
             <a:avLst/>
@@ -20520,7 +20538,7 @@
         <p:spPr>
           <a:xfrm>
             <a:off x="2679480" y="2997720"/>
-            <a:ext cx="587880" cy="332640"/>
+            <a:ext cx="587520" cy="332280"/>
           </a:xfrm>
           <a:prstGeom prst="ellipse">
             <a:avLst/>
@@ -20578,7 +20596,7 @@
         <p:spPr>
           <a:xfrm>
             <a:off x="3267360" y="3812040"/>
-            <a:ext cx="1960200" cy="297360"/>
+            <a:ext cx="1959840" cy="297000"/>
           </a:xfrm>
           <a:prstGeom prst="rect">
             <a:avLst/>
@@ -20599,7 +20617,11 @@
           <a:p>
             <a:r>
               <a:rPr b="0" lang="en-US" sz="1460" spc="-1" strike="noStrike">
+                <a:solidFill>
+                  <a:srgbClr val="000000"/>
+                </a:solidFill>
                 <a:latin typeface="Arial"/>
+                <a:ea typeface="DejaVu Sans"/>
               </a:rPr>
               <a:t>7341a</a:t>
             </a:r>
@@ -20618,7 +20640,7 @@
         <p:spPr>
           <a:xfrm>
             <a:off x="3267360" y="3034800"/>
-            <a:ext cx="1960200" cy="297360"/>
+            <a:ext cx="1959840" cy="297000"/>
           </a:xfrm>
           <a:prstGeom prst="rect">
             <a:avLst/>
@@ -20639,7 +20661,11 @@
           <a:p>
             <a:r>
               <a:rPr b="0" lang="en-US" sz="1460" spc="-1" strike="noStrike">
+                <a:solidFill>
+                  <a:srgbClr val="000000"/>
+                </a:solidFill>
                 <a:latin typeface="Arial"/>
+                <a:ea typeface="DejaVu Sans"/>
               </a:rPr>
               <a:t>1df9e</a:t>
             </a:r>
@@ -20686,7 +20712,7 @@
         <p:spPr>
           <a:xfrm>
             <a:off x="195840" y="4441320"/>
-            <a:ext cx="2025720" cy="332640"/>
+            <a:ext cx="2025360" cy="332280"/>
           </a:xfrm>
           <a:prstGeom prst="rect">
             <a:avLst/>
@@ -20707,7 +20733,11 @@
           <a:p>
             <a:r>
               <a:rPr b="0" lang="en-US" sz="1460" spc="-1" strike="noStrike">
+                <a:solidFill>
+                  <a:srgbClr val="000000"/>
+                </a:solidFill>
                 <a:latin typeface="Arial"/>
+                <a:ea typeface="DejaVu Sans"/>
               </a:rPr>
               <a:t>example.txt</a:t>
             </a:r>
@@ -20726,7 +20756,7 @@
         <p:spPr>
           <a:xfrm>
             <a:off x="2679480" y="2257560"/>
-            <a:ext cx="587880" cy="332640"/>
+            <a:ext cx="587520" cy="332280"/>
           </a:xfrm>
           <a:prstGeom prst="ellipse">
             <a:avLst/>
@@ -20756,7 +20786,7 @@
         <p:spPr>
           <a:xfrm>
             <a:off x="3267360" y="2294640"/>
-            <a:ext cx="1960200" cy="297360"/>
+            <a:ext cx="1959840" cy="297000"/>
           </a:xfrm>
           <a:prstGeom prst="rect">
             <a:avLst/>
@@ -20777,7 +20807,11 @@
           <a:p>
             <a:r>
               <a:rPr b="0" lang="en-US" sz="1460" spc="-1" strike="noStrike">
+                <a:solidFill>
+                  <a:srgbClr val="000000"/>
+                </a:solidFill>
                 <a:latin typeface="Arial"/>
+                <a:ea typeface="DejaVu Sans"/>
               </a:rPr>
               <a:t>27399</a:t>
             </a:r>
@@ -20796,7 +20830,7 @@
         <p:spPr>
           <a:xfrm flipV="1">
             <a:off x="1208880" y="2423520"/>
-            <a:ext cx="1470600" cy="2017080"/>
+            <a:ext cx="1470240" cy="2016720"/>
           </a:xfrm>
           <a:custGeom>
             <a:avLst/>
@@ -20887,7 +20921,7 @@
         <p:spPr>
           <a:xfrm>
             <a:off x="504000" y="301320"/>
-            <a:ext cx="9070920" cy="1261440"/>
+            <a:ext cx="9070560" cy="1261080"/>
           </a:xfrm>
           <a:prstGeom prst="rect">
             <a:avLst/>
@@ -20936,7 +20970,7 @@
         <p:spPr>
           <a:xfrm>
             <a:off x="1463040" y="2122920"/>
-            <a:ext cx="7053120" cy="2905560"/>
+            <a:ext cx="7052760" cy="2905200"/>
           </a:xfrm>
           <a:prstGeom prst="rect">
             <a:avLst/>
@@ -21199,7 +21233,7 @@
         <p:spPr>
           <a:xfrm>
             <a:off x="2631960" y="6675840"/>
-            <a:ext cx="587880" cy="332640"/>
+            <a:ext cx="587520" cy="332280"/>
           </a:xfrm>
           <a:prstGeom prst="ellipse">
             <a:avLst/>
@@ -21229,7 +21263,7 @@
         <p:spPr>
           <a:xfrm>
             <a:off x="2613960" y="5921640"/>
-            <a:ext cx="587880" cy="332640"/>
+            <a:ext cx="587520" cy="332280"/>
           </a:xfrm>
           <a:prstGeom prst="ellipse">
             <a:avLst/>
@@ -21259,7 +21293,7 @@
         <p:spPr>
           <a:xfrm>
             <a:off x="2613960" y="5181480"/>
-            <a:ext cx="587880" cy="332640"/>
+            <a:ext cx="587520" cy="332280"/>
           </a:xfrm>
           <a:prstGeom prst="ellipse">
             <a:avLst/>
@@ -21289,7 +21323,7 @@
         <p:spPr>
           <a:xfrm>
             <a:off x="2613960" y="4441320"/>
-            <a:ext cx="587880" cy="332640"/>
+            <a:ext cx="587520" cy="332280"/>
           </a:xfrm>
           <a:prstGeom prst="ellipse">
             <a:avLst/>
@@ -21403,7 +21437,7 @@
         <p:spPr>
           <a:xfrm>
             <a:off x="2613960" y="3738240"/>
-            <a:ext cx="587880" cy="332640"/>
+            <a:ext cx="587520" cy="332280"/>
           </a:xfrm>
           <a:prstGeom prst="ellipse">
             <a:avLst/>
@@ -21433,7 +21467,7 @@
         <p:spPr>
           <a:xfrm>
             <a:off x="2613960" y="3738240"/>
-            <a:ext cx="587880" cy="332640"/>
+            <a:ext cx="587520" cy="332280"/>
           </a:xfrm>
           <a:prstGeom prst="ellipse">
             <a:avLst/>
@@ -21491,7 +21525,7 @@
         <p:spPr>
           <a:xfrm>
             <a:off x="2679480" y="2997720"/>
-            <a:ext cx="587880" cy="332640"/>
+            <a:ext cx="587520" cy="332280"/>
           </a:xfrm>
           <a:prstGeom prst="ellipse">
             <a:avLst/>
@@ -21577,7 +21611,7 @@
         <p:spPr>
           <a:xfrm>
             <a:off x="2679480" y="2257560"/>
-            <a:ext cx="587880" cy="332640"/>
+            <a:ext cx="587520" cy="332280"/>
           </a:xfrm>
           <a:prstGeom prst="ellipse">
             <a:avLst/>
@@ -21607,7 +21641,7 @@
         <p:spPr>
           <a:xfrm>
             <a:off x="7206480" y="6698880"/>
-            <a:ext cx="587880" cy="332640"/>
+            <a:ext cx="587520" cy="332280"/>
           </a:xfrm>
           <a:prstGeom prst="ellipse">
             <a:avLst/>
@@ -21637,7 +21671,7 @@
         <p:spPr>
           <a:xfrm>
             <a:off x="7188480" y="5944680"/>
-            <a:ext cx="587880" cy="332640"/>
+            <a:ext cx="587520" cy="332280"/>
           </a:xfrm>
           <a:prstGeom prst="ellipse">
             <a:avLst/>
@@ -21667,7 +21701,7 @@
         <p:spPr>
           <a:xfrm>
             <a:off x="7188480" y="5204520"/>
-            <a:ext cx="587880" cy="332640"/>
+            <a:ext cx="587520" cy="332280"/>
           </a:xfrm>
           <a:prstGeom prst="ellipse">
             <a:avLst/>
@@ -21697,7 +21731,7 @@
         <p:spPr>
           <a:xfrm>
             <a:off x="7188480" y="4464360"/>
-            <a:ext cx="587880" cy="332640"/>
+            <a:ext cx="587520" cy="332280"/>
           </a:xfrm>
           <a:prstGeom prst="ellipse">
             <a:avLst/>
@@ -21811,7 +21845,7 @@
         <p:spPr>
           <a:xfrm>
             <a:off x="7188480" y="3761280"/>
-            <a:ext cx="587880" cy="332640"/>
+            <a:ext cx="587520" cy="332280"/>
           </a:xfrm>
           <a:prstGeom prst="ellipse">
             <a:avLst/>
@@ -21841,7 +21875,7 @@
         <p:spPr>
           <a:xfrm>
             <a:off x="7188480" y="3761280"/>
-            <a:ext cx="587880" cy="332640"/>
+            <a:ext cx="587520" cy="332280"/>
           </a:xfrm>
           <a:prstGeom prst="ellipse">
             <a:avLst/>
@@ -21899,7 +21933,7 @@
         <p:spPr>
           <a:xfrm>
             <a:off x="7254000" y="3020760"/>
-            <a:ext cx="587880" cy="332640"/>
+            <a:ext cx="587520" cy="332280"/>
           </a:xfrm>
           <a:prstGeom prst="ellipse">
             <a:avLst/>
@@ -21985,7 +22019,7 @@
         <p:spPr>
           <a:xfrm>
             <a:off x="7254000" y="2280600"/>
-            <a:ext cx="587880" cy="332640"/>
+            <a:ext cx="587520" cy="332280"/>
           </a:xfrm>
           <a:prstGeom prst="ellipse">
             <a:avLst/>
@@ -22093,7 +22127,7 @@
         <p:spPr>
           <a:xfrm>
             <a:off x="2631960" y="6675840"/>
-            <a:ext cx="587880" cy="332640"/>
+            <a:ext cx="587520" cy="332280"/>
           </a:xfrm>
           <a:prstGeom prst="ellipse">
             <a:avLst/>
@@ -22123,7 +22157,7 @@
         <p:spPr>
           <a:xfrm>
             <a:off x="2613960" y="5921640"/>
-            <a:ext cx="587880" cy="332640"/>
+            <a:ext cx="587520" cy="332280"/>
           </a:xfrm>
           <a:prstGeom prst="ellipse">
             <a:avLst/>
@@ -22153,7 +22187,7 @@
         <p:spPr>
           <a:xfrm>
             <a:off x="2613960" y="5181480"/>
-            <a:ext cx="587880" cy="332640"/>
+            <a:ext cx="587520" cy="332280"/>
           </a:xfrm>
           <a:prstGeom prst="ellipse">
             <a:avLst/>
@@ -22183,7 +22217,7 @@
         <p:spPr>
           <a:xfrm>
             <a:off x="2613960" y="4441320"/>
-            <a:ext cx="587880" cy="332640"/>
+            <a:ext cx="587520" cy="332280"/>
           </a:xfrm>
           <a:prstGeom prst="ellipse">
             <a:avLst/>
@@ -22297,7 +22331,7 @@
         <p:spPr>
           <a:xfrm>
             <a:off x="2613960" y="3738240"/>
-            <a:ext cx="587880" cy="332640"/>
+            <a:ext cx="587520" cy="332280"/>
           </a:xfrm>
           <a:prstGeom prst="ellipse">
             <a:avLst/>
@@ -22327,7 +22361,7 @@
         <p:spPr>
           <a:xfrm>
             <a:off x="2613960" y="3738240"/>
-            <a:ext cx="587880" cy="332640"/>
+            <a:ext cx="587520" cy="332280"/>
           </a:xfrm>
           <a:prstGeom prst="ellipse">
             <a:avLst/>
@@ -22385,7 +22419,7 @@
         <p:spPr>
           <a:xfrm>
             <a:off x="2679480" y="2997720"/>
-            <a:ext cx="587880" cy="332640"/>
+            <a:ext cx="587520" cy="332280"/>
           </a:xfrm>
           <a:prstGeom prst="ellipse">
             <a:avLst/>
@@ -22471,7 +22505,7 @@
         <p:spPr>
           <a:xfrm>
             <a:off x="2679480" y="2257560"/>
-            <a:ext cx="587880" cy="332640"/>
+            <a:ext cx="587520" cy="332280"/>
           </a:xfrm>
           <a:prstGeom prst="ellipse">
             <a:avLst/>
@@ -22501,7 +22535,7 @@
         <p:spPr>
           <a:xfrm>
             <a:off x="7206480" y="6698880"/>
-            <a:ext cx="587880" cy="332640"/>
+            <a:ext cx="587520" cy="332280"/>
           </a:xfrm>
           <a:prstGeom prst="ellipse">
             <a:avLst/>
@@ -22531,7 +22565,7 @@
         <p:spPr>
           <a:xfrm>
             <a:off x="7188480" y="5944680"/>
-            <a:ext cx="587880" cy="332640"/>
+            <a:ext cx="587520" cy="332280"/>
           </a:xfrm>
           <a:prstGeom prst="ellipse">
             <a:avLst/>
@@ -22561,7 +22595,7 @@
         <p:spPr>
           <a:xfrm>
             <a:off x="7188480" y="5204520"/>
-            <a:ext cx="587880" cy="332640"/>
+            <a:ext cx="587520" cy="332280"/>
           </a:xfrm>
           <a:prstGeom prst="ellipse">
             <a:avLst/>
@@ -22591,7 +22625,7 @@
         <p:spPr>
           <a:xfrm>
             <a:off x="7188480" y="4464360"/>
-            <a:ext cx="587880" cy="332640"/>
+            <a:ext cx="587520" cy="332280"/>
           </a:xfrm>
           <a:prstGeom prst="ellipse">
             <a:avLst/>
@@ -22705,7 +22739,7 @@
         <p:spPr>
           <a:xfrm>
             <a:off x="7123320" y="3701160"/>
-            <a:ext cx="587880" cy="332640"/>
+            <a:ext cx="587520" cy="332280"/>
           </a:xfrm>
           <a:prstGeom prst="ellipse">
             <a:avLst/>
@@ -22735,7 +22769,7 @@
         <p:spPr>
           <a:xfrm>
             <a:off x="7123320" y="2961000"/>
-            <a:ext cx="587880" cy="332640"/>
+            <a:ext cx="587520" cy="332280"/>
           </a:xfrm>
           <a:prstGeom prst="ellipse">
             <a:avLst/>
@@ -22870,7 +22904,7 @@
         <p:spPr>
           <a:xfrm>
             <a:off x="2631960" y="6675840"/>
-            <a:ext cx="587880" cy="332640"/>
+            <a:ext cx="587520" cy="332280"/>
           </a:xfrm>
           <a:prstGeom prst="ellipse">
             <a:avLst/>
@@ -22900,7 +22934,7 @@
         <p:spPr>
           <a:xfrm>
             <a:off x="2613960" y="5921640"/>
-            <a:ext cx="587880" cy="332640"/>
+            <a:ext cx="587520" cy="332280"/>
           </a:xfrm>
           <a:prstGeom prst="ellipse">
             <a:avLst/>
@@ -22930,7 +22964,7 @@
         <p:spPr>
           <a:xfrm>
             <a:off x="2613960" y="5181480"/>
-            <a:ext cx="587880" cy="332640"/>
+            <a:ext cx="587520" cy="332280"/>
           </a:xfrm>
           <a:prstGeom prst="ellipse">
             <a:avLst/>
@@ -22960,7 +22994,7 @@
         <p:spPr>
           <a:xfrm>
             <a:off x="2613960" y="4441320"/>
-            <a:ext cx="587880" cy="332640"/>
+            <a:ext cx="587520" cy="332280"/>
           </a:xfrm>
           <a:prstGeom prst="ellipse">
             <a:avLst/>
@@ -23074,7 +23108,7 @@
         <p:spPr>
           <a:xfrm>
             <a:off x="2613960" y="2294640"/>
-            <a:ext cx="587880" cy="332640"/>
+            <a:ext cx="587520" cy="332280"/>
           </a:xfrm>
           <a:prstGeom prst="ellipse">
             <a:avLst/>
@@ -23104,7 +23138,7 @@
         <p:spPr>
           <a:xfrm>
             <a:off x="2613960" y="2294640"/>
-            <a:ext cx="587880" cy="332640"/>
+            <a:ext cx="587520" cy="332280"/>
           </a:xfrm>
           <a:prstGeom prst="ellipse">
             <a:avLst/>
@@ -23162,7 +23196,7 @@
         <p:spPr>
           <a:xfrm>
             <a:off x="2679480" y="1554480"/>
-            <a:ext cx="587880" cy="332640"/>
+            <a:ext cx="587520" cy="332280"/>
           </a:xfrm>
           <a:prstGeom prst="ellipse">
             <a:avLst/>
@@ -23248,7 +23282,7 @@
         <p:spPr>
           <a:xfrm>
             <a:off x="2679480" y="814320"/>
-            <a:ext cx="587880" cy="332640"/>
+            <a:ext cx="587520" cy="332280"/>
           </a:xfrm>
           <a:prstGeom prst="ellipse">
             <a:avLst/>
@@ -23278,7 +23312,7 @@
         <p:spPr>
           <a:xfrm>
             <a:off x="7206480" y="6698880"/>
-            <a:ext cx="587880" cy="332640"/>
+            <a:ext cx="587520" cy="332280"/>
           </a:xfrm>
           <a:prstGeom prst="ellipse">
             <a:avLst/>
@@ -23308,7 +23342,7 @@
         <p:spPr>
           <a:xfrm>
             <a:off x="7188480" y="5944680"/>
-            <a:ext cx="587880" cy="332640"/>
+            <a:ext cx="587520" cy="332280"/>
           </a:xfrm>
           <a:prstGeom prst="ellipse">
             <a:avLst/>
@@ -23338,7 +23372,7 @@
         <p:spPr>
           <a:xfrm>
             <a:off x="7188480" y="5204520"/>
-            <a:ext cx="587880" cy="332640"/>
+            <a:ext cx="587520" cy="332280"/>
           </a:xfrm>
           <a:prstGeom prst="ellipse">
             <a:avLst/>
@@ -23368,7 +23402,7 @@
         <p:spPr>
           <a:xfrm>
             <a:off x="7188480" y="4464360"/>
-            <a:ext cx="587880" cy="332640"/>
+            <a:ext cx="587520" cy="332280"/>
           </a:xfrm>
           <a:prstGeom prst="ellipse">
             <a:avLst/>
@@ -23482,7 +23516,7 @@
         <p:spPr>
           <a:xfrm>
             <a:off x="7123320" y="3701160"/>
-            <a:ext cx="587880" cy="332640"/>
+            <a:ext cx="587520" cy="332280"/>
           </a:xfrm>
           <a:prstGeom prst="ellipse">
             <a:avLst/>
@@ -23512,7 +23546,7 @@
         <p:spPr>
           <a:xfrm>
             <a:off x="7123320" y="2961000"/>
-            <a:ext cx="587880" cy="332640"/>
+            <a:ext cx="587520" cy="332280"/>
           </a:xfrm>
           <a:prstGeom prst="ellipse">
             <a:avLst/>
@@ -23598,7 +23632,7 @@
         <p:spPr>
           <a:xfrm>
             <a:off x="2613960" y="3701160"/>
-            <a:ext cx="587880" cy="332640"/>
+            <a:ext cx="587520" cy="332280"/>
           </a:xfrm>
           <a:prstGeom prst="ellipse">
             <a:avLst/>
@@ -23628,7 +23662,7 @@
         <p:spPr>
           <a:xfrm>
             <a:off x="2613960" y="2961000"/>
-            <a:ext cx="587880" cy="332640"/>
+            <a:ext cx="587520" cy="332280"/>
           </a:xfrm>
           <a:prstGeom prst="ellipse">
             <a:avLst/>
@@ -23763,7 +23797,7 @@
         <p:spPr>
           <a:xfrm>
             <a:off x="2631960" y="6675840"/>
-            <a:ext cx="587880" cy="332640"/>
+            <a:ext cx="587520" cy="332280"/>
           </a:xfrm>
           <a:prstGeom prst="ellipse">
             <a:avLst/>
@@ -23793,7 +23827,7 @@
         <p:spPr>
           <a:xfrm>
             <a:off x="2613960" y="5921640"/>
-            <a:ext cx="587880" cy="332640"/>
+            <a:ext cx="587520" cy="332280"/>
           </a:xfrm>
           <a:prstGeom prst="ellipse">
             <a:avLst/>
@@ -23823,7 +23857,7 @@
         <p:spPr>
           <a:xfrm>
             <a:off x="2613960" y="5181480"/>
-            <a:ext cx="587880" cy="332640"/>
+            <a:ext cx="587520" cy="332280"/>
           </a:xfrm>
           <a:prstGeom prst="ellipse">
             <a:avLst/>
@@ -23853,7 +23887,7 @@
         <p:spPr>
           <a:xfrm>
             <a:off x="2613960" y="4441320"/>
-            <a:ext cx="587880" cy="332640"/>
+            <a:ext cx="587520" cy="332280"/>
           </a:xfrm>
           <a:prstGeom prst="ellipse">
             <a:avLst/>
@@ -23967,7 +24001,7 @@
         <p:spPr>
           <a:xfrm>
             <a:off x="2613960" y="2294640"/>
-            <a:ext cx="587880" cy="332640"/>
+            <a:ext cx="587520" cy="332280"/>
           </a:xfrm>
           <a:prstGeom prst="ellipse">
             <a:avLst/>
@@ -23997,7 +24031,7 @@
         <p:spPr>
           <a:xfrm>
             <a:off x="2613960" y="2294640"/>
-            <a:ext cx="587880" cy="332640"/>
+            <a:ext cx="587520" cy="332280"/>
           </a:xfrm>
           <a:prstGeom prst="ellipse">
             <a:avLst/>
@@ -24055,7 +24089,7 @@
         <p:spPr>
           <a:xfrm>
             <a:off x="2679480" y="1554480"/>
-            <a:ext cx="587880" cy="332640"/>
+            <a:ext cx="587520" cy="332280"/>
           </a:xfrm>
           <a:prstGeom prst="ellipse">
             <a:avLst/>
@@ -24141,7 +24175,7 @@
         <p:spPr>
           <a:xfrm>
             <a:off x="2679480" y="814320"/>
-            <a:ext cx="587880" cy="332640"/>
+            <a:ext cx="587520" cy="332280"/>
           </a:xfrm>
           <a:prstGeom prst="ellipse">
             <a:avLst/>
@@ -24171,7 +24205,7 @@
         <p:spPr>
           <a:xfrm>
             <a:off x="7206480" y="6698880"/>
-            <a:ext cx="587880" cy="332640"/>
+            <a:ext cx="587520" cy="332280"/>
           </a:xfrm>
           <a:prstGeom prst="ellipse">
             <a:avLst/>
@@ -24201,7 +24235,7 @@
         <p:spPr>
           <a:xfrm>
             <a:off x="7188480" y="5944680"/>
-            <a:ext cx="587880" cy="332640"/>
+            <a:ext cx="587520" cy="332280"/>
           </a:xfrm>
           <a:prstGeom prst="ellipse">
             <a:avLst/>
@@ -24231,7 +24265,7 @@
         <p:spPr>
           <a:xfrm>
             <a:off x="7188480" y="5204520"/>
-            <a:ext cx="587880" cy="332640"/>
+            <a:ext cx="587520" cy="332280"/>
           </a:xfrm>
           <a:prstGeom prst="ellipse">
             <a:avLst/>
@@ -24261,7 +24295,7 @@
         <p:spPr>
           <a:xfrm>
             <a:off x="7188480" y="4464360"/>
-            <a:ext cx="587880" cy="332640"/>
+            <a:ext cx="587520" cy="332280"/>
           </a:xfrm>
           <a:prstGeom prst="ellipse">
             <a:avLst/>
@@ -24375,7 +24409,7 @@
         <p:spPr>
           <a:xfrm>
             <a:off x="7123320" y="3701160"/>
-            <a:ext cx="587880" cy="332640"/>
+            <a:ext cx="587520" cy="332280"/>
           </a:xfrm>
           <a:prstGeom prst="ellipse">
             <a:avLst/>
@@ -24405,7 +24439,7 @@
         <p:spPr>
           <a:xfrm>
             <a:off x="7123320" y="2961000"/>
-            <a:ext cx="587880" cy="332640"/>
+            <a:ext cx="587520" cy="332280"/>
           </a:xfrm>
           <a:prstGeom prst="ellipse">
             <a:avLst/>
@@ -24491,7 +24525,7 @@
         <p:spPr>
           <a:xfrm>
             <a:off x="2613960" y="3701160"/>
-            <a:ext cx="587880" cy="332640"/>
+            <a:ext cx="587520" cy="332280"/>
           </a:xfrm>
           <a:prstGeom prst="ellipse">
             <a:avLst/>
@@ -24521,7 +24555,7 @@
         <p:spPr>
           <a:xfrm>
             <a:off x="2613960" y="2961000"/>
-            <a:ext cx="587880" cy="332640"/>
+            <a:ext cx="587520" cy="332280"/>
           </a:xfrm>
           <a:prstGeom prst="ellipse">
             <a:avLst/>
@@ -24607,7 +24641,7 @@
         <p:spPr>
           <a:xfrm>
             <a:off x="7123320" y="2294640"/>
-            <a:ext cx="587880" cy="332640"/>
+            <a:ext cx="587520" cy="332280"/>
           </a:xfrm>
           <a:prstGeom prst="ellipse">
             <a:avLst/>
@@ -24637,7 +24671,7 @@
         <p:spPr>
           <a:xfrm>
             <a:off x="7123320" y="2294640"/>
-            <a:ext cx="587880" cy="332640"/>
+            <a:ext cx="587520" cy="332280"/>
           </a:xfrm>
           <a:prstGeom prst="ellipse">
             <a:avLst/>
@@ -24695,7 +24729,7 @@
         <p:spPr>
           <a:xfrm>
             <a:off x="7188480" y="1554480"/>
-            <a:ext cx="587880" cy="332640"/>
+            <a:ext cx="587520" cy="332280"/>
           </a:xfrm>
           <a:prstGeom prst="ellipse">
             <a:avLst/>
@@ -24781,7 +24815,7 @@
         <p:spPr>
           <a:xfrm>
             <a:off x="7188480" y="814320"/>
-            <a:ext cx="587880" cy="332640"/>
+            <a:ext cx="587520" cy="332280"/>
           </a:xfrm>
           <a:prstGeom prst="ellipse">
             <a:avLst/>
@@ -25564,7 +25598,7 @@
         <p:spPr>
           <a:xfrm>
             <a:off x="2103120" y="274320"/>
-            <a:ext cx="5942880" cy="365040"/>
+            <a:ext cx="5942520" cy="364680"/>
           </a:xfrm>
           <a:prstGeom prst="rect">
             <a:avLst/>
@@ -25657,7 +25691,7 @@
         <p:spPr>
           <a:xfrm>
             <a:off x="504000" y="301320"/>
-            <a:ext cx="9070920" cy="1261440"/>
+            <a:ext cx="9070560" cy="1261080"/>
           </a:xfrm>
           <a:prstGeom prst="rect">
             <a:avLst/>
@@ -25706,7 +25740,7 @@
         <p:spPr>
           <a:xfrm>
             <a:off x="1463040" y="1280160"/>
-            <a:ext cx="7053120" cy="5737320"/>
+            <a:ext cx="7052760" cy="5736960"/>
           </a:xfrm>
           <a:prstGeom prst="rect">
             <a:avLst/>
@@ -26379,7 +26413,7 @@
         <p:spPr>
           <a:xfrm>
             <a:off x="504000" y="301320"/>
-            <a:ext cx="9070920" cy="1261440"/>
+            <a:ext cx="9070560" cy="1261080"/>
           </a:xfrm>
           <a:prstGeom prst="rect">
             <a:avLst/>
@@ -26428,7 +26462,7 @@
         <p:spPr>
           <a:xfrm>
             <a:off x="1117080" y="1280160"/>
-            <a:ext cx="8391960" cy="6308640"/>
+            <a:ext cx="8391600" cy="6308280"/>
           </a:xfrm>
           <a:prstGeom prst="rect">
             <a:avLst/>
@@ -26651,7 +26685,7 @@
         <p:spPr>
           <a:xfrm>
             <a:off x="504000" y="301320"/>
-            <a:ext cx="9070920" cy="1261440"/>
+            <a:ext cx="9070560" cy="1261080"/>
           </a:xfrm>
           <a:prstGeom prst="rect">
             <a:avLst/>
@@ -26700,7 +26734,7 @@
         <p:spPr>
           <a:xfrm>
             <a:off x="1117080" y="1463040"/>
-            <a:ext cx="8391960" cy="5760000"/>
+            <a:ext cx="8391600" cy="5759640"/>
           </a:xfrm>
           <a:prstGeom prst="rect">
             <a:avLst/>
@@ -27103,7 +27137,7 @@
         <p:spPr>
           <a:xfrm>
             <a:off x="504000" y="301320"/>
-            <a:ext cx="9070920" cy="1261440"/>
+            <a:ext cx="9070560" cy="1261080"/>
           </a:xfrm>
           <a:prstGeom prst="rect">
             <a:avLst/>
@@ -27152,7 +27186,7 @@
         <p:spPr>
           <a:xfrm>
             <a:off x="457200" y="1463040"/>
-            <a:ext cx="9326160" cy="5760000"/>
+            <a:ext cx="9325800" cy="5759640"/>
           </a:xfrm>
           <a:prstGeom prst="rect">
             <a:avLst/>
@@ -27350,7 +27384,7 @@
         <p:spPr>
           <a:xfrm>
             <a:off x="504000" y="301320"/>
-            <a:ext cx="9070920" cy="1261440"/>
+            <a:ext cx="9070560" cy="1261080"/>
           </a:xfrm>
           <a:prstGeom prst="rect">
             <a:avLst/>
@@ -27399,7 +27433,7 @@
         <p:spPr>
           <a:xfrm>
             <a:off x="504000" y="1463040"/>
-            <a:ext cx="9326160" cy="5760000"/>
+            <a:ext cx="9325800" cy="5759640"/>
           </a:xfrm>
           <a:prstGeom prst="rect">
             <a:avLst/>
@@ -27667,7 +27701,7 @@
         <p:spPr>
           <a:xfrm>
             <a:off x="504000" y="301320"/>
-            <a:ext cx="9070920" cy="1261440"/>
+            <a:ext cx="9070560" cy="1261080"/>
           </a:xfrm>
           <a:prstGeom prst="rect">
             <a:avLst/>
@@ -27716,7 +27750,7 @@
         <p:spPr>
           <a:xfrm>
             <a:off x="504000" y="1463040"/>
-            <a:ext cx="9326160" cy="5760000"/>
+            <a:ext cx="9325800" cy="5759640"/>
           </a:xfrm>
           <a:prstGeom prst="rect">
             <a:avLst/>
@@ -27874,7 +27908,7 @@
         <p:spPr>
           <a:xfrm>
             <a:off x="7272000" y="6675840"/>
-            <a:ext cx="587880" cy="332640"/>
+            <a:ext cx="587520" cy="332280"/>
           </a:xfrm>
           <a:prstGeom prst="ellipse">
             <a:avLst/>
@@ -27904,7 +27938,7 @@
         <p:spPr>
           <a:xfrm>
             <a:off x="7254000" y="5921640"/>
-            <a:ext cx="587880" cy="332640"/>
+            <a:ext cx="587520" cy="332280"/>
           </a:xfrm>
           <a:prstGeom prst="ellipse">
             <a:avLst/>
@@ -27934,7 +27968,7 @@
         <p:spPr>
           <a:xfrm>
             <a:off x="7254000" y="5181480"/>
-            <a:ext cx="587880" cy="332640"/>
+            <a:ext cx="587520" cy="332280"/>
           </a:xfrm>
           <a:prstGeom prst="ellipse">
             <a:avLst/>
@@ -27964,7 +27998,7 @@
         <p:spPr>
           <a:xfrm>
             <a:off x="7254000" y="4441320"/>
-            <a:ext cx="587880" cy="332640"/>
+            <a:ext cx="587520" cy="332280"/>
           </a:xfrm>
           <a:prstGeom prst="ellipse">
             <a:avLst/>
@@ -28078,7 +28112,7 @@
         <p:spPr>
           <a:xfrm>
             <a:off x="2631960" y="6675840"/>
-            <a:ext cx="587880" cy="332640"/>
+            <a:ext cx="587520" cy="332280"/>
           </a:xfrm>
           <a:prstGeom prst="ellipse">
             <a:avLst/>
@@ -28108,7 +28142,7 @@
         <p:spPr>
           <a:xfrm>
             <a:off x="2613960" y="5921640"/>
-            <a:ext cx="587880" cy="332640"/>
+            <a:ext cx="587520" cy="332280"/>
           </a:xfrm>
           <a:prstGeom prst="ellipse">
             <a:avLst/>
@@ -28138,7 +28172,7 @@
         <p:spPr>
           <a:xfrm>
             <a:off x="2613960" y="5181480"/>
-            <a:ext cx="587880" cy="332640"/>
+            <a:ext cx="587520" cy="332280"/>
           </a:xfrm>
           <a:prstGeom prst="ellipse">
             <a:avLst/>
@@ -28168,7 +28202,7 @@
         <p:spPr>
           <a:xfrm>
             <a:off x="2613960" y="4441320"/>
-            <a:ext cx="587880" cy="332640"/>
+            <a:ext cx="587520" cy="332280"/>
           </a:xfrm>
           <a:prstGeom prst="ellipse">
             <a:avLst/>
@@ -28282,7 +28316,7 @@
         <p:spPr>
           <a:xfrm>
             <a:off x="8364960" y="4589280"/>
-            <a:ext cx="1502640" cy="297360"/>
+            <a:ext cx="1502280" cy="297000"/>
           </a:xfrm>
           <a:prstGeom prst="rect">
             <a:avLst/>
@@ -28303,7 +28337,11 @@
           <a:p>
             <a:r>
               <a:rPr b="0" lang="en-US" sz="1460" spc="-1" strike="noStrike">
+                <a:solidFill>
+                  <a:srgbClr val="000000"/>
+                </a:solidFill>
                 <a:latin typeface="Arial"/>
+                <a:ea typeface="DejaVu Sans"/>
               </a:rPr>
               <a:t>master</a:t>
             </a:r>
@@ -28322,7 +28360,7 @@
         <p:spPr>
           <a:xfrm>
             <a:off x="3398040" y="4552200"/>
-            <a:ext cx="1502640" cy="297360"/>
+            <a:ext cx="1502280" cy="297000"/>
           </a:xfrm>
           <a:prstGeom prst="rect">
             <a:avLst/>
@@ -28343,7 +28381,11 @@
           <a:p>
             <a:r>
               <a:rPr b="0" lang="en-US" sz="1460" spc="-1" strike="noStrike">
+                <a:solidFill>
+                  <a:srgbClr val="000000"/>
+                </a:solidFill>
                 <a:latin typeface="Arial"/>
+                <a:ea typeface="DejaVu Sans"/>
               </a:rPr>
               <a:t>master</a:t>
             </a:r>
@@ -28362,7 +28404,7 @@
         <p:spPr>
           <a:xfrm>
             <a:off x="3398040" y="4271760"/>
-            <a:ext cx="2352240" cy="297360"/>
+            <a:ext cx="2351880" cy="297000"/>
           </a:xfrm>
           <a:prstGeom prst="rect">
             <a:avLst/>
@@ -28383,7 +28425,11 @@
           <a:p>
             <a:r>
               <a:rPr b="0" lang="en-US" sz="1460" spc="-1" strike="noStrike">
+                <a:solidFill>
+                  <a:srgbClr val="000000"/>
+                </a:solidFill>
                 <a:latin typeface="Arial"/>
+                <a:ea typeface="DejaVu Sans"/>
               </a:rPr>
               <a:t>ball_launcher</a:t>
             </a:r>
@@ -28451,7 +28497,7 @@
         <p:spPr>
           <a:xfrm>
             <a:off x="504000" y="301320"/>
-            <a:ext cx="9070920" cy="1261440"/>
+            <a:ext cx="9070560" cy="1261080"/>
           </a:xfrm>
           <a:prstGeom prst="rect">
             <a:avLst/>
@@ -28500,7 +28546,7 @@
         <p:spPr>
           <a:xfrm>
             <a:off x="504000" y="1463040"/>
-            <a:ext cx="9326160" cy="5760000"/>
+            <a:ext cx="9325800" cy="5759640"/>
           </a:xfrm>
           <a:prstGeom prst="rect">
             <a:avLst/>
@@ -28668,7 +28714,7 @@
         <p:spPr>
           <a:xfrm>
             <a:off x="504000" y="301320"/>
-            <a:ext cx="9070920" cy="1261440"/>
+            <a:ext cx="9070560" cy="1261080"/>
           </a:xfrm>
           <a:prstGeom prst="rect">
             <a:avLst/>
@@ -28717,7 +28763,7 @@
         <p:spPr>
           <a:xfrm>
             <a:off x="640080" y="1371600"/>
-            <a:ext cx="9326160" cy="5760000"/>
+            <a:ext cx="9325800" cy="5759640"/>
           </a:xfrm>
           <a:prstGeom prst="rect">
             <a:avLst/>
@@ -29290,7 +29336,7 @@
         <p:spPr>
           <a:xfrm>
             <a:off x="7272000" y="6675840"/>
-            <a:ext cx="587880" cy="332640"/>
+            <a:ext cx="587520" cy="332280"/>
           </a:xfrm>
           <a:prstGeom prst="ellipse">
             <a:avLst/>
@@ -29320,7 +29366,7 @@
         <p:spPr>
           <a:xfrm>
             <a:off x="7254000" y="5921640"/>
-            <a:ext cx="587880" cy="332640"/>
+            <a:ext cx="587520" cy="332280"/>
           </a:xfrm>
           <a:prstGeom prst="ellipse">
             <a:avLst/>
@@ -29350,7 +29396,7 @@
         <p:spPr>
           <a:xfrm>
             <a:off x="7254000" y="5181480"/>
-            <a:ext cx="587880" cy="332640"/>
+            <a:ext cx="587520" cy="332280"/>
           </a:xfrm>
           <a:prstGeom prst="ellipse">
             <a:avLst/>
@@ -29380,7 +29426,7 @@
         <p:spPr>
           <a:xfrm>
             <a:off x="7254000" y="4441320"/>
-            <a:ext cx="587880" cy="332640"/>
+            <a:ext cx="587520" cy="332280"/>
           </a:xfrm>
           <a:prstGeom prst="ellipse">
             <a:avLst/>
@@ -29494,7 +29540,7 @@
         <p:spPr>
           <a:xfrm>
             <a:off x="2631960" y="6675840"/>
-            <a:ext cx="587880" cy="332640"/>
+            <a:ext cx="587520" cy="332280"/>
           </a:xfrm>
           <a:prstGeom prst="ellipse">
             <a:avLst/>
@@ -29524,7 +29570,7 @@
         <p:spPr>
           <a:xfrm>
             <a:off x="2613960" y="5921640"/>
-            <a:ext cx="587880" cy="332640"/>
+            <a:ext cx="587520" cy="332280"/>
           </a:xfrm>
           <a:prstGeom prst="ellipse">
             <a:avLst/>
@@ -29554,7 +29600,7 @@
         <p:spPr>
           <a:xfrm>
             <a:off x="2613960" y="5181480"/>
-            <a:ext cx="587880" cy="332640"/>
+            <a:ext cx="587520" cy="332280"/>
           </a:xfrm>
           <a:prstGeom prst="ellipse">
             <a:avLst/>
@@ -29584,7 +29630,7 @@
         <p:spPr>
           <a:xfrm>
             <a:off x="2613960" y="4441320"/>
-            <a:ext cx="587880" cy="332640"/>
+            <a:ext cx="587520" cy="332280"/>
           </a:xfrm>
           <a:prstGeom prst="ellipse">
             <a:avLst/>
@@ -29698,7 +29744,7 @@
         <p:spPr>
           <a:xfrm>
             <a:off x="8364960" y="4589280"/>
-            <a:ext cx="1502640" cy="297360"/>
+            <a:ext cx="1502280" cy="297000"/>
           </a:xfrm>
           <a:prstGeom prst="rect">
             <a:avLst/>
@@ -29719,7 +29765,11 @@
           <a:p>
             <a:r>
               <a:rPr b="0" lang="en-US" sz="1460" spc="-1" strike="noStrike">
+                <a:solidFill>
+                  <a:srgbClr val="000000"/>
+                </a:solidFill>
                 <a:latin typeface="Arial"/>
+                <a:ea typeface="DejaVu Sans"/>
               </a:rPr>
               <a:t>master</a:t>
             </a:r>
@@ -29738,7 +29788,7 @@
         <p:spPr>
           <a:xfrm>
             <a:off x="849240" y="4493880"/>
-            <a:ext cx="1502640" cy="297360"/>
+            <a:ext cx="1502280" cy="297000"/>
           </a:xfrm>
           <a:prstGeom prst="rect">
             <a:avLst/>
@@ -29759,7 +29809,11 @@
           <a:p>
             <a:r>
               <a:rPr b="0" lang="en-US" sz="1460" spc="-1" strike="noStrike">
+                <a:solidFill>
+                  <a:srgbClr val="000000"/>
+                </a:solidFill>
                 <a:latin typeface="Arial"/>
+                <a:ea typeface="DejaVu Sans"/>
               </a:rPr>
               <a:t>master</a:t>
             </a:r>
@@ -29778,7 +29832,7 @@
         <p:spPr>
           <a:xfrm>
             <a:off x="3659400" y="4234680"/>
-            <a:ext cx="2352240" cy="297360"/>
+            <a:ext cx="2351880" cy="297000"/>
           </a:xfrm>
           <a:prstGeom prst="rect">
             <a:avLst/>
@@ -29799,7 +29853,11 @@
           <a:p>
             <a:r>
               <a:rPr b="0" lang="en-US" sz="1460" spc="-1" strike="noStrike">
+                <a:solidFill>
+                  <a:srgbClr val="000000"/>
+                </a:solidFill>
                 <a:latin typeface="Arial"/>
+                <a:ea typeface="DejaVu Sans"/>
               </a:rPr>
               <a:t>ball_launcher</a:t>
             </a:r>
@@ -29818,7 +29876,7 @@
         <p:spPr>
           <a:xfrm>
             <a:off x="3986280" y="3774960"/>
-            <a:ext cx="587880" cy="332640"/>
+            <a:ext cx="587520" cy="332280"/>
           </a:xfrm>
           <a:prstGeom prst="ellipse">
             <a:avLst/>
@@ -30600,7 +30658,7 @@
         <p:spPr>
           <a:xfrm>
             <a:off x="3049560" y="1486800"/>
-            <a:ext cx="90720" cy="90720"/>
+            <a:ext cx="90360" cy="90360"/>
           </a:xfrm>
           <a:prstGeom prst="ellipse">
             <a:avLst/>
@@ -30738,7 +30796,7 @@
         <p:spPr>
           <a:xfrm>
             <a:off x="1737360" y="91440"/>
-            <a:ext cx="6948720" cy="345600"/>
+            <a:ext cx="6948360" cy="345240"/>
           </a:xfrm>
           <a:prstGeom prst="rect">
             <a:avLst/>
@@ -30831,7 +30889,7 @@
         <p:spPr>
           <a:xfrm>
             <a:off x="504000" y="301320"/>
-            <a:ext cx="9070920" cy="1261440"/>
+            <a:ext cx="9070560" cy="1261080"/>
           </a:xfrm>
           <a:prstGeom prst="rect">
             <a:avLst/>
@@ -30880,7 +30938,7 @@
         <p:spPr>
           <a:xfrm>
             <a:off x="504000" y="1463040"/>
-            <a:ext cx="9326160" cy="5760000"/>
+            <a:ext cx="9325800" cy="5759640"/>
           </a:xfrm>
           <a:prstGeom prst="rect">
             <a:avLst/>
@@ -31048,7 +31106,7 @@
         <p:spPr>
           <a:xfrm>
             <a:off x="7272000" y="6675840"/>
-            <a:ext cx="587880" cy="332640"/>
+            <a:ext cx="587520" cy="332280"/>
           </a:xfrm>
           <a:prstGeom prst="ellipse">
             <a:avLst/>
@@ -31078,7 +31136,7 @@
         <p:spPr>
           <a:xfrm>
             <a:off x="7254000" y="5921640"/>
-            <a:ext cx="587880" cy="332640"/>
+            <a:ext cx="587520" cy="332280"/>
           </a:xfrm>
           <a:prstGeom prst="ellipse">
             <a:avLst/>
@@ -31108,7 +31166,7 @@
         <p:spPr>
           <a:xfrm>
             <a:off x="7254000" y="5181480"/>
-            <a:ext cx="587880" cy="332640"/>
+            <a:ext cx="587520" cy="332280"/>
           </a:xfrm>
           <a:prstGeom prst="ellipse">
             <a:avLst/>
@@ -31138,7 +31196,7 @@
         <p:spPr>
           <a:xfrm>
             <a:off x="7254000" y="4441320"/>
-            <a:ext cx="587880" cy="332640"/>
+            <a:ext cx="587520" cy="332280"/>
           </a:xfrm>
           <a:prstGeom prst="ellipse">
             <a:avLst/>
@@ -31252,7 +31310,7 @@
         <p:spPr>
           <a:xfrm>
             <a:off x="2631960" y="6675840"/>
-            <a:ext cx="587880" cy="332640"/>
+            <a:ext cx="587520" cy="332280"/>
           </a:xfrm>
           <a:prstGeom prst="ellipse">
             <a:avLst/>
@@ -31282,7 +31340,7 @@
         <p:spPr>
           <a:xfrm>
             <a:off x="2613960" y="5921640"/>
-            <a:ext cx="587880" cy="332640"/>
+            <a:ext cx="587520" cy="332280"/>
           </a:xfrm>
           <a:prstGeom prst="ellipse">
             <a:avLst/>
@@ -31312,7 +31370,7 @@
         <p:spPr>
           <a:xfrm>
             <a:off x="2613960" y="5181480"/>
-            <a:ext cx="587880" cy="332640"/>
+            <a:ext cx="587520" cy="332280"/>
           </a:xfrm>
           <a:prstGeom prst="ellipse">
             <a:avLst/>
@@ -31342,7 +31400,7 @@
         <p:spPr>
           <a:xfrm>
             <a:off x="2613960" y="4441320"/>
-            <a:ext cx="587880" cy="332640"/>
+            <a:ext cx="587520" cy="332280"/>
           </a:xfrm>
           <a:prstGeom prst="ellipse">
             <a:avLst/>
@@ -31456,7 +31514,7 @@
         <p:spPr>
           <a:xfrm>
             <a:off x="8364960" y="4589280"/>
-            <a:ext cx="1502640" cy="297360"/>
+            <a:ext cx="1502280" cy="297000"/>
           </a:xfrm>
           <a:prstGeom prst="rect">
             <a:avLst/>
@@ -31477,7 +31535,11 @@
           <a:p>
             <a:r>
               <a:rPr b="0" lang="en-US" sz="1460" spc="-1" strike="noStrike">
+                <a:solidFill>
+                  <a:srgbClr val="000000"/>
+                </a:solidFill>
                 <a:latin typeface="Arial"/>
+                <a:ea typeface="DejaVu Sans"/>
               </a:rPr>
               <a:t>master</a:t>
             </a:r>
@@ -31496,7 +31558,7 @@
         <p:spPr>
           <a:xfrm>
             <a:off x="849240" y="4493880"/>
-            <a:ext cx="1502640" cy="297360"/>
+            <a:ext cx="1502280" cy="297000"/>
           </a:xfrm>
           <a:prstGeom prst="rect">
             <a:avLst/>
@@ -31517,7 +31579,11 @@
           <a:p>
             <a:r>
               <a:rPr b="0" lang="en-US" sz="1460" spc="-1" strike="noStrike">
+                <a:solidFill>
+                  <a:srgbClr val="000000"/>
+                </a:solidFill>
                 <a:latin typeface="Arial"/>
+                <a:ea typeface="DejaVu Sans"/>
               </a:rPr>
               <a:t>master</a:t>
             </a:r>
@@ -31536,7 +31602,7 @@
         <p:spPr>
           <a:xfrm>
             <a:off x="65160" y="3774960"/>
-            <a:ext cx="2352240" cy="297360"/>
+            <a:ext cx="2351880" cy="297000"/>
           </a:xfrm>
           <a:prstGeom prst="rect">
             <a:avLst/>
@@ -31557,7 +31623,11 @@
           <a:p>
             <a:r>
               <a:rPr b="0" lang="en-US" sz="1460" spc="-1" strike="noStrike">
+                <a:solidFill>
+                  <a:srgbClr val="000000"/>
+                </a:solidFill>
                 <a:latin typeface="Arial"/>
+                <a:ea typeface="DejaVu Sans"/>
               </a:rPr>
               <a:t>ball_launcher</a:t>
             </a:r>
@@ -31576,7 +31646,7 @@
         <p:spPr>
           <a:xfrm>
             <a:off x="3986280" y="3774960"/>
-            <a:ext cx="587880" cy="332640"/>
+            <a:ext cx="587520" cy="332280"/>
           </a:xfrm>
           <a:prstGeom prst="ellipse">
             <a:avLst/>
@@ -31634,7 +31704,7 @@
         <p:spPr>
           <a:xfrm>
             <a:off x="4705200" y="3790800"/>
-            <a:ext cx="1633320" cy="297360"/>
+            <a:ext cx="1632960" cy="297000"/>
           </a:xfrm>
           <a:prstGeom prst="rect">
             <a:avLst/>
@@ -31655,7 +31725,11 @@
           <a:p>
             <a:r>
               <a:rPr b="0" lang="en-US" sz="1460" spc="-1" strike="noStrike">
+                <a:solidFill>
+                  <a:srgbClr val="000000"/>
+                </a:solidFill>
                 <a:latin typeface="Arial"/>
+                <a:ea typeface="DejaVu Sans"/>
               </a:rPr>
               <a:t>4a5d420</a:t>
             </a:r>
@@ -31674,7 +31748,7 @@
         <p:spPr>
           <a:xfrm>
             <a:off x="4639680" y="4508640"/>
-            <a:ext cx="1633320" cy="302040"/>
+            <a:ext cx="1632960" cy="301680"/>
           </a:xfrm>
           <a:prstGeom prst="rect">
             <a:avLst/>
@@ -31695,7 +31769,11 @@
           <a:p>
             <a:r>
               <a:rPr b="0" lang="en-US" sz="1460" spc="-1" strike="noStrike">
+                <a:solidFill>
+                  <a:srgbClr val="000000"/>
+                </a:solidFill>
                 <a:latin typeface="Arial"/>
+                <a:ea typeface="DejaVu Sans"/>
               </a:rPr>
               <a:t>2739922</a:t>
             </a:r>
@@ -31763,7 +31841,7 @@
         <p:spPr>
           <a:xfrm>
             <a:off x="504000" y="301320"/>
-            <a:ext cx="9070920" cy="1261440"/>
+            <a:ext cx="9070560" cy="1261080"/>
           </a:xfrm>
           <a:prstGeom prst="rect">
             <a:avLst/>
@@ -31812,7 +31890,7 @@
         <p:spPr>
           <a:xfrm>
             <a:off x="504000" y="1463040"/>
-            <a:ext cx="9326160" cy="5760000"/>
+            <a:ext cx="9325800" cy="5759640"/>
           </a:xfrm>
           <a:prstGeom prst="rect">
             <a:avLst/>
@@ -32245,7 +32323,7 @@
         <p:spPr>
           <a:xfrm>
             <a:off x="504000" y="301320"/>
-            <a:ext cx="9070920" cy="1261440"/>
+            <a:ext cx="9070560" cy="1261080"/>
           </a:xfrm>
           <a:prstGeom prst="rect">
             <a:avLst/>
@@ -32294,7 +32372,7 @@
         <p:spPr>
           <a:xfrm>
             <a:off x="504000" y="1463040"/>
-            <a:ext cx="9326160" cy="5760000"/>
+            <a:ext cx="9325800" cy="5759640"/>
           </a:xfrm>
           <a:prstGeom prst="rect">
             <a:avLst/>
@@ -32402,41 +32480,6 @@
                 <a:ea typeface="DejaVu Sans"/>
               </a:rPr>
               <a:t>https://github.com/4627ManningRobotics/example_git_flow (push)</a:t>
-            </a:r>
-            <a:endParaRPr b="0" lang="en-US" sz="1400" spc="-1" strike="noStrike">
-              <a:latin typeface="Arial"/>
-            </a:endParaRPr>
-          </a:p>
-          <a:p>
-            <a:endParaRPr b="0" lang="en-US" sz="1400" spc="-1" strike="noStrike">
-              <a:latin typeface="Arial"/>
-            </a:endParaRPr>
-          </a:p>
-          <a:p>
-            <a:endParaRPr b="0" lang="en-US" sz="1400" spc="-1" strike="noStrike">
-              <a:latin typeface="Arial"/>
-            </a:endParaRPr>
-          </a:p>
-          <a:p>
-            <a:r>
-              <a:rPr b="0" lang="en-US" sz="1400" spc="-1" strike="noStrike">
-                <a:solidFill>
-                  <a:srgbClr val="00ffff"/>
-                </a:solidFill>
-                <a:latin typeface="Courier New"/>
-                <a:ea typeface="DejaVu Sans"/>
-              </a:rPr>
-              <a:t>‘</a:t>
-            </a:r>
-            <a:r>
-              <a:rPr b="0" lang="en-US" sz="1400" spc="-1" strike="noStrike">
-                <a:solidFill>
-                  <a:srgbClr val="00ffff"/>
-                </a:solidFill>
-                <a:latin typeface="Courier New"/>
-                <a:ea typeface="DejaVu Sans"/>
-              </a:rPr>
-              <a:t>origin’ is the upstream repository.  We can add other repositories and then choose which to push to later. But that’s outside of our scope here.</a:t>
             </a:r>
             <a:endParaRPr b="0" lang="en-US" sz="1400" spc="-1" strike="noStrike">
               <a:latin typeface="Arial"/>
@@ -32502,7 +32545,7 @@
         <p:spPr>
           <a:xfrm>
             <a:off x="504000" y="301320"/>
-            <a:ext cx="9070920" cy="1261440"/>
+            <a:ext cx="9070560" cy="1261080"/>
           </a:xfrm>
           <a:prstGeom prst="rect">
             <a:avLst/>
@@ -32551,7 +32594,7 @@
         <p:spPr>
           <a:xfrm>
             <a:off x="504000" y="1463040"/>
-            <a:ext cx="9326160" cy="5760000"/>
+            <a:ext cx="9325800" cy="5759640"/>
           </a:xfrm>
           <a:prstGeom prst="rect">
             <a:avLst/>
@@ -32829,7 +32872,7 @@
         <p:spPr>
           <a:xfrm>
             <a:off x="5358600" y="6675840"/>
-            <a:ext cx="587880" cy="332640"/>
+            <a:ext cx="587520" cy="332280"/>
           </a:xfrm>
           <a:prstGeom prst="ellipse">
             <a:avLst/>
@@ -32859,7 +32902,7 @@
         <p:spPr>
           <a:xfrm>
             <a:off x="5340600" y="5921640"/>
-            <a:ext cx="587880" cy="332640"/>
+            <a:ext cx="587520" cy="332280"/>
           </a:xfrm>
           <a:prstGeom prst="ellipse">
             <a:avLst/>
@@ -32889,7 +32932,7 @@
         <p:spPr>
           <a:xfrm>
             <a:off x="5340600" y="5181480"/>
-            <a:ext cx="587880" cy="332640"/>
+            <a:ext cx="587520" cy="332280"/>
           </a:xfrm>
           <a:prstGeom prst="ellipse">
             <a:avLst/>
@@ -32919,7 +32962,7 @@
         <p:spPr>
           <a:xfrm>
             <a:off x="5340600" y="4441320"/>
-            <a:ext cx="587880" cy="332640"/>
+            <a:ext cx="587520" cy="332280"/>
           </a:xfrm>
           <a:prstGeom prst="ellipse">
             <a:avLst/>
@@ -33033,7 +33076,7 @@
         <p:spPr>
           <a:xfrm>
             <a:off x="2174400" y="6662160"/>
-            <a:ext cx="587880" cy="332640"/>
+            <a:ext cx="587520" cy="332280"/>
           </a:xfrm>
           <a:prstGeom prst="ellipse">
             <a:avLst/>
@@ -33063,7 +33106,7 @@
         <p:spPr>
           <a:xfrm>
             <a:off x="2156400" y="5907960"/>
-            <a:ext cx="587880" cy="332640"/>
+            <a:ext cx="587520" cy="332280"/>
           </a:xfrm>
           <a:prstGeom prst="ellipse">
             <a:avLst/>
@@ -33093,7 +33136,7 @@
         <p:spPr>
           <a:xfrm>
             <a:off x="2156400" y="5167440"/>
-            <a:ext cx="587880" cy="332640"/>
+            <a:ext cx="587520" cy="332280"/>
           </a:xfrm>
           <a:prstGeom prst="ellipse">
             <a:avLst/>
@@ -33123,7 +33166,7 @@
         <p:spPr>
           <a:xfrm>
             <a:off x="2156400" y="4427280"/>
-            <a:ext cx="587880" cy="332640"/>
+            <a:ext cx="587520" cy="332280"/>
           </a:xfrm>
           <a:prstGeom prst="ellipse">
             <a:avLst/>
@@ -33237,7 +33280,7 @@
         <p:spPr>
           <a:xfrm>
             <a:off x="6338880" y="4493880"/>
-            <a:ext cx="1502640" cy="297360"/>
+            <a:ext cx="1502280" cy="297000"/>
           </a:xfrm>
           <a:prstGeom prst="rect">
             <a:avLst/>
@@ -33258,7 +33301,11 @@
           <a:p>
             <a:r>
               <a:rPr b="0" lang="en-US" sz="1460" spc="-1" strike="noStrike">
+                <a:solidFill>
+                  <a:srgbClr val="000000"/>
+                </a:solidFill>
                 <a:latin typeface="Arial"/>
+                <a:ea typeface="DejaVu Sans"/>
               </a:rPr>
               <a:t>master</a:t>
             </a:r>
@@ -33277,7 +33324,7 @@
         <p:spPr>
           <a:xfrm>
             <a:off x="849240" y="4493880"/>
-            <a:ext cx="1502640" cy="297360"/>
+            <a:ext cx="1502280" cy="297000"/>
           </a:xfrm>
           <a:prstGeom prst="rect">
             <a:avLst/>
@@ -33298,7 +33345,11 @@
           <a:p>
             <a:r>
               <a:rPr b="0" lang="en-US" sz="1460" spc="-1" strike="noStrike">
+                <a:solidFill>
+                  <a:srgbClr val="000000"/>
+                </a:solidFill>
                 <a:latin typeface="Arial"/>
+                <a:ea typeface="DejaVu Sans"/>
               </a:rPr>
               <a:t>master</a:t>
             </a:r>
@@ -33317,7 +33368,7 @@
         <p:spPr>
           <a:xfrm>
             <a:off x="65160" y="3774960"/>
-            <a:ext cx="2352240" cy="297360"/>
+            <a:ext cx="2351880" cy="297000"/>
           </a:xfrm>
           <a:prstGeom prst="rect">
             <a:avLst/>
@@ -33338,7 +33389,11 @@
           <a:p>
             <a:r>
               <a:rPr b="0" lang="en-US" sz="1460" spc="-1" strike="noStrike">
+                <a:solidFill>
+                  <a:srgbClr val="000000"/>
+                </a:solidFill>
                 <a:latin typeface="Arial"/>
+                <a:ea typeface="DejaVu Sans"/>
               </a:rPr>
               <a:t>ball_launcher</a:t>
             </a:r>
@@ -33357,7 +33412,7 @@
         <p:spPr>
           <a:xfrm>
             <a:off x="3528720" y="3761280"/>
-            <a:ext cx="587880" cy="332640"/>
+            <a:ext cx="587520" cy="332280"/>
           </a:xfrm>
           <a:prstGeom prst="ellipse">
             <a:avLst/>
@@ -33415,7 +33470,7 @@
         <p:spPr>
           <a:xfrm>
             <a:off x="7646040" y="3812040"/>
-            <a:ext cx="2352240" cy="297360"/>
+            <a:ext cx="2351880" cy="297000"/>
           </a:xfrm>
           <a:prstGeom prst="rect">
             <a:avLst/>
@@ -33436,7 +33491,11 @@
           <a:p>
             <a:r>
               <a:rPr b="0" lang="en-US" sz="1460" spc="-1" strike="noStrike">
+                <a:solidFill>
+                  <a:srgbClr val="000000"/>
+                </a:solidFill>
                 <a:latin typeface="Arial"/>
+                <a:ea typeface="DejaVu Sans"/>
               </a:rPr>
               <a:t>ball_launcher</a:t>
             </a:r>
@@ -33455,7 +33514,7 @@
         <p:spPr>
           <a:xfrm>
             <a:off x="6927120" y="3812040"/>
-            <a:ext cx="587880" cy="332640"/>
+            <a:ext cx="587520" cy="332280"/>
           </a:xfrm>
           <a:prstGeom prst="ellipse">
             <a:avLst/>
@@ -33562,7 +33621,7 @@
         <p:spPr>
           <a:xfrm>
             <a:off x="504000" y="301320"/>
-            <a:ext cx="9070920" cy="1261440"/>
+            <a:ext cx="9070560" cy="1261080"/>
           </a:xfrm>
           <a:prstGeom prst="rect">
             <a:avLst/>
@@ -33615,7 +33674,7 @@
         <p:spPr>
           <a:xfrm>
             <a:off x="822960" y="1645920"/>
-            <a:ext cx="8320320" cy="5405040"/>
+            <a:ext cx="8319960" cy="5404680"/>
           </a:xfrm>
           <a:prstGeom prst="rect">
             <a:avLst/>
@@ -33683,7 +33742,7 @@
         <p:spPr>
           <a:xfrm>
             <a:off x="504000" y="301320"/>
-            <a:ext cx="9070920" cy="1261440"/>
+            <a:ext cx="9070560" cy="1261080"/>
           </a:xfrm>
           <a:prstGeom prst="rect">
             <a:avLst/>
@@ -33732,7 +33791,7 @@
         <p:spPr>
           <a:xfrm>
             <a:off x="621000" y="1563480"/>
-            <a:ext cx="9070920" cy="5476680"/>
+            <a:ext cx="9070560" cy="5476320"/>
           </a:xfrm>
           <a:prstGeom prst="rect">
             <a:avLst/>
@@ -33751,7 +33810,7 @@
         <p:txBody>
           <a:bodyPr lIns="0" rIns="0" tIns="0" bIns="0"/>
           <a:p>
-            <a:pPr marL="432000" indent="-323280">
+            <a:pPr marL="432000" indent="-322920">
               <a:lnSpc>
                 <a:spcPct val="100000"/>
               </a:lnSpc>
@@ -33770,14 +33829,14 @@
                 <a:latin typeface="Arial"/>
                 <a:ea typeface="DejaVu Sans"/>
               </a:rPr>
-              <a:t>Drive team should always be able to drive a robot.</a:t>
+              <a:t>Drive team should always be able to drive a robot through the entire development cycle.</a:t>
             </a:r>
             <a:endParaRPr b="0" lang="en-US" sz="3200" spc="-1" strike="noStrike">
               <a:latin typeface="Arial"/>
             </a:endParaRPr>
           </a:p>
           <a:p>
-            <a:pPr marL="432000" indent="-323280">
+            <a:pPr marL="432000" indent="-322920">
               <a:lnSpc>
                 <a:spcPct val="100000"/>
               </a:lnSpc>
@@ -33796,14 +33855,14 @@
                 <a:latin typeface="Arial"/>
                 <a:ea typeface="DejaVu Sans"/>
               </a:rPr>
-              <a:t>Autonomous team needs to be able to iterate through their design.</a:t>
+              <a:t>Autonomous, programming, and vision teams need to be able to add features, iterate through their design, and test their code.</a:t>
             </a:r>
             <a:endParaRPr b="0" lang="en-US" sz="3200" spc="-1" strike="noStrike">
               <a:latin typeface="Arial"/>
             </a:endParaRPr>
           </a:p>
           <a:p>
-            <a:pPr marL="432000" indent="-323280">
+            <a:pPr marL="432000" indent="-322920">
               <a:lnSpc>
                 <a:spcPct val="100000"/>
               </a:lnSpc>
@@ -33822,66 +33881,14 @@
                 <a:latin typeface="Arial"/>
                 <a:ea typeface="DejaVu Sans"/>
               </a:rPr>
-              <a:t>Programming team needs to be able to add features and test them.</a:t>
+              <a:t>All of this code needs to come together.</a:t>
             </a:r>
             <a:endParaRPr b="0" lang="en-US" sz="3200" spc="-1" strike="noStrike">
               <a:latin typeface="Arial"/>
             </a:endParaRPr>
           </a:p>
           <a:p>
-            <a:pPr marL="432000" indent="-323280">
-              <a:lnSpc>
-                <a:spcPct val="100000"/>
-              </a:lnSpc>
-              <a:buClr>
-                <a:srgbClr val="000000"/>
-              </a:buClr>
-              <a:buSzPct val="45000"/>
-              <a:buFont typeface="Wingdings" charset="2"/>
-              <a:buChar char=""/>
-            </a:pPr>
-            <a:r>
-              <a:rPr b="0" lang="en-US" sz="3200" spc="-1" strike="noStrike">
-                <a:solidFill>
-                  <a:srgbClr val="000000"/>
-                </a:solidFill>
-                <a:latin typeface="Arial"/>
-                <a:ea typeface="DejaVu Sans"/>
-              </a:rPr>
-              <a:t>Vision team needs to be able to iterate and test their code.</a:t>
-            </a:r>
-            <a:endParaRPr b="0" lang="en-US" sz="3200" spc="-1" strike="noStrike">
-              <a:latin typeface="Arial"/>
-            </a:endParaRPr>
-          </a:p>
-          <a:p>
-            <a:pPr marL="432000" indent="-323280">
-              <a:lnSpc>
-                <a:spcPct val="100000"/>
-              </a:lnSpc>
-              <a:buClr>
-                <a:srgbClr val="000000"/>
-              </a:buClr>
-              <a:buSzPct val="45000"/>
-              <a:buFont typeface="Wingdings" charset="2"/>
-              <a:buChar char=""/>
-            </a:pPr>
-            <a:r>
-              <a:rPr b="0" lang="en-US" sz="3200" spc="-1" strike="noStrike">
-                <a:solidFill>
-                  <a:srgbClr val="000000"/>
-                </a:solidFill>
-                <a:latin typeface="Arial"/>
-                <a:ea typeface="DejaVu Sans"/>
-              </a:rPr>
-              <a:t>All of this code needs to come together.</a:t>
-            </a:r>
-            <a:endParaRPr b="0" lang="en-US" sz="3200" spc="-1" strike="noStrike">
-              <a:latin typeface="Arial"/>
-            </a:endParaRPr>
-          </a:p>
-          <a:p>
-            <a:pPr marL="432000" indent="-323280">
+            <a:pPr marL="432000" indent="-322920">
               <a:lnSpc>
                 <a:spcPct val="100000"/>
               </a:lnSpc>
@@ -33966,7 +33973,7 @@
         <p:spPr>
           <a:xfrm>
             <a:off x="504000" y="301320"/>
-            <a:ext cx="9070920" cy="1261440"/>
+            <a:ext cx="9070560" cy="1261080"/>
           </a:xfrm>
           <a:prstGeom prst="rect">
             <a:avLst/>
@@ -34015,7 +34022,7 @@
         <p:spPr>
           <a:xfrm>
             <a:off x="504000" y="1769040"/>
-            <a:ext cx="9070920" cy="4383720"/>
+            <a:ext cx="9070560" cy="4383360"/>
           </a:xfrm>
           <a:prstGeom prst="rect">
             <a:avLst/>
@@ -34034,7 +34041,7 @@
         <p:txBody>
           <a:bodyPr lIns="0" rIns="0" tIns="0" bIns="0"/>
           <a:p>
-            <a:pPr marL="432000" indent="-323280">
+            <a:pPr marL="432000" indent="-322920">
               <a:lnSpc>
                 <a:spcPct val="100000"/>
               </a:lnSpc>
@@ -34063,14 +34070,14 @@
                 <a:latin typeface="Arial"/>
                 <a:ea typeface="DejaVu Sans"/>
               </a:rPr>
-              <a:t>master’ should always work.</a:t>
+              <a:t>master’ branch will always work.</a:t>
             </a:r>
             <a:endParaRPr b="0" lang="en-US" sz="3200" spc="-1" strike="noStrike">
               <a:latin typeface="Arial"/>
             </a:endParaRPr>
           </a:p>
           <a:p>
-            <a:pPr marL="432000" indent="-323280">
+            <a:pPr marL="432000" indent="-322920">
               <a:lnSpc>
                 <a:spcPct val="100000"/>
               </a:lnSpc>
@@ -34096,7 +34103,7 @@
             </a:endParaRPr>
           </a:p>
           <a:p>
-            <a:pPr marL="432000" indent="-323280">
+            <a:pPr marL="432000" indent="-322920">
               <a:lnSpc>
                 <a:spcPct val="100000"/>
               </a:lnSpc>
@@ -34122,7 +34129,7 @@
             </a:endParaRPr>
           </a:p>
           <a:p>
-            <a:pPr marL="432000" indent="-323280">
+            <a:pPr marL="432000" indent="-322920">
               <a:lnSpc>
                 <a:spcPct val="100000"/>
               </a:lnSpc>
@@ -34148,7 +34155,7 @@
             </a:endParaRPr>
           </a:p>
           <a:p>
-            <a:pPr marL="432000" indent="-323280">
+            <a:pPr marL="432000" indent="-322920">
               <a:lnSpc>
                 <a:spcPct val="100000"/>
               </a:lnSpc>
@@ -34233,7 +34240,7 @@
         <p:spPr>
           <a:xfrm>
             <a:off x="504000" y="301320"/>
-            <a:ext cx="9070920" cy="1261440"/>
+            <a:ext cx="9070560" cy="1261080"/>
           </a:xfrm>
           <a:prstGeom prst="rect">
             <a:avLst/>
@@ -34282,7 +34289,7 @@
         <p:spPr>
           <a:xfrm>
             <a:off x="504000" y="1769040"/>
-            <a:ext cx="9070920" cy="4383720"/>
+            <a:ext cx="9070560" cy="4383360"/>
           </a:xfrm>
           <a:prstGeom prst="rect">
             <a:avLst/>
@@ -34301,7 +34308,7 @@
         <p:txBody>
           <a:bodyPr lIns="0" rIns="0" tIns="0" bIns="0"/>
           <a:p>
-            <a:pPr marL="432000" indent="-323280">
+            <a:pPr marL="432000" indent="-322920">
               <a:lnSpc>
                 <a:spcPct val="100000"/>
               </a:lnSpc>
@@ -34327,7 +34334,7 @@
             </a:endParaRPr>
           </a:p>
           <a:p>
-            <a:pPr marL="432000" indent="-323280">
+            <a:pPr marL="432000" indent="-322920">
               <a:lnSpc>
                 <a:spcPct val="100000"/>
               </a:lnSpc>
@@ -34353,7 +34360,7 @@
             </a:endParaRPr>
           </a:p>
           <a:p>
-            <a:pPr marL="432000" indent="-323280">
+            <a:pPr marL="432000" indent="-322920">
               <a:lnSpc>
                 <a:spcPct val="100000"/>
               </a:lnSpc>
@@ -35113,7 +35120,7 @@
         <p:spPr>
           <a:xfrm>
             <a:off x="3049920" y="1486800"/>
-            <a:ext cx="90720" cy="90720"/>
+            <a:ext cx="90360" cy="90360"/>
           </a:xfrm>
           <a:prstGeom prst="ellipse">
             <a:avLst/>
@@ -35251,7 +35258,7 @@
         <p:spPr>
           <a:xfrm>
             <a:off x="3108960" y="1005840"/>
-            <a:ext cx="365040" cy="273600"/>
+            <a:ext cx="364680" cy="273240"/>
           </a:xfrm>
           <a:custGeom>
             <a:avLst/>
@@ -35679,7 +35686,7 @@
         <p:spPr>
           <a:xfrm>
             <a:off x="4023360" y="365760"/>
-            <a:ext cx="5485680" cy="345600"/>
+            <a:ext cx="5485320" cy="345240"/>
           </a:xfrm>
           <a:prstGeom prst="rect">
             <a:avLst/>
@@ -35772,7 +35779,7 @@
         <p:spPr>
           <a:xfrm>
             <a:off x="504000" y="301320"/>
-            <a:ext cx="9070920" cy="1261440"/>
+            <a:ext cx="9070560" cy="1261080"/>
           </a:xfrm>
           <a:prstGeom prst="rect">
             <a:avLst/>
@@ -35821,7 +35828,7 @@
         <p:spPr>
           <a:xfrm>
             <a:off x="1463040" y="1371600"/>
-            <a:ext cx="7954560" cy="5526360"/>
+            <a:ext cx="7954200" cy="5526000"/>
           </a:xfrm>
           <a:prstGeom prst="rect">
             <a:avLst/>
@@ -36245,6 +36252,737 @@
           <p:childTnLst>
             <p:seq>
               <p:cTn id="120" nodeType="mainSeq"/>
+              <p:prevCondLst>
+                <p:cond delay="0" evt="onPrev">
+                  <p:tgtEl>
+                    <p:sldTgt/>
+                  </p:tgtEl>
+                </p:cond>
+              </p:prevCondLst>
+              <p:nextCondLst>
+                <p:cond delay="0" evt="onNext">
+                  <p:tgtEl>
+                    <p:sldTgt/>
+                  </p:tgtEl>
+                </p:cond>
+              </p:nextCondLst>
+            </p:seq>
+          </p:childTnLst>
+        </p:cTn>
+      </p:par>
+    </p:tnLst>
+  </p:timing>
+</p:sld>
+</file>
+
+<file path=ppt/slides/slide61.xml><?xml version="1.0" encoding="utf-8"?>
+<p:sld xmlns:a="http://schemas.openxmlformats.org/drawingml/2006/main" xmlns:p="http://schemas.openxmlformats.org/presentationml/2006/main" xmlns:r="http://schemas.openxmlformats.org/officeDocument/2006/relationships" xmlns:p14="http://schemas.microsoft.com/office/powerpoint/2010/main" xmlns:p15="http://schemas.microsoft.com/office/powerpoint/2012/main" xmlns:mc="http://schemas.openxmlformats.org/markup-compatibility/2006">
+  <p:cSld>
+    <p:spTree>
+      <p:nvGrpSpPr>
+        <p:cNvPr id="1" name=""/>
+        <p:cNvGrpSpPr/>
+        <p:nvPr/>
+      </p:nvGrpSpPr>
+      <p:grpSpPr>
+        <a:xfrm>
+          <a:off x="0" y="0"/>
+          <a:ext cx="0" cy="0"/>
+          <a:chOff x="0" y="0"/>
+          <a:chExt cx="0" cy="0"/>
+        </a:xfrm>
+      </p:grpSpPr>
+      <p:sp>
+        <p:nvSpPr>
+          <p:cNvPr id="732" name="CustomShape 1"/>
+          <p:cNvSpPr/>
+          <p:nvPr/>
+        </p:nvSpPr>
+        <p:spPr>
+          <a:xfrm>
+            <a:off x="4592520" y="6698880"/>
+            <a:ext cx="588240" cy="333000"/>
+          </a:xfrm>
+          <a:prstGeom prst="ellipse">
+            <a:avLst/>
+          </a:prstGeom>
+          <a:solidFill>
+            <a:srgbClr val="729fcf"/>
+          </a:solidFill>
+          <a:ln>
+            <a:solidFill>
+              <a:srgbClr val="3465a4"/>
+            </a:solidFill>
+          </a:ln>
+        </p:spPr>
+        <p:style>
+          <a:lnRef idx="0"/>
+          <a:fillRef idx="0"/>
+          <a:effectRef idx="0"/>
+          <a:fontRef idx="minor"/>
+        </p:style>
+      </p:sp>
+      <p:sp>
+        <p:nvSpPr>
+          <p:cNvPr id="733" name="CustomShape 2"/>
+          <p:cNvSpPr/>
+          <p:nvPr/>
+        </p:nvSpPr>
+        <p:spPr>
+          <a:xfrm>
+            <a:off x="4574520" y="5944680"/>
+            <a:ext cx="588240" cy="333000"/>
+          </a:xfrm>
+          <a:prstGeom prst="ellipse">
+            <a:avLst/>
+          </a:prstGeom>
+          <a:solidFill>
+            <a:srgbClr val="729fcf"/>
+          </a:solidFill>
+          <a:ln>
+            <a:solidFill>
+              <a:srgbClr val="3465a4"/>
+            </a:solidFill>
+          </a:ln>
+        </p:spPr>
+        <p:style>
+          <a:lnRef idx="0"/>
+          <a:fillRef idx="0"/>
+          <a:effectRef idx="0"/>
+          <a:fontRef idx="minor"/>
+        </p:style>
+      </p:sp>
+      <p:sp>
+        <p:nvSpPr>
+          <p:cNvPr id="734" name="CustomShape 3"/>
+          <p:cNvSpPr/>
+          <p:nvPr/>
+        </p:nvSpPr>
+        <p:spPr>
+          <a:xfrm>
+            <a:off x="4574520" y="5204520"/>
+            <a:ext cx="588240" cy="333000"/>
+          </a:xfrm>
+          <a:prstGeom prst="ellipse">
+            <a:avLst/>
+          </a:prstGeom>
+          <a:solidFill>
+            <a:srgbClr val="729fcf"/>
+          </a:solidFill>
+          <a:ln>
+            <a:solidFill>
+              <a:srgbClr val="3465a4"/>
+            </a:solidFill>
+          </a:ln>
+        </p:spPr>
+        <p:style>
+          <a:lnRef idx="0"/>
+          <a:fillRef idx="0"/>
+          <a:effectRef idx="0"/>
+          <a:fontRef idx="minor"/>
+        </p:style>
+      </p:sp>
+      <p:sp>
+        <p:nvSpPr>
+          <p:cNvPr id="735" name="CustomShape 4"/>
+          <p:cNvSpPr/>
+          <p:nvPr/>
+        </p:nvSpPr>
+        <p:spPr>
+          <a:xfrm>
+            <a:off x="4574520" y="4464360"/>
+            <a:ext cx="588240" cy="333000"/>
+          </a:xfrm>
+          <a:prstGeom prst="ellipse">
+            <a:avLst/>
+          </a:prstGeom>
+          <a:solidFill>
+            <a:srgbClr val="729fcf"/>
+          </a:solidFill>
+          <a:ln>
+            <a:solidFill>
+              <a:srgbClr val="3465a4"/>
+            </a:solidFill>
+          </a:ln>
+        </p:spPr>
+        <p:style>
+          <a:lnRef idx="0"/>
+          <a:fillRef idx="0"/>
+          <a:effectRef idx="0"/>
+          <a:fontRef idx="minor"/>
+        </p:style>
+      </p:sp>
+      <p:sp>
+        <p:nvSpPr>
+          <p:cNvPr id="736" name="Line 5"/>
+          <p:cNvSpPr/>
+          <p:nvPr/>
+        </p:nvSpPr>
+        <p:spPr>
+          <a:xfrm flipV="1">
+            <a:off x="4901040" y="6277680"/>
+            <a:ext cx="0" cy="407160"/>
+          </a:xfrm>
+          <a:prstGeom prst="line">
+            <a:avLst/>
+          </a:prstGeom>
+          <a:ln>
+            <a:solidFill>
+              <a:srgbClr val="000000"/>
+            </a:solidFill>
+            <a:tailEnd len="med" type="triangle" w="med"/>
+          </a:ln>
+        </p:spPr>
+        <p:style>
+          <a:lnRef idx="0"/>
+          <a:fillRef idx="0"/>
+          <a:effectRef idx="0"/>
+          <a:fontRef idx="minor"/>
+        </p:style>
+      </p:sp>
+      <p:sp>
+        <p:nvSpPr>
+          <p:cNvPr id="737" name="Line 6"/>
+          <p:cNvSpPr/>
+          <p:nvPr/>
+        </p:nvSpPr>
+        <p:spPr>
+          <a:xfrm flipV="1">
+            <a:off x="4901040" y="5537520"/>
+            <a:ext cx="0" cy="407160"/>
+          </a:xfrm>
+          <a:prstGeom prst="line">
+            <a:avLst/>
+          </a:prstGeom>
+          <a:ln>
+            <a:solidFill>
+              <a:srgbClr val="000000"/>
+            </a:solidFill>
+            <a:tailEnd len="med" type="triangle" w="med"/>
+          </a:ln>
+        </p:spPr>
+        <p:style>
+          <a:lnRef idx="0"/>
+          <a:fillRef idx="0"/>
+          <a:effectRef idx="0"/>
+          <a:fontRef idx="minor"/>
+        </p:style>
+      </p:sp>
+      <p:sp>
+        <p:nvSpPr>
+          <p:cNvPr id="738" name="Line 7"/>
+          <p:cNvSpPr/>
+          <p:nvPr/>
+        </p:nvSpPr>
+        <p:spPr>
+          <a:xfrm flipV="1">
+            <a:off x="4901040" y="4797360"/>
+            <a:ext cx="0" cy="407160"/>
+          </a:xfrm>
+          <a:prstGeom prst="line">
+            <a:avLst/>
+          </a:prstGeom>
+          <a:ln>
+            <a:solidFill>
+              <a:srgbClr val="000000"/>
+            </a:solidFill>
+            <a:tailEnd len="med" type="triangle" w="med"/>
+          </a:ln>
+        </p:spPr>
+        <p:style>
+          <a:lnRef idx="0"/>
+          <a:fillRef idx="0"/>
+          <a:effectRef idx="0"/>
+          <a:fontRef idx="minor"/>
+        </p:style>
+      </p:sp>
+      <p:sp>
+        <p:nvSpPr>
+          <p:cNvPr id="739" name="TextShape 8"/>
+          <p:cNvSpPr txBox="1"/>
+          <p:nvPr/>
+        </p:nvSpPr>
+        <p:spPr>
+          <a:xfrm>
+            <a:off x="2809800" y="4516920"/>
+            <a:ext cx="1503000" cy="297720"/>
+          </a:xfrm>
+          <a:prstGeom prst="rect">
+            <a:avLst/>
+          </a:prstGeom>
+          <a:noFill/>
+          <a:ln>
+            <a:noFill/>
+          </a:ln>
+        </p:spPr>
+        <p:txBody>
+          <a:bodyPr lIns="90000" rIns="90000" tIns="45000" bIns="45000"/>
+          <a:p>
+            <a:r>
+              <a:rPr b="0" lang="en-US" sz="1460" spc="-1" strike="noStrike">
+                <a:latin typeface="Arial"/>
+              </a:rPr>
+              <a:t>master</a:t>
+            </a:r>
+            <a:endParaRPr b="0" lang="en-US" sz="1460" spc="-1" strike="noStrike">
+              <a:latin typeface="Arial"/>
+            </a:endParaRPr>
+          </a:p>
+        </p:txBody>
+      </p:sp>
+      <p:sp>
+        <p:nvSpPr>
+          <p:cNvPr id="740" name="TextShape 9"/>
+          <p:cNvSpPr txBox="1"/>
+          <p:nvPr/>
+        </p:nvSpPr>
+        <p:spPr>
+          <a:xfrm>
+            <a:off x="5619960" y="4257720"/>
+            <a:ext cx="2875680" cy="297720"/>
+          </a:xfrm>
+          <a:prstGeom prst="rect">
+            <a:avLst/>
+          </a:prstGeom>
+          <a:noFill/>
+          <a:ln>
+            <a:noFill/>
+          </a:ln>
+        </p:spPr>
+        <p:txBody>
+          <a:bodyPr lIns="90000" rIns="90000" tIns="45000" bIns="45000"/>
+          <a:p>
+            <a:r>
+              <a:rPr b="0" lang="en-US" sz="1460" spc="-1" strike="noStrike">
+                <a:latin typeface="Arial"/>
+              </a:rPr>
+              <a:t>my_new_feature</a:t>
+            </a:r>
+            <a:endParaRPr b="0" lang="en-US" sz="1460" spc="-1" strike="noStrike">
+              <a:latin typeface="Arial"/>
+            </a:endParaRPr>
+          </a:p>
+        </p:txBody>
+      </p:sp>
+      <p:sp>
+        <p:nvSpPr>
+          <p:cNvPr id="741" name="CustomShape 10"/>
+          <p:cNvSpPr/>
+          <p:nvPr/>
+        </p:nvSpPr>
+        <p:spPr>
+          <a:xfrm>
+            <a:off x="5946840" y="3798000"/>
+            <a:ext cx="588240" cy="333000"/>
+          </a:xfrm>
+          <a:prstGeom prst="ellipse">
+            <a:avLst/>
+          </a:prstGeom>
+          <a:solidFill>
+            <a:srgbClr val="729fcf"/>
+          </a:solidFill>
+          <a:ln>
+            <a:solidFill>
+              <a:srgbClr val="3465a4"/>
+            </a:solidFill>
+          </a:ln>
+        </p:spPr>
+        <p:style>
+          <a:lnRef idx="0"/>
+          <a:fillRef idx="0"/>
+          <a:effectRef idx="0"/>
+          <a:fontRef idx="minor"/>
+        </p:style>
+      </p:sp>
+      <p:sp>
+        <p:nvSpPr>
+          <p:cNvPr id="742" name="Line 11"/>
+          <p:cNvSpPr/>
+          <p:nvPr/>
+        </p:nvSpPr>
+        <p:spPr>
+          <a:xfrm flipV="1">
+            <a:off x="4835880" y="4093920"/>
+            <a:ext cx="1242000" cy="370080"/>
+          </a:xfrm>
+          <a:prstGeom prst="line">
+            <a:avLst/>
+          </a:prstGeom>
+          <a:ln>
+            <a:solidFill>
+              <a:srgbClr val="000000"/>
+            </a:solidFill>
+            <a:tailEnd len="med" type="triangle" w="med"/>
+          </a:ln>
+        </p:spPr>
+        <p:style>
+          <a:lnRef idx="0"/>
+          <a:fillRef idx="0"/>
+          <a:effectRef idx="0"/>
+          <a:fontRef idx="minor"/>
+        </p:style>
+      </p:sp>
+      <p:sp>
+        <p:nvSpPr>
+          <p:cNvPr id="743" name="CustomShape 12"/>
+          <p:cNvSpPr/>
+          <p:nvPr/>
+        </p:nvSpPr>
+        <p:spPr>
+          <a:xfrm>
+            <a:off x="5881680" y="3071880"/>
+            <a:ext cx="588240" cy="333000"/>
+          </a:xfrm>
+          <a:prstGeom prst="ellipse">
+            <a:avLst/>
+          </a:prstGeom>
+          <a:solidFill>
+            <a:srgbClr val="729fcf"/>
+          </a:solidFill>
+          <a:ln>
+            <a:solidFill>
+              <a:srgbClr val="3465a4"/>
+            </a:solidFill>
+          </a:ln>
+        </p:spPr>
+        <p:style>
+          <a:lnRef idx="0"/>
+          <a:fillRef idx="0"/>
+          <a:effectRef idx="0"/>
+          <a:fontRef idx="minor"/>
+        </p:style>
+      </p:sp>
+      <p:sp>
+        <p:nvSpPr>
+          <p:cNvPr id="744" name="CustomShape 13"/>
+          <p:cNvSpPr/>
+          <p:nvPr/>
+        </p:nvSpPr>
+        <p:spPr>
+          <a:xfrm>
+            <a:off x="5881680" y="2331720"/>
+            <a:ext cx="588240" cy="333000"/>
+          </a:xfrm>
+          <a:prstGeom prst="ellipse">
+            <a:avLst/>
+          </a:prstGeom>
+          <a:solidFill>
+            <a:srgbClr val="729fcf"/>
+          </a:solidFill>
+          <a:ln>
+            <a:solidFill>
+              <a:srgbClr val="3465a4"/>
+            </a:solidFill>
+          </a:ln>
+        </p:spPr>
+        <p:style>
+          <a:lnRef idx="0"/>
+          <a:fillRef idx="0"/>
+          <a:effectRef idx="0"/>
+          <a:fontRef idx="minor"/>
+        </p:style>
+      </p:sp>
+      <p:sp>
+        <p:nvSpPr>
+          <p:cNvPr id="745" name="Line 14"/>
+          <p:cNvSpPr/>
+          <p:nvPr/>
+        </p:nvSpPr>
+        <p:spPr>
+          <a:xfrm flipV="1">
+            <a:off x="6208200" y="3404880"/>
+            <a:ext cx="0" cy="407160"/>
+          </a:xfrm>
+          <a:prstGeom prst="line">
+            <a:avLst/>
+          </a:prstGeom>
+          <a:ln>
+            <a:solidFill>
+              <a:srgbClr val="000000"/>
+            </a:solidFill>
+            <a:tailEnd len="med" type="triangle" w="med"/>
+          </a:ln>
+        </p:spPr>
+        <p:style>
+          <a:lnRef idx="0"/>
+          <a:fillRef idx="0"/>
+          <a:effectRef idx="0"/>
+          <a:fontRef idx="minor"/>
+        </p:style>
+      </p:sp>
+      <p:sp>
+        <p:nvSpPr>
+          <p:cNvPr id="746" name="Line 15"/>
+          <p:cNvSpPr/>
+          <p:nvPr/>
+        </p:nvSpPr>
+        <p:spPr>
+          <a:xfrm flipV="1">
+            <a:off x="6208200" y="2664720"/>
+            <a:ext cx="0" cy="407160"/>
+          </a:xfrm>
+          <a:prstGeom prst="line">
+            <a:avLst/>
+          </a:prstGeom>
+          <a:ln>
+            <a:solidFill>
+              <a:srgbClr val="000000"/>
+            </a:solidFill>
+            <a:tailEnd len="med" type="triangle" w="med"/>
+          </a:ln>
+        </p:spPr>
+        <p:style>
+          <a:lnRef idx="0"/>
+          <a:fillRef idx="0"/>
+          <a:effectRef idx="0"/>
+          <a:fontRef idx="minor"/>
+        </p:style>
+      </p:sp>
+      <p:sp>
+        <p:nvSpPr>
+          <p:cNvPr id="747" name="CustomShape 16"/>
+          <p:cNvSpPr/>
+          <p:nvPr/>
+        </p:nvSpPr>
+        <p:spPr>
+          <a:xfrm>
+            <a:off x="7515360" y="1739520"/>
+            <a:ext cx="588240" cy="333000"/>
+          </a:xfrm>
+          <a:prstGeom prst="ellipse">
+            <a:avLst/>
+          </a:prstGeom>
+          <a:solidFill>
+            <a:srgbClr val="729fcf"/>
+          </a:solidFill>
+          <a:ln>
+            <a:solidFill>
+              <a:srgbClr val="3465a4"/>
+            </a:solidFill>
+          </a:ln>
+        </p:spPr>
+        <p:style>
+          <a:lnRef idx="0"/>
+          <a:fillRef idx="0"/>
+          <a:effectRef idx="0"/>
+          <a:fontRef idx="minor"/>
+        </p:style>
+      </p:sp>
+      <p:sp>
+        <p:nvSpPr>
+          <p:cNvPr id="748" name="Line 17"/>
+          <p:cNvSpPr/>
+          <p:nvPr/>
+        </p:nvSpPr>
+        <p:spPr>
+          <a:xfrm flipV="1">
+            <a:off x="6404040" y="2035440"/>
+            <a:ext cx="1242000" cy="370080"/>
+          </a:xfrm>
+          <a:prstGeom prst="line">
+            <a:avLst/>
+          </a:prstGeom>
+          <a:ln>
+            <a:solidFill>
+              <a:srgbClr val="000000"/>
+            </a:solidFill>
+            <a:tailEnd len="med" type="triangle" w="med"/>
+          </a:ln>
+        </p:spPr>
+        <p:style>
+          <a:lnRef idx="0"/>
+          <a:fillRef idx="0"/>
+          <a:effectRef idx="0"/>
+          <a:fontRef idx="minor"/>
+        </p:style>
+      </p:sp>
+      <p:sp>
+        <p:nvSpPr>
+          <p:cNvPr id="749" name="CustomShape 18"/>
+          <p:cNvSpPr/>
+          <p:nvPr/>
+        </p:nvSpPr>
+        <p:spPr>
+          <a:xfrm>
+            <a:off x="7450200" y="1013400"/>
+            <a:ext cx="588240" cy="333000"/>
+          </a:xfrm>
+          <a:prstGeom prst="ellipse">
+            <a:avLst/>
+          </a:prstGeom>
+          <a:solidFill>
+            <a:srgbClr val="729fcf"/>
+          </a:solidFill>
+          <a:ln>
+            <a:solidFill>
+              <a:srgbClr val="3465a4"/>
+            </a:solidFill>
+          </a:ln>
+        </p:spPr>
+        <p:style>
+          <a:lnRef idx="0"/>
+          <a:fillRef idx="0"/>
+          <a:effectRef idx="0"/>
+          <a:fontRef idx="minor"/>
+        </p:style>
+      </p:sp>
+      <p:sp>
+        <p:nvSpPr>
+          <p:cNvPr id="750" name="Line 19"/>
+          <p:cNvSpPr/>
+          <p:nvPr/>
+        </p:nvSpPr>
+        <p:spPr>
+          <a:xfrm flipV="1">
+            <a:off x="7776720" y="1346040"/>
+            <a:ext cx="0" cy="407160"/>
+          </a:xfrm>
+          <a:prstGeom prst="line">
+            <a:avLst/>
+          </a:prstGeom>
+          <a:ln>
+            <a:solidFill>
+              <a:srgbClr val="000000"/>
+            </a:solidFill>
+            <a:tailEnd len="med" type="triangle" w="med"/>
+          </a:ln>
+        </p:spPr>
+        <p:style>
+          <a:lnRef idx="0"/>
+          <a:fillRef idx="0"/>
+          <a:effectRef idx="0"/>
+          <a:fontRef idx="minor"/>
+        </p:style>
+      </p:sp>
+      <p:sp>
+        <p:nvSpPr>
+          <p:cNvPr id="751" name="Line 20"/>
+          <p:cNvSpPr/>
+          <p:nvPr/>
+        </p:nvSpPr>
+        <p:spPr>
+          <a:xfrm flipH="1" flipV="1">
+            <a:off x="6338880" y="740160"/>
+            <a:ext cx="1110960" cy="407160"/>
+          </a:xfrm>
+          <a:prstGeom prst="line">
+            <a:avLst/>
+          </a:prstGeom>
+          <a:ln>
+            <a:solidFill>
+              <a:srgbClr val="000000"/>
+            </a:solidFill>
+            <a:tailEnd len="med" type="triangle" w="med"/>
+          </a:ln>
+        </p:spPr>
+        <p:style>
+          <a:lnRef idx="0"/>
+          <a:fillRef idx="0"/>
+          <a:effectRef idx="0"/>
+          <a:fontRef idx="minor"/>
+        </p:style>
+      </p:sp>
+      <p:sp>
+        <p:nvSpPr>
+          <p:cNvPr id="752" name="TextShape 21"/>
+          <p:cNvSpPr txBox="1"/>
+          <p:nvPr/>
+        </p:nvSpPr>
+        <p:spPr>
+          <a:xfrm>
+            <a:off x="7319160" y="2220480"/>
+            <a:ext cx="2875680" cy="297720"/>
+          </a:xfrm>
+          <a:prstGeom prst="rect">
+            <a:avLst/>
+          </a:prstGeom>
+          <a:noFill/>
+          <a:ln>
+            <a:noFill/>
+          </a:ln>
+        </p:spPr>
+        <p:txBody>
+          <a:bodyPr lIns="90000" rIns="90000" tIns="45000" bIns="45000"/>
+          <a:p>
+            <a:r>
+              <a:rPr b="0" lang="en-US" sz="1460" spc="-1" strike="noStrike">
+                <a:latin typeface="Arial"/>
+              </a:rPr>
+              <a:t>an_experiment</a:t>
+            </a:r>
+            <a:endParaRPr b="0" lang="en-US" sz="1460" spc="-1" strike="noStrike">
+              <a:latin typeface="Arial"/>
+            </a:endParaRPr>
+          </a:p>
+        </p:txBody>
+      </p:sp>
+      <p:sp>
+        <p:nvSpPr>
+          <p:cNvPr id="753" name="CustomShape 22"/>
+          <p:cNvSpPr/>
+          <p:nvPr/>
+        </p:nvSpPr>
+        <p:spPr>
+          <a:xfrm>
+            <a:off x="5816160" y="467280"/>
+            <a:ext cx="588240" cy="333000"/>
+          </a:xfrm>
+          <a:prstGeom prst="ellipse">
+            <a:avLst/>
+          </a:prstGeom>
+          <a:solidFill>
+            <a:srgbClr val="729fcf"/>
+          </a:solidFill>
+          <a:ln>
+            <a:solidFill>
+              <a:srgbClr val="3465a4"/>
+            </a:solidFill>
+          </a:ln>
+        </p:spPr>
+        <p:style>
+          <a:lnRef idx="0"/>
+          <a:fillRef idx="0"/>
+          <a:effectRef idx="0"/>
+          <a:fontRef idx="minor"/>
+        </p:style>
+      </p:sp>
+      <p:sp>
+        <p:nvSpPr>
+          <p:cNvPr id="754" name="Line 23"/>
+          <p:cNvSpPr/>
+          <p:nvPr/>
+        </p:nvSpPr>
+        <p:spPr>
+          <a:xfrm flipV="1">
+            <a:off x="6077520" y="73800"/>
+            <a:ext cx="0" cy="407160"/>
+          </a:xfrm>
+          <a:prstGeom prst="line">
+            <a:avLst/>
+          </a:prstGeom>
+          <a:ln>
+            <a:solidFill>
+              <a:srgbClr val="000000"/>
+            </a:solidFill>
+            <a:tailEnd len="med" type="triangle" w="med"/>
+          </a:ln>
+        </p:spPr>
+        <p:style>
+          <a:lnRef idx="0"/>
+          <a:fillRef idx="0"/>
+          <a:effectRef idx="0"/>
+          <a:fontRef idx="minor"/>
+        </p:style>
+      </p:sp>
+    </p:spTree>
+  </p:cSld>
+  <p:timing>
+    <p:tnLst>
+      <p:par>
+        <p:cTn id="121" dur="indefinite" restart="never" nodeType="tmRoot">
+          <p:childTnLst>
+            <p:seq>
+              <p:cTn id="122" nodeType="mainSeq"/>
               <p:prevCondLst>
                 <p:cond delay="0" evt="onPrev">
                   <p:tgtEl>
@@ -36969,7 +37707,7 @@
         <p:spPr>
           <a:xfrm>
             <a:off x="3049920" y="1486800"/>
-            <a:ext cx="90720" cy="90720"/>
+            <a:ext cx="90360" cy="90360"/>
           </a:xfrm>
           <a:prstGeom prst="ellipse">
             <a:avLst/>
@@ -37107,7 +37845,7 @@
         <p:spPr>
           <a:xfrm>
             <a:off x="4206240" y="274320"/>
-            <a:ext cx="4479840" cy="345600"/>
+            <a:ext cx="4479480" cy="345240"/>
           </a:xfrm>
           <a:prstGeom prst="rect">
             <a:avLst/>
@@ -37151,7 +37889,7 @@
         <p:spPr>
           <a:xfrm>
             <a:off x="2468880" y="2651760"/>
-            <a:ext cx="4781880" cy="365040"/>
+            <a:ext cx="4781520" cy="364680"/>
           </a:xfrm>
           <a:prstGeom prst="ellipse">
             <a:avLst/>
@@ -37230,7 +37968,7 @@
         <p:spPr>
           <a:xfrm>
             <a:off x="504000" y="301320"/>
-            <a:ext cx="9070920" cy="1261440"/>
+            <a:ext cx="9070560" cy="1261080"/>
           </a:xfrm>
           <a:prstGeom prst="rect">
             <a:avLst/>
@@ -37279,7 +38017,7 @@
         <p:spPr>
           <a:xfrm>
             <a:off x="504000" y="1769040"/>
-            <a:ext cx="9070920" cy="4383720"/>
+            <a:ext cx="9070560" cy="4383360"/>
           </a:xfrm>
           <a:prstGeom prst="rect">
             <a:avLst/>
@@ -37397,7 +38135,7 @@
         <p:spPr>
           <a:xfrm>
             <a:off x="504000" y="301320"/>
-            <a:ext cx="9070920" cy="1261440"/>
+            <a:ext cx="9070560" cy="1261080"/>
           </a:xfrm>
           <a:prstGeom prst="rect">
             <a:avLst/>
@@ -37446,7 +38184,7 @@
         <p:spPr>
           <a:xfrm>
             <a:off x="504000" y="1769040"/>
-            <a:ext cx="9070920" cy="4383720"/>
+            <a:ext cx="9070560" cy="4383360"/>
           </a:xfrm>
           <a:prstGeom prst="rect">
             <a:avLst/>
@@ -37465,7 +38203,7 @@
         <p:txBody>
           <a:bodyPr lIns="0" rIns="0" tIns="0" bIns="0"/>
           <a:p>
-            <a:pPr marL="432000" indent="-323280">
+            <a:pPr marL="432000" indent="-322920">
               <a:lnSpc>
                 <a:spcPct val="100000"/>
               </a:lnSpc>
@@ -37501,7 +38239,7 @@
             </a:endParaRPr>
           </a:p>
           <a:p>
-            <a:pPr marL="432000" indent="-323280">
+            <a:pPr marL="432000" indent="-322920">
               <a:lnSpc>
                 <a:spcPct val="100000"/>
               </a:lnSpc>
@@ -37527,7 +38265,7 @@
             </a:endParaRPr>
           </a:p>
           <a:p>
-            <a:pPr marL="432000" indent="-323280">
+            <a:pPr marL="432000" indent="-322920">
               <a:lnSpc>
                 <a:spcPct val="100000"/>
               </a:lnSpc>
@@ -37553,7 +38291,7 @@
             </a:endParaRPr>
           </a:p>
           <a:p>
-            <a:pPr marL="432000" indent="-323280">
+            <a:pPr marL="432000" indent="-322920">
               <a:lnSpc>
                 <a:spcPct val="100000"/>
               </a:lnSpc>
@@ -37579,7 +38317,7 @@
             </a:endParaRPr>
           </a:p>
           <a:p>
-            <a:pPr marL="432000" indent="-323280">
+            <a:pPr marL="432000" indent="-322920">
               <a:lnSpc>
                 <a:spcPct val="100000"/>
               </a:lnSpc>

</xml_diff>

<commit_message>
Bruce found a good graphic that explains it all
</commit_message>
<xml_diff>
--- a/GIT Presentation.pptx
+++ b/GIT Presentation.pptx
@@ -72,6 +72,7 @@
     <p:sldId id="314" r:id="rId65"/>
     <p:sldId id="315" r:id="rId66"/>
     <p:sldId id="316" r:id="rId67"/>
+    <p:sldId id="317" r:id="rId68"/>
   </p:sldIdLst>
   <p:sldSz cx="10080625" cy="7559675"/>
   <p:notesSz cx="7772400" cy="10058400"/>
@@ -155,7 +156,7 @@
               <a:rPr b="0" lang="en-US" sz="1400" spc="-1" strike="noStrike">
                 <a:latin typeface="Times New Roman"/>
               </a:rPr>
-              <a:t>&lt;header&gt;</a:t>
+              <a:t> </a:t>
             </a:r>
             <a:endParaRPr b="0" lang="en-US" sz="1400" spc="-1" strike="noStrike">
               <a:latin typeface="Times New Roman"/>
@@ -190,7 +191,7 @@
               <a:rPr b="0" lang="en-US" sz="1400" spc="-1" strike="noStrike">
                 <a:latin typeface="Times New Roman"/>
               </a:rPr>
-              <a:t>&lt;date/time&gt;</a:t>
+              <a:t> </a:t>
             </a:r>
             <a:endParaRPr b="0" lang="en-US" sz="1400" spc="-1" strike="noStrike">
               <a:latin typeface="Times New Roman"/>
@@ -224,7 +225,7 @@
               <a:rPr b="0" lang="en-US" sz="1400" spc="-1" strike="noStrike">
                 <a:latin typeface="Times New Roman"/>
               </a:rPr>
-              <a:t>&lt;footer&gt;</a:t>
+              <a:t> </a:t>
             </a:r>
             <a:endParaRPr b="0" lang="en-US" sz="1400" spc="-1" strike="noStrike">
               <a:latin typeface="Times New Roman"/>
@@ -255,11 +256,11 @@
           <a:bodyPr lIns="0" rIns="0" tIns="0" bIns="0" anchor="b"/>
           <a:p>
             <a:pPr algn="r"/>
-            <a:fld id="{81E7049F-EE25-4A0D-B144-6F26BA4A8CD3}" type="slidenum">
+            <a:fld id="{BC6F58C1-2F32-4C41-ACEC-870305316053}" type="slidenum">
               <a:rPr b="0" lang="en-US" sz="1400" spc="-1" strike="noStrike">
                 <a:latin typeface="Times New Roman"/>
               </a:rPr>
-              <a:t>&lt;number&gt;</a:t>
+              <a:t>1</a:t>
             </a:fld>
             <a:endParaRPr b="0" lang="en-US" sz="1400" spc="-1" strike="noStrike">
               <a:latin typeface="Times New Roman"/>
@@ -292,7 +293,7 @@
       </p:grpSpPr>
       <p:sp>
         <p:nvSpPr>
-          <p:cNvPr id="755" name="PlaceHolder 1"/>
+          <p:cNvPr id="756" name="PlaceHolder 1"/>
           <p:cNvSpPr>
             <a:spLocks noGrp="1"/>
           </p:cNvSpPr>
@@ -351,7 +352,7 @@
       </p:grpSpPr>
       <p:sp>
         <p:nvSpPr>
-          <p:cNvPr id="764" name="PlaceHolder 1"/>
+          <p:cNvPr id="765" name="PlaceHolder 1"/>
           <p:cNvSpPr>
             <a:spLocks noGrp="1"/>
           </p:cNvSpPr>
@@ -410,7 +411,7 @@
       </p:grpSpPr>
       <p:sp>
         <p:nvSpPr>
-          <p:cNvPr id="765" name="PlaceHolder 1"/>
+          <p:cNvPr id="766" name="PlaceHolder 1"/>
           <p:cNvSpPr>
             <a:spLocks noGrp="1"/>
           </p:cNvSpPr>
@@ -469,7 +470,7 @@
       </p:grpSpPr>
       <p:sp>
         <p:nvSpPr>
-          <p:cNvPr id="766" name="PlaceHolder 1"/>
+          <p:cNvPr id="767" name="PlaceHolder 1"/>
           <p:cNvSpPr>
             <a:spLocks noGrp="1"/>
           </p:cNvSpPr>
@@ -525,7 +526,7 @@
       </p:grpSpPr>
       <p:sp>
         <p:nvSpPr>
-          <p:cNvPr id="767" name="PlaceHolder 1"/>
+          <p:cNvPr id="768" name="PlaceHolder 1"/>
           <p:cNvSpPr>
             <a:spLocks noGrp="1"/>
           </p:cNvSpPr>
@@ -622,7 +623,7 @@
       </p:grpSpPr>
       <p:sp>
         <p:nvSpPr>
-          <p:cNvPr id="768" name="PlaceHolder 1"/>
+          <p:cNvPr id="769" name="PlaceHolder 1"/>
           <p:cNvSpPr>
             <a:spLocks noGrp="1"/>
           </p:cNvSpPr>
@@ -681,7 +682,7 @@
       </p:grpSpPr>
       <p:sp>
         <p:nvSpPr>
-          <p:cNvPr id="769" name="PlaceHolder 1"/>
+          <p:cNvPr id="770" name="PlaceHolder 1"/>
           <p:cNvSpPr>
             <a:spLocks noGrp="1"/>
           </p:cNvSpPr>
@@ -740,7 +741,7 @@
       </p:grpSpPr>
       <p:sp>
         <p:nvSpPr>
-          <p:cNvPr id="770" name="PlaceHolder 1"/>
+          <p:cNvPr id="771" name="PlaceHolder 1"/>
           <p:cNvSpPr>
             <a:spLocks noGrp="1"/>
           </p:cNvSpPr>
@@ -809,7 +810,7 @@
       </p:grpSpPr>
       <p:sp>
         <p:nvSpPr>
-          <p:cNvPr id="756" name="PlaceHolder 1"/>
+          <p:cNvPr id="757" name="PlaceHolder 1"/>
           <p:cNvSpPr>
             <a:spLocks noGrp="1"/>
           </p:cNvSpPr>
@@ -887,7 +888,7 @@
       </p:grpSpPr>
       <p:sp>
         <p:nvSpPr>
-          <p:cNvPr id="771" name="PlaceHolder 1"/>
+          <p:cNvPr id="772" name="PlaceHolder 1"/>
           <p:cNvSpPr>
             <a:spLocks noGrp="1"/>
           </p:cNvSpPr>
@@ -965,7 +966,7 @@
       </p:grpSpPr>
       <p:sp>
         <p:nvSpPr>
-          <p:cNvPr id="772" name="PlaceHolder 1"/>
+          <p:cNvPr id="773" name="PlaceHolder 1"/>
           <p:cNvSpPr>
             <a:spLocks noGrp="1"/>
           </p:cNvSpPr>
@@ -1038,7 +1039,7 @@
       </p:grpSpPr>
       <p:sp>
         <p:nvSpPr>
-          <p:cNvPr id="773" name="PlaceHolder 1"/>
+          <p:cNvPr id="774" name="PlaceHolder 1"/>
           <p:cNvSpPr>
             <a:spLocks noGrp="1"/>
           </p:cNvSpPr>
@@ -1097,7 +1098,7 @@
       </p:grpSpPr>
       <p:sp>
         <p:nvSpPr>
-          <p:cNvPr id="774" name="PlaceHolder 1"/>
+          <p:cNvPr id="775" name="PlaceHolder 1"/>
           <p:cNvSpPr>
             <a:spLocks noGrp="1"/>
           </p:cNvSpPr>
@@ -1194,7 +1195,7 @@
       </p:grpSpPr>
       <p:sp>
         <p:nvSpPr>
-          <p:cNvPr id="757" name="PlaceHolder 1"/>
+          <p:cNvPr id="758" name="PlaceHolder 1"/>
           <p:cNvSpPr>
             <a:spLocks noGrp="1"/>
           </p:cNvSpPr>
@@ -1272,7 +1273,7 @@
       </p:grpSpPr>
       <p:sp>
         <p:nvSpPr>
-          <p:cNvPr id="775" name="PlaceHolder 1"/>
+          <p:cNvPr id="776" name="PlaceHolder 1"/>
           <p:cNvSpPr>
             <a:spLocks noGrp="1"/>
           </p:cNvSpPr>
@@ -1359,7 +1360,7 @@
       </p:grpSpPr>
       <p:sp>
         <p:nvSpPr>
-          <p:cNvPr id="776" name="PlaceHolder 1"/>
+          <p:cNvPr id="777" name="PlaceHolder 1"/>
           <p:cNvSpPr>
             <a:spLocks noGrp="1"/>
           </p:cNvSpPr>
@@ -1418,7 +1419,7 @@
       </p:grpSpPr>
       <p:sp>
         <p:nvSpPr>
-          <p:cNvPr id="777" name="PlaceHolder 1"/>
+          <p:cNvPr id="778" name="PlaceHolder 1"/>
           <p:cNvSpPr>
             <a:spLocks noGrp="1"/>
           </p:cNvSpPr>
@@ -1534,7 +1535,7 @@
       </p:grpSpPr>
       <p:sp>
         <p:nvSpPr>
-          <p:cNvPr id="758" name="PlaceHolder 1"/>
+          <p:cNvPr id="759" name="PlaceHolder 1"/>
           <p:cNvSpPr>
             <a:spLocks noGrp="1"/>
           </p:cNvSpPr>
@@ -1640,7 +1641,7 @@
       </p:grpSpPr>
       <p:sp>
         <p:nvSpPr>
-          <p:cNvPr id="778" name="PlaceHolder 1"/>
+          <p:cNvPr id="779" name="PlaceHolder 1"/>
           <p:cNvSpPr>
             <a:spLocks noGrp="1"/>
           </p:cNvSpPr>
@@ -1709,7 +1710,7 @@
       </p:grpSpPr>
       <p:sp>
         <p:nvSpPr>
-          <p:cNvPr id="779" name="PlaceHolder 1"/>
+          <p:cNvPr id="780" name="PlaceHolder 1"/>
           <p:cNvSpPr>
             <a:spLocks noGrp="1"/>
           </p:cNvSpPr>
@@ -1796,7 +1797,7 @@
       </p:grpSpPr>
       <p:sp>
         <p:nvSpPr>
-          <p:cNvPr id="780" name="PlaceHolder 1"/>
+          <p:cNvPr id="781" name="PlaceHolder 1"/>
           <p:cNvSpPr>
             <a:spLocks noGrp="1"/>
           </p:cNvSpPr>
@@ -1874,7 +1875,7 @@
       </p:grpSpPr>
       <p:sp>
         <p:nvSpPr>
-          <p:cNvPr id="781" name="PlaceHolder 1"/>
+          <p:cNvPr id="782" name="PlaceHolder 1"/>
           <p:cNvSpPr>
             <a:spLocks noGrp="1"/>
           </p:cNvSpPr>
@@ -1943,7 +1944,7 @@
       </p:grpSpPr>
       <p:sp>
         <p:nvSpPr>
-          <p:cNvPr id="759" name="PlaceHolder 1"/>
+          <p:cNvPr id="760" name="PlaceHolder 1"/>
           <p:cNvSpPr>
             <a:spLocks noGrp="1"/>
           </p:cNvSpPr>
@@ -2101,7 +2102,7 @@
       </p:grpSpPr>
       <p:sp>
         <p:nvSpPr>
-          <p:cNvPr id="782" name="PlaceHolder 1"/>
+          <p:cNvPr id="783" name="PlaceHolder 1"/>
           <p:cNvSpPr>
             <a:spLocks noGrp="1"/>
           </p:cNvSpPr>
@@ -2160,7 +2161,7 @@
       </p:grpSpPr>
       <p:sp>
         <p:nvSpPr>
-          <p:cNvPr id="783" name="PlaceHolder 1"/>
+          <p:cNvPr id="784" name="PlaceHolder 1"/>
           <p:cNvSpPr>
             <a:spLocks noGrp="1"/>
           </p:cNvSpPr>
@@ -2247,7 +2248,7 @@
       </p:grpSpPr>
       <p:sp>
         <p:nvSpPr>
-          <p:cNvPr id="760" name="PlaceHolder 1"/>
+          <p:cNvPr id="761" name="PlaceHolder 1"/>
           <p:cNvSpPr>
             <a:spLocks noGrp="1"/>
           </p:cNvSpPr>
@@ -2311,7 +2312,7 @@
       </p:grpSpPr>
       <p:sp>
         <p:nvSpPr>
-          <p:cNvPr id="761" name="PlaceHolder 1"/>
+          <p:cNvPr id="762" name="PlaceHolder 1"/>
           <p:cNvSpPr>
             <a:spLocks noGrp="1"/>
           </p:cNvSpPr>
@@ -2370,7 +2371,7 @@
       </p:grpSpPr>
       <p:sp>
         <p:nvSpPr>
-          <p:cNvPr id="762" name="PlaceHolder 1"/>
+          <p:cNvPr id="763" name="PlaceHolder 1"/>
           <p:cNvSpPr>
             <a:spLocks noGrp="1"/>
           </p:cNvSpPr>
@@ -2429,7 +2430,7 @@
       </p:grpSpPr>
       <p:sp>
         <p:nvSpPr>
-          <p:cNvPr id="763" name="PlaceHolder 1"/>
+          <p:cNvPr id="764" name="PlaceHolder 1"/>
           <p:cNvSpPr>
             <a:spLocks noGrp="1"/>
           </p:cNvSpPr>
@@ -34231,191 +34232,31 @@
           <a:chExt cx="0" cy="0"/>
         </a:xfrm>
       </p:grpSpPr>
-      <p:sp>
-        <p:nvSpPr>
-          <p:cNvPr id="728" name="CustomShape 1"/>
-          <p:cNvSpPr/>
-          <p:nvPr/>
-        </p:nvSpPr>
-        <p:spPr>
-          <a:xfrm>
-            <a:off x="504000" y="301320"/>
-            <a:ext cx="9070560" cy="1261080"/>
+      <p:pic>
+        <p:nvPicPr>
+          <p:cNvPr id="728" name="" descr=""/>
+          <p:cNvPicPr/>
+          <p:nvPr/>
+        </p:nvPicPr>
+        <p:blipFill>
+          <a:blip r:embed="rId1"/>
+          <a:stretch/>
+        </p:blipFill>
+        <p:spPr>
+          <a:xfrm>
+            <a:off x="2286000" y="0"/>
+            <a:ext cx="6069600" cy="7559280"/>
           </a:xfrm>
           <a:prstGeom prst="rect">
             <a:avLst/>
           </a:prstGeom>
-          <a:noFill/>
           <a:ln>
             <a:noFill/>
           </a:ln>
         </p:spPr>
-        <p:style>
-          <a:lnRef idx="0"/>
-          <a:fillRef idx="0"/>
-          <a:effectRef idx="0"/>
-          <a:fontRef idx="minor"/>
-        </p:style>
-        <p:txBody>
-          <a:bodyPr lIns="0" rIns="0" tIns="0" bIns="0" anchor="ctr"/>
-          <a:p>
-            <a:pPr algn="ctr">
-              <a:lnSpc>
-                <a:spcPct val="100000"/>
-              </a:lnSpc>
-            </a:pPr>
-            <a:r>
-              <a:rPr b="0" lang="en-US" sz="4400" spc="-1" strike="noStrike">
-                <a:solidFill>
-                  <a:srgbClr val="000000"/>
-                </a:solidFill>
-                <a:latin typeface="Arial"/>
-                <a:ea typeface="DejaVu Sans"/>
-              </a:rPr>
-              <a:t>Workflow issues</a:t>
-            </a:r>
-            <a:endParaRPr b="0" lang="en-US" sz="4400" spc="-1" strike="noStrike">
-              <a:latin typeface="Arial"/>
-            </a:endParaRPr>
-          </a:p>
-        </p:txBody>
-      </p:sp>
-      <p:sp>
-        <p:nvSpPr>
-          <p:cNvPr id="729" name="CustomShape 2"/>
-          <p:cNvSpPr/>
-          <p:nvPr/>
-        </p:nvSpPr>
-        <p:spPr>
-          <a:xfrm>
-            <a:off x="504000" y="1769040"/>
-            <a:ext cx="9070560" cy="4383360"/>
-          </a:xfrm>
-          <a:prstGeom prst="rect">
-            <a:avLst/>
-          </a:prstGeom>
-          <a:noFill/>
-          <a:ln>
-            <a:noFill/>
-          </a:ln>
-        </p:spPr>
-        <p:style>
-          <a:lnRef idx="0"/>
-          <a:fillRef idx="0"/>
-          <a:effectRef idx="0"/>
-          <a:fontRef idx="minor"/>
-        </p:style>
-        <p:txBody>
-          <a:bodyPr lIns="0" rIns="0" tIns="0" bIns="0"/>
-          <a:p>
-            <a:pPr marL="432000" indent="-322920">
-              <a:lnSpc>
-                <a:spcPct val="100000"/>
-              </a:lnSpc>
-              <a:buClr>
-                <a:srgbClr val="000000"/>
-              </a:buClr>
-              <a:buSzPct val="45000"/>
-              <a:buFont typeface="Wingdings" charset="2"/>
-              <a:buChar char=""/>
-            </a:pPr>
-            <a:r>
-              <a:rPr b="0" lang="en-US" sz="3200" spc="-1" strike="noStrike">
-                <a:solidFill>
-                  <a:srgbClr val="000000"/>
-                </a:solidFill>
-                <a:latin typeface="Arial"/>
-                <a:ea typeface="DejaVu Sans"/>
-              </a:rPr>
-              <a:t>Work on your feature branches methodically and with a plan.</a:t>
-            </a:r>
-            <a:endParaRPr b="0" lang="en-US" sz="3200" spc="-1" strike="noStrike">
-              <a:latin typeface="Arial"/>
-            </a:endParaRPr>
-          </a:p>
-          <a:p>
-            <a:pPr marL="432000" indent="-322920">
-              <a:lnSpc>
-                <a:spcPct val="100000"/>
-              </a:lnSpc>
-              <a:buClr>
-                <a:srgbClr val="000000"/>
-              </a:buClr>
-              <a:buSzPct val="45000"/>
-              <a:buFont typeface="Wingdings" charset="2"/>
-              <a:buChar char=""/>
-            </a:pPr>
-            <a:r>
-              <a:rPr b="0" lang="en-US" sz="3200" spc="-1" strike="noStrike">
-                <a:solidFill>
-                  <a:srgbClr val="000000"/>
-                </a:solidFill>
-                <a:latin typeface="Arial"/>
-                <a:ea typeface="DejaVu Sans"/>
-              </a:rPr>
-              <a:t>If you need to experiment with something, then create a new branch. Once you’re done, either abandon it or merge it into your feature branch.</a:t>
-            </a:r>
-            <a:endParaRPr b="0" lang="en-US" sz="3200" spc="-1" strike="noStrike">
-              <a:latin typeface="Arial"/>
-            </a:endParaRPr>
-          </a:p>
-          <a:p>
-            <a:pPr marL="432000" indent="-322920">
-              <a:lnSpc>
-                <a:spcPct val="100000"/>
-              </a:lnSpc>
-              <a:buClr>
-                <a:srgbClr val="000000"/>
-              </a:buClr>
-              <a:buSzPct val="45000"/>
-              <a:buFont typeface="Wingdings" charset="2"/>
-              <a:buChar char=""/>
-            </a:pPr>
-            <a:r>
-              <a:rPr b="0" lang="en-US" sz="3200" spc="-1" strike="noStrike">
-                <a:solidFill>
-                  <a:srgbClr val="000000"/>
-                </a:solidFill>
-                <a:latin typeface="Arial"/>
-                <a:ea typeface="DejaVu Sans"/>
-              </a:rPr>
-              <a:t>If your feature branch has gone out of control, create a new branch and start stripping things back. Optionally cherry-pick from previous commits.  Then merge back into your feature branch.</a:t>
-            </a:r>
-            <a:endParaRPr b="0" lang="en-US" sz="3200" spc="-1" strike="noStrike">
-              <a:latin typeface="Arial"/>
-            </a:endParaRPr>
-          </a:p>
-        </p:txBody>
-      </p:sp>
+      </p:pic>
     </p:spTree>
   </p:cSld>
-  <p:timing>
-    <p:tnLst>
-      <p:par>
-        <p:cTn id="117" dur="indefinite" restart="never" nodeType="tmRoot">
-          <p:childTnLst>
-            <p:seq>
-              <p:cTn id="118" nodeType="mainSeq"/>
-              <p:prevCondLst>
-                <p:cond delay="0" evt="onPrev">
-                  <p:tgtEl>
-                    <p:sldTgt/>
-                  </p:tgtEl>
-                </p:cond>
-              </p:prevCondLst>
-              <p:nextCondLst>
-                <p:cond delay="0" evt="onNext">
-                  <p:tgtEl>
-                    <p:sldTgt/>
-                  </p:tgtEl>
-                </p:cond>
-              </p:nextCondLst>
-            </p:seq>
-          </p:childTnLst>
-        </p:cTn>
-      </p:par>
-    </p:tnLst>
-  </p:timing>
 </p:sld>
 </file>
 
@@ -35772,7 +35613,7 @@
       </p:grpSpPr>
       <p:sp>
         <p:nvSpPr>
-          <p:cNvPr id="730" name="CustomShape 1"/>
+          <p:cNvPr id="729" name="CustomShape 1"/>
           <p:cNvSpPr/>
           <p:nvPr/>
         </p:nvSpPr>
@@ -35811,7 +35652,7 @@
                 <a:latin typeface="Arial"/>
                 <a:ea typeface="DejaVu Sans"/>
               </a:rPr>
-              <a:t>Example</a:t>
+              <a:t>Workflow issues</a:t>
             </a:r>
             <a:endParaRPr b="0" lang="en-US" sz="4400" spc="-1" strike="noStrike">
               <a:latin typeface="Arial"/>
@@ -35821,14 +35662,14 @@
       </p:sp>
       <p:sp>
         <p:nvSpPr>
-          <p:cNvPr id="731" name="CustomShape 2"/>
-          <p:cNvSpPr/>
-          <p:nvPr/>
-        </p:nvSpPr>
-        <p:spPr>
-          <a:xfrm>
-            <a:off x="1463040" y="1371600"/>
-            <a:ext cx="7954200" cy="5526000"/>
+          <p:cNvPr id="730" name="CustomShape 2"/>
+          <p:cNvSpPr/>
+          <p:nvPr/>
+        </p:nvSpPr>
+        <p:spPr>
+          <a:xfrm>
+            <a:off x="504000" y="1769040"/>
+            <a:ext cx="9070560" cy="4383360"/>
           </a:xfrm>
           <a:prstGeom prst="rect">
             <a:avLst/>
@@ -35845,399 +35686,82 @@
           <a:fontRef idx="minor"/>
         </p:style>
         <p:txBody>
-          <a:bodyPr lIns="90000" rIns="90000" tIns="45000" bIns="45000"/>
-          <a:p>
-            <a:r>
-              <a:rPr b="0" lang="en-US" sz="1400" spc="-1" strike="noStrike">
+          <a:bodyPr lIns="0" rIns="0" tIns="0" bIns="0"/>
+          <a:p>
+            <a:pPr marL="432000" indent="-322920">
+              <a:lnSpc>
+                <a:spcPct val="100000"/>
+              </a:lnSpc>
+              <a:buClr>
+                <a:srgbClr val="000000"/>
+              </a:buClr>
+              <a:buSzPct val="45000"/>
+              <a:buFont typeface="Wingdings" charset="2"/>
+              <a:buChar char=""/>
+            </a:pPr>
+            <a:r>
+              <a:rPr b="0" lang="en-US" sz="3200" spc="-1" strike="noStrike">
                 <a:solidFill>
                   <a:srgbClr val="000000"/>
                 </a:solidFill>
                 <a:latin typeface="Arial"/>
                 <a:ea typeface="DejaVu Sans"/>
               </a:rPr>
-              <a:t>$ </a:t>
-            </a:r>
-            <a:r>
-              <a:rPr b="0" lang="en-US" sz="1400" spc="-1" strike="noStrike">
-                <a:solidFill>
-                  <a:srgbClr val="800080"/>
-                </a:solidFill>
-                <a:latin typeface="Courier New"/>
-                <a:ea typeface="DejaVu Sans"/>
-              </a:rPr>
-              <a:t>git checkout -b my_new_feature     </a:t>
-            </a:r>
-            <a:r>
-              <a:rPr b="0" lang="en-US" sz="1400" spc="-1" strike="noStrike">
-                <a:solidFill>
-                  <a:srgbClr val="00ffff"/>
-                </a:solidFill>
-                <a:latin typeface="Courier New"/>
-                <a:ea typeface="DejaVu Sans"/>
-              </a:rPr>
-              <a:t>← Create a branch</a:t>
-            </a:r>
-            <a:endParaRPr b="0" lang="en-US" sz="1400" spc="-1" strike="noStrike">
-              <a:latin typeface="Arial"/>
-            </a:endParaRPr>
-          </a:p>
-          <a:p>
-            <a:endParaRPr b="0" lang="en-US" sz="1400" spc="-1" strike="noStrike">
-              <a:latin typeface="Arial"/>
-            </a:endParaRPr>
-          </a:p>
-          <a:p>
-            <a:r>
-              <a:rPr b="0" lang="en-US" sz="1800" spc="-1" strike="noStrike">
+              <a:t>Work on your feature branches methodically and with a plan.</a:t>
+            </a:r>
+            <a:endParaRPr b="0" lang="en-US" sz="3200" spc="-1" strike="noStrike">
+              <a:latin typeface="Arial"/>
+            </a:endParaRPr>
+          </a:p>
+          <a:p>
+            <a:pPr marL="432000" indent="-322920">
+              <a:lnSpc>
+                <a:spcPct val="100000"/>
+              </a:lnSpc>
+              <a:buClr>
+                <a:srgbClr val="000000"/>
+              </a:buClr>
+              <a:buSzPct val="45000"/>
+              <a:buFont typeface="Wingdings" charset="2"/>
+              <a:buChar char=""/>
+            </a:pPr>
+            <a:r>
+              <a:rPr b="0" lang="en-US" sz="3200" spc="-1" strike="noStrike">
                 <a:solidFill>
                   <a:srgbClr val="000000"/>
                 </a:solidFill>
                 <a:latin typeface="Arial"/>
                 <a:ea typeface="DejaVu Sans"/>
               </a:rPr>
-              <a:t>Edit code, etc.</a:t>
-            </a:r>
-            <a:endParaRPr b="0" lang="en-US" sz="1800" spc="-1" strike="noStrike">
-              <a:latin typeface="Arial"/>
-            </a:endParaRPr>
-          </a:p>
-          <a:p>
-            <a:endParaRPr b="0" lang="en-US" sz="1800" spc="-1" strike="noStrike">
-              <a:latin typeface="Arial"/>
-            </a:endParaRPr>
-          </a:p>
-          <a:p>
-            <a:r>
-              <a:rPr b="0" lang="en-US" sz="1400" spc="-1" strike="noStrike">
+              <a:t>If you need to experiment with something, then create a new branch. Once you’re done, either abandon it or merge it into your feature branch.</a:t>
+            </a:r>
+            <a:endParaRPr b="0" lang="en-US" sz="3200" spc="-1" strike="noStrike">
+              <a:latin typeface="Arial"/>
+            </a:endParaRPr>
+          </a:p>
+          <a:p>
+            <a:pPr marL="432000" indent="-322920">
+              <a:lnSpc>
+                <a:spcPct val="100000"/>
+              </a:lnSpc>
+              <a:buClr>
+                <a:srgbClr val="000000"/>
+              </a:buClr>
+              <a:buSzPct val="45000"/>
+              <a:buFont typeface="Wingdings" charset="2"/>
+              <a:buChar char=""/>
+            </a:pPr>
+            <a:r>
+              <a:rPr b="0" lang="en-US" sz="3200" spc="-1" strike="noStrike">
                 <a:solidFill>
                   <a:srgbClr val="000000"/>
                 </a:solidFill>
                 <a:latin typeface="Arial"/>
                 <a:ea typeface="DejaVu Sans"/>
               </a:rPr>
-              <a:t>$ </a:t>
-            </a:r>
-            <a:r>
-              <a:rPr b="0" lang="en-US" sz="1400" spc="-1" strike="noStrike">
-                <a:solidFill>
-                  <a:srgbClr val="800080"/>
-                </a:solidFill>
-                <a:latin typeface="Courier New"/>
-                <a:ea typeface="DejaVu Sans"/>
-              </a:rPr>
-              <a:t>git add this_file that_file</a:t>
-            </a:r>
-            <a:endParaRPr b="0" lang="en-US" sz="1400" spc="-1" strike="noStrike">
-              <a:latin typeface="Arial"/>
-            </a:endParaRPr>
-          </a:p>
-          <a:p>
-            <a:r>
-              <a:rPr b="0" lang="en-US" sz="1400" spc="-1" strike="noStrike">
-                <a:solidFill>
-                  <a:srgbClr val="000000"/>
-                </a:solidFill>
-                <a:latin typeface="Arial"/>
-                <a:ea typeface="DejaVu Sans"/>
-              </a:rPr>
-              <a:t>$ </a:t>
-            </a:r>
-            <a:r>
-              <a:rPr b="0" lang="en-US" sz="1400" spc="-1" strike="noStrike">
-                <a:solidFill>
-                  <a:srgbClr val="800080"/>
-                </a:solidFill>
-                <a:latin typeface="Courier New"/>
-                <a:ea typeface="DejaVu Sans"/>
-              </a:rPr>
-              <a:t>git commit -m “I made some changes”</a:t>
-            </a:r>
-            <a:endParaRPr b="0" lang="en-US" sz="1400" spc="-1" strike="noStrike">
-              <a:latin typeface="Arial"/>
-            </a:endParaRPr>
-          </a:p>
-          <a:p>
-            <a:endParaRPr b="0" lang="en-US" sz="1400" spc="-1" strike="noStrike">
-              <a:latin typeface="Arial"/>
-            </a:endParaRPr>
-          </a:p>
-          <a:p>
-            <a:r>
-              <a:rPr b="0" lang="en-US" sz="1800" spc="-1" strike="noStrike">
-                <a:solidFill>
-                  <a:srgbClr val="000000"/>
-                </a:solidFill>
-                <a:latin typeface="Arial"/>
-                <a:ea typeface="DejaVu Sans"/>
-              </a:rPr>
-              <a:t>Edit code again.  OHOH, Not sure I’m happy about this code.</a:t>
-            </a:r>
-            <a:endParaRPr b="0" lang="en-US" sz="1800" spc="-1" strike="noStrike">
-              <a:latin typeface="Arial"/>
-            </a:endParaRPr>
-          </a:p>
-          <a:p>
-            <a:endParaRPr b="0" lang="en-US" sz="1800" spc="-1" strike="noStrike">
-              <a:latin typeface="Arial"/>
-            </a:endParaRPr>
-          </a:p>
-          <a:p>
-            <a:r>
-              <a:rPr b="0" lang="en-US" sz="1400" spc="-1" strike="noStrike">
-                <a:solidFill>
-                  <a:srgbClr val="000000"/>
-                </a:solidFill>
-                <a:latin typeface="Arial"/>
-                <a:ea typeface="DejaVu Sans"/>
-              </a:rPr>
-              <a:t>$ </a:t>
-            </a:r>
-            <a:r>
-              <a:rPr b="0" lang="en-US" sz="1400" spc="-1" strike="noStrike">
-                <a:solidFill>
-                  <a:srgbClr val="800080"/>
-                </a:solidFill>
-                <a:latin typeface="Courier New"/>
-                <a:ea typeface="DejaVu Sans"/>
-              </a:rPr>
-              <a:t>git checkout -b an_experiment      </a:t>
-            </a:r>
-            <a:r>
-              <a:rPr b="0" lang="en-US" sz="1400" spc="-1" strike="noStrike">
-                <a:solidFill>
-                  <a:srgbClr val="00ffff"/>
-                </a:solidFill>
-                <a:latin typeface="Courier New"/>
-                <a:ea typeface="DejaVu Sans"/>
-              </a:rPr>
-              <a:t>← Create a branch of a branch</a:t>
-            </a:r>
-            <a:endParaRPr b="0" lang="en-US" sz="1400" spc="-1" strike="noStrike">
-              <a:latin typeface="Arial"/>
-            </a:endParaRPr>
-          </a:p>
-          <a:p>
-            <a:r>
-              <a:rPr b="0" lang="en-US" sz="1400" spc="-1" strike="noStrike">
-                <a:solidFill>
-                  <a:srgbClr val="000000"/>
-                </a:solidFill>
-                <a:latin typeface="Arial"/>
-                <a:ea typeface="DejaVu Sans"/>
-              </a:rPr>
-              <a:t>$ </a:t>
-            </a:r>
-            <a:r>
-              <a:rPr b="0" lang="en-US" sz="1400" spc="-1" strike="noStrike">
-                <a:solidFill>
-                  <a:srgbClr val="800080"/>
-                </a:solidFill>
-                <a:latin typeface="Courier New"/>
-                <a:ea typeface="DejaVu Sans"/>
-              </a:rPr>
-              <a:t>git add this_file that_file and_that_other_file</a:t>
-            </a:r>
-            <a:endParaRPr b="0" lang="en-US" sz="1400" spc="-1" strike="noStrike">
-              <a:latin typeface="Arial"/>
-            </a:endParaRPr>
-          </a:p>
-          <a:p>
-            <a:r>
-              <a:rPr b="0" lang="en-US" sz="1400" spc="-1" strike="noStrike">
-                <a:solidFill>
-                  <a:srgbClr val="000000"/>
-                </a:solidFill>
-                <a:latin typeface="Arial"/>
-                <a:ea typeface="DejaVu Sans"/>
-              </a:rPr>
-              <a:t>$ </a:t>
-            </a:r>
-            <a:r>
-              <a:rPr b="0" lang="en-US" sz="1400" spc="-1" strike="noStrike">
-                <a:solidFill>
-                  <a:srgbClr val="800080"/>
-                </a:solidFill>
-                <a:latin typeface="Courier New"/>
-                <a:ea typeface="DejaVu Sans"/>
-              </a:rPr>
-              <a:t>git commit -m “This is an experiment. I’m not sure how good it is.”</a:t>
-            </a:r>
-            <a:endParaRPr b="0" lang="en-US" sz="1400" spc="-1" strike="noStrike">
-              <a:latin typeface="Arial"/>
-            </a:endParaRPr>
-          </a:p>
-          <a:p>
-            <a:endParaRPr b="0" lang="en-US" sz="1400" spc="-1" strike="noStrike">
-              <a:latin typeface="Arial"/>
-            </a:endParaRPr>
-          </a:p>
-          <a:p>
-            <a:r>
-              <a:rPr b="0" lang="en-US" sz="1800" spc="-1" strike="noStrike">
-                <a:solidFill>
-                  <a:srgbClr val="000000"/>
-                </a:solidFill>
-                <a:latin typeface="Arial"/>
-                <a:ea typeface="DejaVu Sans"/>
-              </a:rPr>
-              <a:t>Test. Clean up.  Ok, I’m happy with it.</a:t>
-            </a:r>
-            <a:endParaRPr b="0" lang="en-US" sz="1800" spc="-1" strike="noStrike">
-              <a:latin typeface="Arial"/>
-            </a:endParaRPr>
-          </a:p>
-          <a:p>
-            <a:endParaRPr b="0" lang="en-US" sz="1800" spc="-1" strike="noStrike">
-              <a:latin typeface="Arial"/>
-            </a:endParaRPr>
-          </a:p>
-          <a:p>
-            <a:r>
-              <a:rPr b="0" lang="en-US" sz="1400" spc="-1" strike="noStrike">
-                <a:solidFill>
-                  <a:srgbClr val="000000"/>
-                </a:solidFill>
-                <a:latin typeface="Arial"/>
-                <a:ea typeface="DejaVu Sans"/>
-              </a:rPr>
-              <a:t>$ </a:t>
-            </a:r>
-            <a:r>
-              <a:rPr b="0" lang="en-US" sz="1400" spc="-1" strike="noStrike">
-                <a:solidFill>
-                  <a:srgbClr val="800080"/>
-                </a:solidFill>
-                <a:latin typeface="Courier New"/>
-                <a:ea typeface="DejaVu Sans"/>
-              </a:rPr>
-              <a:t>git checkout my_new_feature     </a:t>
-            </a:r>
-            <a:r>
-              <a:rPr b="0" lang="en-US" sz="1400" spc="-1" strike="noStrike">
-                <a:solidFill>
-                  <a:srgbClr val="00ffff"/>
-                </a:solidFill>
-                <a:latin typeface="Courier New"/>
-                <a:ea typeface="DejaVu Sans"/>
-              </a:rPr>
-              <a:t>← Switch back to this branch</a:t>
-            </a:r>
-            <a:endParaRPr b="0" lang="en-US" sz="1400" spc="-1" strike="noStrike">
-              <a:latin typeface="Arial"/>
-            </a:endParaRPr>
-          </a:p>
-          <a:p>
-            <a:r>
-              <a:rPr b="0" lang="en-US" sz="1400" spc="-1" strike="noStrike">
-                <a:solidFill>
-                  <a:srgbClr val="000000"/>
-                </a:solidFill>
-                <a:latin typeface="Arial"/>
-                <a:ea typeface="DejaVu Sans"/>
-              </a:rPr>
-              <a:t>$ </a:t>
-            </a:r>
-            <a:r>
-              <a:rPr b="0" lang="en-US" sz="1400" spc="-1" strike="noStrike">
-                <a:solidFill>
-                  <a:srgbClr val="800080"/>
-                </a:solidFill>
-                <a:latin typeface="Courier New"/>
-                <a:ea typeface="DejaVu Sans"/>
-              </a:rPr>
-              <a:t>git merge an_experiment         </a:t>
-            </a:r>
-            <a:r>
-              <a:rPr b="0" lang="en-US" sz="1400" spc="-1" strike="noStrike">
-                <a:solidFill>
-                  <a:srgbClr val="00ffff"/>
-                </a:solidFill>
-                <a:latin typeface="Courier New"/>
-                <a:ea typeface="DejaVu Sans"/>
-              </a:rPr>
-              <a:t>← Merge the experimental branch</a:t>
-            </a:r>
-            <a:endParaRPr b="0" lang="en-US" sz="1400" spc="-1" strike="noStrike">
-              <a:latin typeface="Arial"/>
-            </a:endParaRPr>
-          </a:p>
-          <a:p>
-            <a:endParaRPr b="0" lang="en-US" sz="1400" spc="-1" strike="noStrike">
-              <a:latin typeface="Arial"/>
-            </a:endParaRPr>
-          </a:p>
-          <a:p>
-            <a:r>
-              <a:rPr b="0" lang="en-US" sz="1800" spc="-1" strike="noStrike">
-                <a:solidFill>
-                  <a:srgbClr val="000000"/>
-                </a:solidFill>
-                <a:latin typeface="Arial"/>
-                <a:ea typeface="DejaVu Sans"/>
-              </a:rPr>
-              <a:t>Alternatively, I’m not happy with it.</a:t>
-            </a:r>
-            <a:endParaRPr b="0" lang="en-US" sz="1800" spc="-1" strike="noStrike">
-              <a:latin typeface="Arial"/>
-            </a:endParaRPr>
-          </a:p>
-          <a:p>
-            <a:endParaRPr b="0" lang="en-US" sz="1800" spc="-1" strike="noStrike">
-              <a:latin typeface="Arial"/>
-            </a:endParaRPr>
-          </a:p>
-          <a:p>
-            <a:r>
-              <a:rPr b="0" lang="en-US" sz="1400" spc="-1" strike="noStrike">
-                <a:solidFill>
-                  <a:srgbClr val="000000"/>
-                </a:solidFill>
-                <a:latin typeface="Arial"/>
-                <a:ea typeface="DejaVu Sans"/>
-              </a:rPr>
-              <a:t>$</a:t>
-            </a:r>
-            <a:r>
-              <a:rPr b="0" lang="en-US" sz="1400" spc="-1" strike="noStrike">
-                <a:solidFill>
-                  <a:srgbClr val="800080"/>
-                </a:solidFill>
-                <a:latin typeface="Courier New"/>
-                <a:ea typeface="DejaVu Sans"/>
-              </a:rPr>
-              <a:t> git checkout my_new_feature   </a:t>
-            </a:r>
-            <a:r>
-              <a:rPr b="0" lang="en-US" sz="1400" spc="-1" strike="noStrike">
-                <a:solidFill>
-                  <a:srgbClr val="00ffff"/>
-                </a:solidFill>
-                <a:latin typeface="Courier New"/>
-                <a:ea typeface="DejaVu Sans"/>
-              </a:rPr>
-              <a:t>← Switch back to this branch</a:t>
-            </a:r>
-            <a:endParaRPr b="0" lang="en-US" sz="1400" spc="-1" strike="noStrike">
-              <a:latin typeface="Arial"/>
-            </a:endParaRPr>
-          </a:p>
-          <a:p>
-            <a:endParaRPr b="0" lang="en-US" sz="1400" spc="-1" strike="noStrike">
-              <a:latin typeface="Arial"/>
-            </a:endParaRPr>
-          </a:p>
-          <a:p>
-            <a:r>
-              <a:rPr b="0" lang="en-US" sz="1800" spc="-1" strike="noStrike">
-                <a:solidFill>
-                  <a:srgbClr val="000000"/>
-                </a:solidFill>
-                <a:latin typeface="Arial"/>
-                <a:ea typeface="DejaVu Sans"/>
-              </a:rPr>
-              <a:t>Keep working and just ignore the ‘an_experiment’ branch.</a:t>
-            </a:r>
-            <a:endParaRPr b="0" lang="en-US" sz="1800" spc="-1" strike="noStrike">
+              <a:t>If your feature branch has gone out of control, create a new branch and start stripping things back. Optionally cherry-pick from previous commits.  Then merge back into your feature branch.</a:t>
+            </a:r>
+            <a:endParaRPr b="0" lang="en-US" sz="3200" spc="-1" strike="noStrike">
               <a:latin typeface="Arial"/>
             </a:endParaRPr>
           </a:p>
@@ -36248,10 +35772,10 @@
   <p:timing>
     <p:tnLst>
       <p:par>
-        <p:cTn id="119" dur="indefinite" restart="never" nodeType="tmRoot">
+        <p:cTn id="117" dur="indefinite" restart="never" nodeType="tmRoot">
           <p:childTnLst>
             <p:seq>
-              <p:cTn id="120" nodeType="mainSeq"/>
+              <p:cTn id="118" nodeType="mainSeq"/>
               <p:prevCondLst>
                 <p:cond delay="0" evt="onPrev">
                   <p:tgtEl>
@@ -36294,7 +35818,529 @@
       </p:grpSpPr>
       <p:sp>
         <p:nvSpPr>
-          <p:cNvPr id="732" name="CustomShape 1"/>
+          <p:cNvPr id="731" name="CustomShape 1"/>
+          <p:cNvSpPr/>
+          <p:nvPr/>
+        </p:nvSpPr>
+        <p:spPr>
+          <a:xfrm>
+            <a:off x="504000" y="301320"/>
+            <a:ext cx="9070560" cy="1261080"/>
+          </a:xfrm>
+          <a:prstGeom prst="rect">
+            <a:avLst/>
+          </a:prstGeom>
+          <a:noFill/>
+          <a:ln>
+            <a:noFill/>
+          </a:ln>
+        </p:spPr>
+        <p:style>
+          <a:lnRef idx="0"/>
+          <a:fillRef idx="0"/>
+          <a:effectRef idx="0"/>
+          <a:fontRef idx="minor"/>
+        </p:style>
+        <p:txBody>
+          <a:bodyPr lIns="0" rIns="0" tIns="0" bIns="0" anchor="ctr"/>
+          <a:p>
+            <a:pPr algn="ctr">
+              <a:lnSpc>
+                <a:spcPct val="100000"/>
+              </a:lnSpc>
+            </a:pPr>
+            <a:r>
+              <a:rPr b="0" lang="en-US" sz="4400" spc="-1" strike="noStrike">
+                <a:solidFill>
+                  <a:srgbClr val="000000"/>
+                </a:solidFill>
+                <a:latin typeface="Arial"/>
+                <a:ea typeface="DejaVu Sans"/>
+              </a:rPr>
+              <a:t>Example</a:t>
+            </a:r>
+            <a:endParaRPr b="0" lang="en-US" sz="4400" spc="-1" strike="noStrike">
+              <a:latin typeface="Arial"/>
+            </a:endParaRPr>
+          </a:p>
+        </p:txBody>
+      </p:sp>
+      <p:sp>
+        <p:nvSpPr>
+          <p:cNvPr id="732" name="CustomShape 2"/>
+          <p:cNvSpPr/>
+          <p:nvPr/>
+        </p:nvSpPr>
+        <p:spPr>
+          <a:xfrm>
+            <a:off x="1463040" y="1371600"/>
+            <a:ext cx="7954200" cy="5526000"/>
+          </a:xfrm>
+          <a:prstGeom prst="rect">
+            <a:avLst/>
+          </a:prstGeom>
+          <a:noFill/>
+          <a:ln>
+            <a:noFill/>
+          </a:ln>
+        </p:spPr>
+        <p:style>
+          <a:lnRef idx="0"/>
+          <a:fillRef idx="0"/>
+          <a:effectRef idx="0"/>
+          <a:fontRef idx="minor"/>
+        </p:style>
+        <p:txBody>
+          <a:bodyPr lIns="90000" rIns="90000" tIns="45000" bIns="45000"/>
+          <a:p>
+            <a:r>
+              <a:rPr b="0" lang="en-US" sz="1400" spc="-1" strike="noStrike">
+                <a:solidFill>
+                  <a:srgbClr val="000000"/>
+                </a:solidFill>
+                <a:latin typeface="Arial"/>
+                <a:ea typeface="DejaVu Sans"/>
+              </a:rPr>
+              <a:t>$ </a:t>
+            </a:r>
+            <a:r>
+              <a:rPr b="0" lang="en-US" sz="1400" spc="-1" strike="noStrike">
+                <a:solidFill>
+                  <a:srgbClr val="800080"/>
+                </a:solidFill>
+                <a:latin typeface="Courier New"/>
+                <a:ea typeface="DejaVu Sans"/>
+              </a:rPr>
+              <a:t>git checkout -b my_new_feature     </a:t>
+            </a:r>
+            <a:r>
+              <a:rPr b="0" lang="en-US" sz="1400" spc="-1" strike="noStrike">
+                <a:solidFill>
+                  <a:srgbClr val="00ffff"/>
+                </a:solidFill>
+                <a:latin typeface="Courier New"/>
+                <a:ea typeface="DejaVu Sans"/>
+              </a:rPr>
+              <a:t>← Create a branch</a:t>
+            </a:r>
+            <a:endParaRPr b="0" lang="en-US" sz="1400" spc="-1" strike="noStrike">
+              <a:latin typeface="Arial"/>
+            </a:endParaRPr>
+          </a:p>
+          <a:p>
+            <a:endParaRPr b="0" lang="en-US" sz="1400" spc="-1" strike="noStrike">
+              <a:latin typeface="Arial"/>
+            </a:endParaRPr>
+          </a:p>
+          <a:p>
+            <a:r>
+              <a:rPr b="0" lang="en-US" sz="1800" spc="-1" strike="noStrike">
+                <a:solidFill>
+                  <a:srgbClr val="000000"/>
+                </a:solidFill>
+                <a:latin typeface="Arial"/>
+                <a:ea typeface="DejaVu Sans"/>
+              </a:rPr>
+              <a:t>Edit code, etc.</a:t>
+            </a:r>
+            <a:endParaRPr b="0" lang="en-US" sz="1800" spc="-1" strike="noStrike">
+              <a:latin typeface="Arial"/>
+            </a:endParaRPr>
+          </a:p>
+          <a:p>
+            <a:endParaRPr b="0" lang="en-US" sz="1800" spc="-1" strike="noStrike">
+              <a:latin typeface="Arial"/>
+            </a:endParaRPr>
+          </a:p>
+          <a:p>
+            <a:r>
+              <a:rPr b="0" lang="en-US" sz="1400" spc="-1" strike="noStrike">
+                <a:solidFill>
+                  <a:srgbClr val="000000"/>
+                </a:solidFill>
+                <a:latin typeface="Arial"/>
+                <a:ea typeface="DejaVu Sans"/>
+              </a:rPr>
+              <a:t>$ </a:t>
+            </a:r>
+            <a:r>
+              <a:rPr b="0" lang="en-US" sz="1400" spc="-1" strike="noStrike">
+                <a:solidFill>
+                  <a:srgbClr val="800080"/>
+                </a:solidFill>
+                <a:latin typeface="Courier New"/>
+                <a:ea typeface="DejaVu Sans"/>
+              </a:rPr>
+              <a:t>git add this_file that_file</a:t>
+            </a:r>
+            <a:endParaRPr b="0" lang="en-US" sz="1400" spc="-1" strike="noStrike">
+              <a:latin typeface="Arial"/>
+            </a:endParaRPr>
+          </a:p>
+          <a:p>
+            <a:r>
+              <a:rPr b="0" lang="en-US" sz="1400" spc="-1" strike="noStrike">
+                <a:solidFill>
+                  <a:srgbClr val="000000"/>
+                </a:solidFill>
+                <a:latin typeface="Arial"/>
+                <a:ea typeface="DejaVu Sans"/>
+              </a:rPr>
+              <a:t>$ </a:t>
+            </a:r>
+            <a:r>
+              <a:rPr b="0" lang="en-US" sz="1400" spc="-1" strike="noStrike">
+                <a:solidFill>
+                  <a:srgbClr val="800080"/>
+                </a:solidFill>
+                <a:latin typeface="Courier New"/>
+                <a:ea typeface="DejaVu Sans"/>
+              </a:rPr>
+              <a:t>git commit -m “I made some changes”</a:t>
+            </a:r>
+            <a:endParaRPr b="0" lang="en-US" sz="1400" spc="-1" strike="noStrike">
+              <a:latin typeface="Arial"/>
+            </a:endParaRPr>
+          </a:p>
+          <a:p>
+            <a:endParaRPr b="0" lang="en-US" sz="1400" spc="-1" strike="noStrike">
+              <a:latin typeface="Arial"/>
+            </a:endParaRPr>
+          </a:p>
+          <a:p>
+            <a:r>
+              <a:rPr b="0" lang="en-US" sz="1800" spc="-1" strike="noStrike">
+                <a:solidFill>
+                  <a:srgbClr val="000000"/>
+                </a:solidFill>
+                <a:latin typeface="Arial"/>
+                <a:ea typeface="DejaVu Sans"/>
+              </a:rPr>
+              <a:t>Edit code again.  OHOH, Not sure I’m happy about this code.</a:t>
+            </a:r>
+            <a:endParaRPr b="0" lang="en-US" sz="1800" spc="-1" strike="noStrike">
+              <a:latin typeface="Arial"/>
+            </a:endParaRPr>
+          </a:p>
+          <a:p>
+            <a:endParaRPr b="0" lang="en-US" sz="1800" spc="-1" strike="noStrike">
+              <a:latin typeface="Arial"/>
+            </a:endParaRPr>
+          </a:p>
+          <a:p>
+            <a:r>
+              <a:rPr b="0" lang="en-US" sz="1400" spc="-1" strike="noStrike">
+                <a:solidFill>
+                  <a:srgbClr val="000000"/>
+                </a:solidFill>
+                <a:latin typeface="Arial"/>
+                <a:ea typeface="DejaVu Sans"/>
+              </a:rPr>
+              <a:t>$ </a:t>
+            </a:r>
+            <a:r>
+              <a:rPr b="0" lang="en-US" sz="1400" spc="-1" strike="noStrike">
+                <a:solidFill>
+                  <a:srgbClr val="800080"/>
+                </a:solidFill>
+                <a:latin typeface="Courier New"/>
+                <a:ea typeface="DejaVu Sans"/>
+              </a:rPr>
+              <a:t>git checkout -b an_experiment      </a:t>
+            </a:r>
+            <a:r>
+              <a:rPr b="0" lang="en-US" sz="1400" spc="-1" strike="noStrike">
+                <a:solidFill>
+                  <a:srgbClr val="00ffff"/>
+                </a:solidFill>
+                <a:latin typeface="Courier New"/>
+                <a:ea typeface="DejaVu Sans"/>
+              </a:rPr>
+              <a:t>← Create a branch of a branch</a:t>
+            </a:r>
+            <a:endParaRPr b="0" lang="en-US" sz="1400" spc="-1" strike="noStrike">
+              <a:latin typeface="Arial"/>
+            </a:endParaRPr>
+          </a:p>
+          <a:p>
+            <a:r>
+              <a:rPr b="0" lang="en-US" sz="1400" spc="-1" strike="noStrike">
+                <a:solidFill>
+                  <a:srgbClr val="000000"/>
+                </a:solidFill>
+                <a:latin typeface="Arial"/>
+                <a:ea typeface="DejaVu Sans"/>
+              </a:rPr>
+              <a:t>$ </a:t>
+            </a:r>
+            <a:r>
+              <a:rPr b="0" lang="en-US" sz="1400" spc="-1" strike="noStrike">
+                <a:solidFill>
+                  <a:srgbClr val="800080"/>
+                </a:solidFill>
+                <a:latin typeface="Courier New"/>
+                <a:ea typeface="DejaVu Sans"/>
+              </a:rPr>
+              <a:t>git add this_file that_file and_that_other_file</a:t>
+            </a:r>
+            <a:endParaRPr b="0" lang="en-US" sz="1400" spc="-1" strike="noStrike">
+              <a:latin typeface="Arial"/>
+            </a:endParaRPr>
+          </a:p>
+          <a:p>
+            <a:r>
+              <a:rPr b="0" lang="en-US" sz="1400" spc="-1" strike="noStrike">
+                <a:solidFill>
+                  <a:srgbClr val="000000"/>
+                </a:solidFill>
+                <a:latin typeface="Arial"/>
+                <a:ea typeface="DejaVu Sans"/>
+              </a:rPr>
+              <a:t>$ </a:t>
+            </a:r>
+            <a:r>
+              <a:rPr b="0" lang="en-US" sz="1400" spc="-1" strike="noStrike">
+                <a:solidFill>
+                  <a:srgbClr val="800080"/>
+                </a:solidFill>
+                <a:latin typeface="Courier New"/>
+                <a:ea typeface="DejaVu Sans"/>
+              </a:rPr>
+              <a:t>git commit -m “This is an experiment. I’m not sure how good it is.”</a:t>
+            </a:r>
+            <a:endParaRPr b="0" lang="en-US" sz="1400" spc="-1" strike="noStrike">
+              <a:latin typeface="Arial"/>
+            </a:endParaRPr>
+          </a:p>
+          <a:p>
+            <a:endParaRPr b="0" lang="en-US" sz="1400" spc="-1" strike="noStrike">
+              <a:latin typeface="Arial"/>
+            </a:endParaRPr>
+          </a:p>
+          <a:p>
+            <a:r>
+              <a:rPr b="0" lang="en-US" sz="1800" spc="-1" strike="noStrike">
+                <a:solidFill>
+                  <a:srgbClr val="000000"/>
+                </a:solidFill>
+                <a:latin typeface="Arial"/>
+                <a:ea typeface="DejaVu Sans"/>
+              </a:rPr>
+              <a:t>Test. Clean up.  Ok, I’m happy with it.</a:t>
+            </a:r>
+            <a:endParaRPr b="0" lang="en-US" sz="1800" spc="-1" strike="noStrike">
+              <a:latin typeface="Arial"/>
+            </a:endParaRPr>
+          </a:p>
+          <a:p>
+            <a:endParaRPr b="0" lang="en-US" sz="1800" spc="-1" strike="noStrike">
+              <a:latin typeface="Arial"/>
+            </a:endParaRPr>
+          </a:p>
+          <a:p>
+            <a:r>
+              <a:rPr b="0" lang="en-US" sz="1400" spc="-1" strike="noStrike">
+                <a:solidFill>
+                  <a:srgbClr val="000000"/>
+                </a:solidFill>
+                <a:latin typeface="Arial"/>
+                <a:ea typeface="DejaVu Sans"/>
+              </a:rPr>
+              <a:t>$ </a:t>
+            </a:r>
+            <a:r>
+              <a:rPr b="0" lang="en-US" sz="1400" spc="-1" strike="noStrike">
+                <a:solidFill>
+                  <a:srgbClr val="800080"/>
+                </a:solidFill>
+                <a:latin typeface="Courier New"/>
+                <a:ea typeface="DejaVu Sans"/>
+              </a:rPr>
+              <a:t>git checkout my_new_feature     </a:t>
+            </a:r>
+            <a:r>
+              <a:rPr b="0" lang="en-US" sz="1400" spc="-1" strike="noStrike">
+                <a:solidFill>
+                  <a:srgbClr val="00ffff"/>
+                </a:solidFill>
+                <a:latin typeface="Courier New"/>
+                <a:ea typeface="DejaVu Sans"/>
+              </a:rPr>
+              <a:t>← Switch back to this branch</a:t>
+            </a:r>
+            <a:endParaRPr b="0" lang="en-US" sz="1400" spc="-1" strike="noStrike">
+              <a:latin typeface="Arial"/>
+            </a:endParaRPr>
+          </a:p>
+          <a:p>
+            <a:r>
+              <a:rPr b="0" lang="en-US" sz="1400" spc="-1" strike="noStrike">
+                <a:solidFill>
+                  <a:srgbClr val="000000"/>
+                </a:solidFill>
+                <a:latin typeface="Arial"/>
+                <a:ea typeface="DejaVu Sans"/>
+              </a:rPr>
+              <a:t>$ </a:t>
+            </a:r>
+            <a:r>
+              <a:rPr b="0" lang="en-US" sz="1400" spc="-1" strike="noStrike">
+                <a:solidFill>
+                  <a:srgbClr val="800080"/>
+                </a:solidFill>
+                <a:latin typeface="Courier New"/>
+                <a:ea typeface="DejaVu Sans"/>
+              </a:rPr>
+              <a:t>git merge an_experiment         </a:t>
+            </a:r>
+            <a:r>
+              <a:rPr b="0" lang="en-US" sz="1400" spc="-1" strike="noStrike">
+                <a:solidFill>
+                  <a:srgbClr val="00ffff"/>
+                </a:solidFill>
+                <a:latin typeface="Courier New"/>
+                <a:ea typeface="DejaVu Sans"/>
+              </a:rPr>
+              <a:t>← Merge the experimental branch</a:t>
+            </a:r>
+            <a:endParaRPr b="0" lang="en-US" sz="1400" spc="-1" strike="noStrike">
+              <a:latin typeface="Arial"/>
+            </a:endParaRPr>
+          </a:p>
+          <a:p>
+            <a:endParaRPr b="0" lang="en-US" sz="1400" spc="-1" strike="noStrike">
+              <a:latin typeface="Arial"/>
+            </a:endParaRPr>
+          </a:p>
+          <a:p>
+            <a:r>
+              <a:rPr b="0" lang="en-US" sz="1800" spc="-1" strike="noStrike">
+                <a:solidFill>
+                  <a:srgbClr val="000000"/>
+                </a:solidFill>
+                <a:latin typeface="Arial"/>
+                <a:ea typeface="DejaVu Sans"/>
+              </a:rPr>
+              <a:t>Alternatively, I’m not happy with it.</a:t>
+            </a:r>
+            <a:endParaRPr b="0" lang="en-US" sz="1800" spc="-1" strike="noStrike">
+              <a:latin typeface="Arial"/>
+            </a:endParaRPr>
+          </a:p>
+          <a:p>
+            <a:endParaRPr b="0" lang="en-US" sz="1800" spc="-1" strike="noStrike">
+              <a:latin typeface="Arial"/>
+            </a:endParaRPr>
+          </a:p>
+          <a:p>
+            <a:r>
+              <a:rPr b="0" lang="en-US" sz="1400" spc="-1" strike="noStrike">
+                <a:solidFill>
+                  <a:srgbClr val="000000"/>
+                </a:solidFill>
+                <a:latin typeface="Arial"/>
+                <a:ea typeface="DejaVu Sans"/>
+              </a:rPr>
+              <a:t>$</a:t>
+            </a:r>
+            <a:r>
+              <a:rPr b="0" lang="en-US" sz="1400" spc="-1" strike="noStrike">
+                <a:solidFill>
+                  <a:srgbClr val="800080"/>
+                </a:solidFill>
+                <a:latin typeface="Courier New"/>
+                <a:ea typeface="DejaVu Sans"/>
+              </a:rPr>
+              <a:t> git checkout my_new_feature   </a:t>
+            </a:r>
+            <a:r>
+              <a:rPr b="0" lang="en-US" sz="1400" spc="-1" strike="noStrike">
+                <a:solidFill>
+                  <a:srgbClr val="00ffff"/>
+                </a:solidFill>
+                <a:latin typeface="Courier New"/>
+                <a:ea typeface="DejaVu Sans"/>
+              </a:rPr>
+              <a:t>← Switch back to this branch</a:t>
+            </a:r>
+            <a:endParaRPr b="0" lang="en-US" sz="1400" spc="-1" strike="noStrike">
+              <a:latin typeface="Arial"/>
+            </a:endParaRPr>
+          </a:p>
+          <a:p>
+            <a:endParaRPr b="0" lang="en-US" sz="1400" spc="-1" strike="noStrike">
+              <a:latin typeface="Arial"/>
+            </a:endParaRPr>
+          </a:p>
+          <a:p>
+            <a:r>
+              <a:rPr b="0" lang="en-US" sz="1800" spc="-1" strike="noStrike">
+                <a:solidFill>
+                  <a:srgbClr val="000000"/>
+                </a:solidFill>
+                <a:latin typeface="Arial"/>
+                <a:ea typeface="DejaVu Sans"/>
+              </a:rPr>
+              <a:t>Keep working and just ignore the ‘an_experiment’ branch.</a:t>
+            </a:r>
+            <a:endParaRPr b="0" lang="en-US" sz="1800" spc="-1" strike="noStrike">
+              <a:latin typeface="Arial"/>
+            </a:endParaRPr>
+          </a:p>
+        </p:txBody>
+      </p:sp>
+    </p:spTree>
+  </p:cSld>
+  <p:timing>
+    <p:tnLst>
+      <p:par>
+        <p:cTn id="119" dur="indefinite" restart="never" nodeType="tmRoot">
+          <p:childTnLst>
+            <p:seq>
+              <p:cTn id="120" nodeType="mainSeq"/>
+              <p:prevCondLst>
+                <p:cond delay="0" evt="onPrev">
+                  <p:tgtEl>
+                    <p:sldTgt/>
+                  </p:tgtEl>
+                </p:cond>
+              </p:prevCondLst>
+              <p:nextCondLst>
+                <p:cond delay="0" evt="onNext">
+                  <p:tgtEl>
+                    <p:sldTgt/>
+                  </p:tgtEl>
+                </p:cond>
+              </p:nextCondLst>
+            </p:seq>
+          </p:childTnLst>
+        </p:cTn>
+      </p:par>
+    </p:tnLst>
+  </p:timing>
+</p:sld>
+</file>
+
+<file path=ppt/slides/slide62.xml><?xml version="1.0" encoding="utf-8"?>
+<p:sld xmlns:a="http://schemas.openxmlformats.org/drawingml/2006/main" xmlns:p="http://schemas.openxmlformats.org/presentationml/2006/main" xmlns:r="http://schemas.openxmlformats.org/officeDocument/2006/relationships" xmlns:p14="http://schemas.microsoft.com/office/powerpoint/2010/main" xmlns:p15="http://schemas.microsoft.com/office/powerpoint/2012/main" xmlns:mc="http://schemas.openxmlformats.org/markup-compatibility/2006">
+  <p:cSld>
+    <p:spTree>
+      <p:nvGrpSpPr>
+        <p:cNvPr id="1" name=""/>
+        <p:cNvGrpSpPr/>
+        <p:nvPr/>
+      </p:nvGrpSpPr>
+      <p:grpSpPr>
+        <a:xfrm>
+          <a:off x="0" y="0"/>
+          <a:ext cx="0" cy="0"/>
+          <a:chOff x="0" y="0"/>
+          <a:chExt cx="0" cy="0"/>
+        </a:xfrm>
+      </p:grpSpPr>
+      <p:sp>
+        <p:nvSpPr>
+          <p:cNvPr id="733" name="CustomShape 1"/>
           <p:cNvSpPr/>
           <p:nvPr/>
         </p:nvSpPr>
@@ -36324,7 +36370,7 @@
       </p:sp>
       <p:sp>
         <p:nvSpPr>
-          <p:cNvPr id="733" name="CustomShape 2"/>
+          <p:cNvPr id="734" name="CustomShape 2"/>
           <p:cNvSpPr/>
           <p:nvPr/>
         </p:nvSpPr>
@@ -36354,7 +36400,7 @@
       </p:sp>
       <p:sp>
         <p:nvSpPr>
-          <p:cNvPr id="734" name="CustomShape 3"/>
+          <p:cNvPr id="735" name="CustomShape 3"/>
           <p:cNvSpPr/>
           <p:nvPr/>
         </p:nvSpPr>
@@ -36384,7 +36430,7 @@
       </p:sp>
       <p:sp>
         <p:nvSpPr>
-          <p:cNvPr id="735" name="CustomShape 4"/>
+          <p:cNvPr id="736" name="CustomShape 4"/>
           <p:cNvSpPr/>
           <p:nvPr/>
         </p:nvSpPr>
@@ -36414,7 +36460,7 @@
       </p:sp>
       <p:sp>
         <p:nvSpPr>
-          <p:cNvPr id="736" name="Line 5"/>
+          <p:cNvPr id="737" name="Line 5"/>
           <p:cNvSpPr/>
           <p:nvPr/>
         </p:nvSpPr>
@@ -36442,7 +36488,7 @@
       </p:sp>
       <p:sp>
         <p:nvSpPr>
-          <p:cNvPr id="737" name="Line 6"/>
+          <p:cNvPr id="738" name="Line 6"/>
           <p:cNvSpPr/>
           <p:nvPr/>
         </p:nvSpPr>
@@ -36470,7 +36516,7 @@
       </p:sp>
       <p:sp>
         <p:nvSpPr>
-          <p:cNvPr id="738" name="Line 7"/>
+          <p:cNvPr id="739" name="Line 7"/>
           <p:cNvSpPr/>
           <p:nvPr/>
         </p:nvSpPr>
@@ -36498,7 +36544,7 @@
       </p:sp>
       <p:sp>
         <p:nvSpPr>
-          <p:cNvPr id="739" name="TextShape 8"/>
+          <p:cNvPr id="740" name="TextShape 8"/>
           <p:cNvSpPr txBox="1"/>
           <p:nvPr/>
         </p:nvSpPr>
@@ -36532,7 +36578,7 @@
       </p:sp>
       <p:sp>
         <p:nvSpPr>
-          <p:cNvPr id="740" name="TextShape 9"/>
+          <p:cNvPr id="741" name="TextShape 9"/>
           <p:cNvSpPr txBox="1"/>
           <p:nvPr/>
         </p:nvSpPr>
@@ -36566,7 +36612,7 @@
       </p:sp>
       <p:sp>
         <p:nvSpPr>
-          <p:cNvPr id="741" name="CustomShape 10"/>
+          <p:cNvPr id="742" name="CustomShape 10"/>
           <p:cNvSpPr/>
           <p:nvPr/>
         </p:nvSpPr>
@@ -36596,7 +36642,7 @@
       </p:sp>
       <p:sp>
         <p:nvSpPr>
-          <p:cNvPr id="742" name="Line 11"/>
+          <p:cNvPr id="743" name="Line 11"/>
           <p:cNvSpPr/>
           <p:nvPr/>
         </p:nvSpPr>
@@ -36624,7 +36670,7 @@
       </p:sp>
       <p:sp>
         <p:nvSpPr>
-          <p:cNvPr id="743" name="CustomShape 12"/>
+          <p:cNvPr id="744" name="CustomShape 12"/>
           <p:cNvSpPr/>
           <p:nvPr/>
         </p:nvSpPr>
@@ -36654,7 +36700,7 @@
       </p:sp>
       <p:sp>
         <p:nvSpPr>
-          <p:cNvPr id="744" name="CustomShape 13"/>
+          <p:cNvPr id="745" name="CustomShape 13"/>
           <p:cNvSpPr/>
           <p:nvPr/>
         </p:nvSpPr>
@@ -36684,7 +36730,7 @@
       </p:sp>
       <p:sp>
         <p:nvSpPr>
-          <p:cNvPr id="745" name="Line 14"/>
+          <p:cNvPr id="746" name="Line 14"/>
           <p:cNvSpPr/>
           <p:nvPr/>
         </p:nvSpPr>
@@ -36712,7 +36758,7 @@
       </p:sp>
       <p:sp>
         <p:nvSpPr>
-          <p:cNvPr id="746" name="Line 15"/>
+          <p:cNvPr id="747" name="Line 15"/>
           <p:cNvSpPr/>
           <p:nvPr/>
         </p:nvSpPr>
@@ -36740,7 +36786,7 @@
       </p:sp>
       <p:sp>
         <p:nvSpPr>
-          <p:cNvPr id="747" name="CustomShape 16"/>
+          <p:cNvPr id="748" name="CustomShape 16"/>
           <p:cNvSpPr/>
           <p:nvPr/>
         </p:nvSpPr>
@@ -36770,7 +36816,7 @@
       </p:sp>
       <p:sp>
         <p:nvSpPr>
-          <p:cNvPr id="748" name="Line 17"/>
+          <p:cNvPr id="749" name="Line 17"/>
           <p:cNvSpPr/>
           <p:nvPr/>
         </p:nvSpPr>
@@ -36798,7 +36844,7 @@
       </p:sp>
       <p:sp>
         <p:nvSpPr>
-          <p:cNvPr id="749" name="CustomShape 18"/>
+          <p:cNvPr id="750" name="CustomShape 18"/>
           <p:cNvSpPr/>
           <p:nvPr/>
         </p:nvSpPr>
@@ -36828,7 +36874,7 @@
       </p:sp>
       <p:sp>
         <p:nvSpPr>
-          <p:cNvPr id="750" name="Line 19"/>
+          <p:cNvPr id="751" name="Line 19"/>
           <p:cNvSpPr/>
           <p:nvPr/>
         </p:nvSpPr>
@@ -36856,7 +36902,7 @@
       </p:sp>
       <p:sp>
         <p:nvSpPr>
-          <p:cNvPr id="751" name="Line 20"/>
+          <p:cNvPr id="752" name="Line 20"/>
           <p:cNvSpPr/>
           <p:nvPr/>
         </p:nvSpPr>
@@ -36884,7 +36930,7 @@
       </p:sp>
       <p:sp>
         <p:nvSpPr>
-          <p:cNvPr id="752" name="TextShape 21"/>
+          <p:cNvPr id="753" name="TextShape 21"/>
           <p:cNvSpPr txBox="1"/>
           <p:nvPr/>
         </p:nvSpPr>
@@ -36918,7 +36964,7 @@
       </p:sp>
       <p:sp>
         <p:nvSpPr>
-          <p:cNvPr id="753" name="CustomShape 22"/>
+          <p:cNvPr id="754" name="CustomShape 22"/>
           <p:cNvSpPr/>
           <p:nvPr/>
         </p:nvSpPr>
@@ -36948,7 +36994,7 @@
       </p:sp>
       <p:sp>
         <p:nvSpPr>
-          <p:cNvPr id="754" name="Line 23"/>
+          <p:cNvPr id="755" name="Line 23"/>
           <p:cNvSpPr/>
           <p:nvPr/>
         </p:nvSpPr>

</xml_diff>